<commit_message>
Introducing the CSS Box Model
</commit_message>
<xml_diff>
--- a/PPT/Css-v3.pptx
+++ b/PPT/Css-v3.pptx
@@ -5,7 +5,7 @@
     <p:sldMasterId id="2147483660" r:id="rId1"/>
   </p:sldMasterIdLst>
   <p:notesMasterIdLst>
-    <p:notesMasterId r:id="rId34"/>
+    <p:notesMasterId r:id="rId36"/>
   </p:notesMasterIdLst>
   <p:sldIdLst>
     <p:sldId id="256" r:id="rId2"/>
@@ -39,7 +39,9 @@
     <p:sldId id="391" r:id="rId30"/>
     <p:sldId id="392" r:id="rId31"/>
     <p:sldId id="393" r:id="rId32"/>
-    <p:sldId id="268" r:id="rId33"/>
+    <p:sldId id="394" r:id="rId33"/>
+    <p:sldId id="395" r:id="rId34"/>
+    <p:sldId id="268" r:id="rId35"/>
   </p:sldIdLst>
   <p:sldSz cx="12192000" cy="6858000"/>
   <p:notesSz cx="6858000" cy="9144000"/>
@@ -228,7 +230,7 @@
           <a:p>
             <a:fld id="{39CD3BCA-8732-46CA-ADDD-C24F968DBEAF}" type="datetimeFigureOut">
               <a:rPr lang="en-GB" smtClean="0"/>
-              <a:t>02/11/2020</a:t>
+              <a:t>06/11/2020</a:t>
             </a:fld>
             <a:endParaRPr lang="en-GB"/>
           </a:p>
@@ -2527,7 +2529,7 @@
           <a:p>
             <a:fld id="{D4BA8270-C9CF-44CA-BE5A-02C2BDCCEDE4}" type="datetimeFigureOut">
               <a:rPr lang="en-GB" smtClean="0"/>
-              <a:t>02/11/2020</a:t>
+              <a:t>06/11/2020</a:t>
             </a:fld>
             <a:endParaRPr lang="en-GB"/>
           </a:p>
@@ -2778,7 +2780,7 @@
           <a:p>
             <a:fld id="{D4BA8270-C9CF-44CA-BE5A-02C2BDCCEDE4}" type="datetimeFigureOut">
               <a:rPr lang="en-GB" smtClean="0"/>
-              <a:t>02/11/2020</a:t>
+              <a:t>06/11/2020</a:t>
             </a:fld>
             <a:endParaRPr lang="en-GB"/>
           </a:p>
@@ -3092,7 +3094,7 @@
           <a:p>
             <a:fld id="{D4BA8270-C9CF-44CA-BE5A-02C2BDCCEDE4}" type="datetimeFigureOut">
               <a:rPr lang="en-GB" smtClean="0"/>
-              <a:t>02/11/2020</a:t>
+              <a:t>06/11/2020</a:t>
             </a:fld>
             <a:endParaRPr lang="en-GB"/>
           </a:p>
@@ -3433,7 +3435,7 @@
           <a:p>
             <a:fld id="{D4BA8270-C9CF-44CA-BE5A-02C2BDCCEDE4}" type="datetimeFigureOut">
               <a:rPr lang="en-GB" smtClean="0"/>
-              <a:t>02/11/2020</a:t>
+              <a:t>06/11/2020</a:t>
             </a:fld>
             <a:endParaRPr lang="en-GB"/>
           </a:p>
@@ -3747,7 +3749,7 @@
           <a:p>
             <a:fld id="{D4BA8270-C9CF-44CA-BE5A-02C2BDCCEDE4}" type="datetimeFigureOut">
               <a:rPr lang="en-GB" smtClean="0"/>
-              <a:t>02/11/2020</a:t>
+              <a:t>06/11/2020</a:t>
             </a:fld>
             <a:endParaRPr lang="en-GB"/>
           </a:p>
@@ -4140,7 +4142,7 @@
           <a:p>
             <a:fld id="{D4BA8270-C9CF-44CA-BE5A-02C2BDCCEDE4}" type="datetimeFigureOut">
               <a:rPr lang="en-GB" smtClean="0"/>
-              <a:t>02/11/2020</a:t>
+              <a:t>06/11/2020</a:t>
             </a:fld>
             <a:endParaRPr lang="en-GB"/>
           </a:p>
@@ -4310,7 +4312,7 @@
           <a:p>
             <a:fld id="{D4BA8270-C9CF-44CA-BE5A-02C2BDCCEDE4}" type="datetimeFigureOut">
               <a:rPr lang="en-GB" smtClean="0"/>
-              <a:t>02/11/2020</a:t>
+              <a:t>06/11/2020</a:t>
             </a:fld>
             <a:endParaRPr lang="en-GB"/>
           </a:p>
@@ -4490,7 +4492,7 @@
           <a:p>
             <a:fld id="{D4BA8270-C9CF-44CA-BE5A-02C2BDCCEDE4}" type="datetimeFigureOut">
               <a:rPr lang="en-GB" smtClean="0"/>
-              <a:t>02/11/2020</a:t>
+              <a:t>06/11/2020</a:t>
             </a:fld>
             <a:endParaRPr lang="en-GB"/>
           </a:p>
@@ -4666,7 +4668,7 @@
           <a:p>
             <a:fld id="{D4BA8270-C9CF-44CA-BE5A-02C2BDCCEDE4}" type="datetimeFigureOut">
               <a:rPr lang="en-GB" smtClean="0"/>
-              <a:t>02/11/2020</a:t>
+              <a:t>06/11/2020</a:t>
             </a:fld>
             <a:endParaRPr lang="en-GB"/>
           </a:p>
@@ -4913,7 +4915,7 @@
           <a:p>
             <a:fld id="{D4BA8270-C9CF-44CA-BE5A-02C2BDCCEDE4}" type="datetimeFigureOut">
               <a:rPr lang="en-GB" smtClean="0"/>
-              <a:t>02/11/2020</a:t>
+              <a:t>06/11/2020</a:t>
             </a:fld>
             <a:endParaRPr lang="en-GB"/>
           </a:p>
@@ -5145,7 +5147,7 @@
           <a:p>
             <a:fld id="{D4BA8270-C9CF-44CA-BE5A-02C2BDCCEDE4}" type="datetimeFigureOut">
               <a:rPr lang="en-GB" smtClean="0"/>
-              <a:t>02/11/2020</a:t>
+              <a:t>06/11/2020</a:t>
             </a:fld>
             <a:endParaRPr lang="en-GB"/>
           </a:p>
@@ -5519,7 +5521,7 @@
           <a:p>
             <a:fld id="{D4BA8270-C9CF-44CA-BE5A-02C2BDCCEDE4}" type="datetimeFigureOut">
               <a:rPr lang="en-GB" smtClean="0"/>
-              <a:t>02/11/2020</a:t>
+              <a:t>06/11/2020</a:t>
             </a:fld>
             <a:endParaRPr lang="en-GB"/>
           </a:p>
@@ -5642,7 +5644,7 @@
           <a:p>
             <a:fld id="{D4BA8270-C9CF-44CA-BE5A-02C2BDCCEDE4}" type="datetimeFigureOut">
               <a:rPr lang="en-GB" smtClean="0"/>
-              <a:t>02/11/2020</a:t>
+              <a:t>06/11/2020</a:t>
             </a:fld>
             <a:endParaRPr lang="en-GB"/>
           </a:p>
@@ -5737,7 +5739,7 @@
           <a:p>
             <a:fld id="{D4BA8270-C9CF-44CA-BE5A-02C2BDCCEDE4}" type="datetimeFigureOut">
               <a:rPr lang="en-GB" smtClean="0"/>
-              <a:t>02/11/2020</a:t>
+              <a:t>06/11/2020</a:t>
             </a:fld>
             <a:endParaRPr lang="en-GB"/>
           </a:p>
@@ -5992,7 +5994,7 @@
           <a:p>
             <a:fld id="{D4BA8270-C9CF-44CA-BE5A-02C2BDCCEDE4}" type="datetimeFigureOut">
               <a:rPr lang="en-GB" smtClean="0"/>
-              <a:t>02/11/2020</a:t>
+              <a:t>06/11/2020</a:t>
             </a:fld>
             <a:endParaRPr lang="en-GB"/>
           </a:p>
@@ -6255,7 +6257,7 @@
           <a:p>
             <a:fld id="{D4BA8270-C9CF-44CA-BE5A-02C2BDCCEDE4}" type="datetimeFigureOut">
               <a:rPr lang="en-GB" smtClean="0"/>
-              <a:t>02/11/2020</a:t>
+              <a:t>06/11/2020</a:t>
             </a:fld>
             <a:endParaRPr lang="en-GB"/>
           </a:p>
@@ -6998,7 +7000,7 @@
           <a:p>
             <a:fld id="{D4BA8270-C9CF-44CA-BE5A-02C2BDCCEDE4}" type="datetimeFigureOut">
               <a:rPr lang="en-GB" smtClean="0"/>
-              <a:t>02/11/2020</a:t>
+              <a:t>06/11/2020</a:t>
             </a:fld>
             <a:endParaRPr lang="en-GB"/>
           </a:p>
@@ -19775,11 +19777,7 @@
           <a:p>
             <a:r>
               <a:rPr lang="en-IN" dirty="0" smtClean="0"/>
-              <a:t>Section </a:t>
-            </a:r>
-            <a:r>
-              <a:rPr lang="en-IN" dirty="0" smtClean="0"/>
-              <a:t>-3 -:Diving deeper into </a:t>
+              <a:t>Section -3 -:Diving deeper into </a:t>
             </a:r>
             <a:r>
               <a:rPr lang="en-IN" dirty="0" err="1" smtClean="0"/>
@@ -19810,6 +19808,294 @@
 </file>
 
 <file path=ppt/slides/slide32.xml><?xml version="1.0" encoding="utf-8"?>
+<p:sld xmlns:a="http://schemas.openxmlformats.org/drawingml/2006/main" xmlns:r="http://schemas.openxmlformats.org/officeDocument/2006/relationships" xmlns:p="http://schemas.openxmlformats.org/presentationml/2006/main">
+  <p:cSld>
+    <p:spTree>
+      <p:nvGrpSpPr>
+        <p:cNvPr id="1" name=""/>
+        <p:cNvGrpSpPr/>
+        <p:nvPr/>
+      </p:nvGrpSpPr>
+      <p:grpSpPr>
+        <a:xfrm>
+          <a:off x="0" y="0"/>
+          <a:ext cx="0" cy="0"/>
+          <a:chOff x="0" y="0"/>
+          <a:chExt cx="0" cy="0"/>
+        </a:xfrm>
+      </p:grpSpPr>
+      <p:sp>
+        <p:nvSpPr>
+          <p:cNvPr id="2" name="Title 1"/>
+          <p:cNvSpPr>
+            <a:spLocks noGrp="1"/>
+          </p:cNvSpPr>
+          <p:nvPr>
+            <p:ph type="title"/>
+          </p:nvPr>
+        </p:nvSpPr>
+        <p:spPr>
+          <a:xfrm>
+            <a:off x="762394" y="163033"/>
+            <a:ext cx="8596668" cy="676940"/>
+          </a:xfrm>
+        </p:spPr>
+        <p:txBody>
+          <a:bodyPr/>
+          <a:lstStyle/>
+          <a:p>
+            <a:r>
+              <a:rPr lang="en-IN" dirty="0"/>
+              <a:t>Introducing the CSS Box Model</a:t>
+            </a:r>
+            <a:endParaRPr lang="en-GB" dirty="0"/>
+          </a:p>
+        </p:txBody>
+      </p:sp>
+      <p:sp>
+        <p:nvSpPr>
+          <p:cNvPr id="3" name="Content Placeholder 2"/>
+          <p:cNvSpPr>
+            <a:spLocks noGrp="1"/>
+          </p:cNvSpPr>
+          <p:nvPr>
+            <p:ph idx="1"/>
+          </p:nvPr>
+        </p:nvSpPr>
+        <p:spPr>
+          <a:xfrm>
+            <a:off x="900617" y="925033"/>
+            <a:ext cx="10348629" cy="4967474"/>
+          </a:xfrm>
+        </p:spPr>
+        <p:txBody>
+          <a:bodyPr/>
+          <a:lstStyle/>
+          <a:p>
+            <a:r>
+              <a:rPr lang="en-GB" dirty="0" smtClean="0"/>
+              <a:t>If we consider the red box around our first element.</a:t>
+            </a:r>
+          </a:p>
+          <a:p>
+            <a:r>
+              <a:rPr lang="en-GB" dirty="0" smtClean="0"/>
+              <a:t>It would look better if it was bigger ,the text had more space around it and till we add a navigation bar it would be better if it did not have white space around it.</a:t>
+            </a:r>
+          </a:p>
+          <a:p>
+            <a:r>
+              <a:rPr lang="en-GB" dirty="0" smtClean="0"/>
+              <a:t>We can achieve all this by understanding and working with the box model</a:t>
+            </a:r>
+          </a:p>
+          <a:p>
+            <a:r>
+              <a:rPr lang="en-GB" dirty="0" smtClean="0"/>
+              <a:t>Every element in html is interpreted as a box in </a:t>
+            </a:r>
+            <a:r>
+              <a:rPr lang="en-GB" dirty="0" err="1" smtClean="0"/>
+              <a:t>css</a:t>
+            </a:r>
+            <a:r>
+              <a:rPr lang="en-GB" dirty="0" smtClean="0"/>
+              <a:t> we can see such a box by opening the developer tools and navigating to the bottom of the page in the styles section.</a:t>
+            </a:r>
+          </a:p>
+          <a:p>
+            <a:endParaRPr lang="en-GB" dirty="0" smtClean="0"/>
+          </a:p>
+          <a:p>
+            <a:endParaRPr lang="en-GB" dirty="0"/>
+          </a:p>
+        </p:txBody>
+      </p:sp>
+      <p:pic>
+        <p:nvPicPr>
+          <p:cNvPr id="4" name="Picture 3"/>
+          <p:cNvPicPr>
+            <a:picLocks noChangeAspect="1"/>
+          </p:cNvPicPr>
+          <p:nvPr/>
+        </p:nvPicPr>
+        <p:blipFill>
+          <a:blip r:embed="rId2"/>
+          <a:stretch>
+            <a:fillRect/>
+          </a:stretch>
+        </p:blipFill>
+        <p:spPr>
+          <a:xfrm>
+            <a:off x="3212355" y="3338623"/>
+            <a:ext cx="4187905" cy="3218754"/>
+          </a:xfrm>
+          <a:prstGeom prst="rect">
+            <a:avLst/>
+          </a:prstGeom>
+        </p:spPr>
+      </p:pic>
+    </p:spTree>
+    <p:extLst>
+      <p:ext uri="{BB962C8B-B14F-4D97-AF65-F5344CB8AC3E}">
+        <p14:creationId xmlns:p14="http://schemas.microsoft.com/office/powerpoint/2010/main" val="3551063902"/>
+      </p:ext>
+    </p:extLst>
+  </p:cSld>
+  <p:clrMapOvr>
+    <a:masterClrMapping/>
+  </p:clrMapOvr>
+</p:sld>
+</file>
+
+<file path=ppt/slides/slide33.xml><?xml version="1.0" encoding="utf-8"?>
+<p:sld xmlns:a="http://schemas.openxmlformats.org/drawingml/2006/main" xmlns:r="http://schemas.openxmlformats.org/officeDocument/2006/relationships" xmlns:p="http://schemas.openxmlformats.org/presentationml/2006/main">
+  <p:cSld>
+    <p:spTree>
+      <p:nvGrpSpPr>
+        <p:cNvPr id="1" name=""/>
+        <p:cNvGrpSpPr/>
+        <p:nvPr/>
+      </p:nvGrpSpPr>
+      <p:grpSpPr>
+        <a:xfrm>
+          <a:off x="0" y="0"/>
+          <a:ext cx="0" cy="0"/>
+          <a:chOff x="0" y="0"/>
+          <a:chExt cx="0" cy="0"/>
+        </a:xfrm>
+      </p:grpSpPr>
+      <p:sp>
+        <p:nvSpPr>
+          <p:cNvPr id="2" name="Title 1"/>
+          <p:cNvSpPr>
+            <a:spLocks noGrp="1"/>
+          </p:cNvSpPr>
+          <p:nvPr>
+            <p:ph type="title"/>
+          </p:nvPr>
+        </p:nvSpPr>
+        <p:spPr>
+          <a:xfrm>
+            <a:off x="517845" y="163033"/>
+            <a:ext cx="8596668" cy="676940"/>
+          </a:xfrm>
+        </p:spPr>
+        <p:txBody>
+          <a:bodyPr/>
+          <a:lstStyle/>
+          <a:p>
+            <a:r>
+              <a:rPr lang="en-IN" dirty="0"/>
+              <a:t>Introducing the CSS Box </a:t>
+            </a:r>
+            <a:r>
+              <a:rPr lang="en-IN" dirty="0" smtClean="0"/>
+              <a:t>Model </a:t>
+            </a:r>
+            <a:r>
+              <a:rPr lang="en-IN" dirty="0" err="1" smtClean="0"/>
+              <a:t>Cont</a:t>
+            </a:r>
+            <a:r>
+              <a:rPr lang="en-IN" dirty="0" smtClean="0"/>
+              <a:t>…</a:t>
+            </a:r>
+            <a:endParaRPr lang="en-GB" dirty="0"/>
+          </a:p>
+        </p:txBody>
+      </p:sp>
+      <p:sp>
+        <p:nvSpPr>
+          <p:cNvPr id="3" name="Content Placeholder 2"/>
+          <p:cNvSpPr>
+            <a:spLocks noGrp="1"/>
+          </p:cNvSpPr>
+          <p:nvPr>
+            <p:ph idx="1"/>
+          </p:nvPr>
+        </p:nvSpPr>
+        <p:spPr>
+          <a:xfrm>
+            <a:off x="900617" y="925033"/>
+            <a:ext cx="10348629" cy="4967474"/>
+          </a:xfrm>
+        </p:spPr>
+        <p:txBody>
+          <a:bodyPr/>
+          <a:lstStyle/>
+          <a:p>
+            <a:r>
+              <a:rPr lang="en-GB" dirty="0" smtClean="0"/>
+              <a:t>Every element has a content represented by the innermost blue area </a:t>
+            </a:r>
+            <a:r>
+              <a:rPr lang="en-GB" dirty="0" err="1" smtClean="0"/>
+              <a:t>i.e</a:t>
+            </a:r>
+            <a:r>
+              <a:rPr lang="en-GB" dirty="0" smtClean="0"/>
+              <a:t> actually what is inside it for our &lt;section&gt; tag the content is the &lt;h1&gt; tag and for the &lt;h1&gt; tag the content is the text inside it .</a:t>
+            </a:r>
+          </a:p>
+          <a:p>
+            <a:r>
+              <a:rPr lang="en-GB" dirty="0" smtClean="0"/>
+              <a:t>The next part is the padding which in case of our &lt;section&gt; is zero . padding is the internal space between the content and the border . Padding is highlighted in green.</a:t>
+            </a:r>
+          </a:p>
+          <a:p>
+            <a:r>
+              <a:rPr lang="en-GB" dirty="0" smtClean="0"/>
+              <a:t>The next part is a border we don’t have one in our case yet . The border surrounds the element , comes directly after the padding which in turn comes directly after the content . The border is highlighted in yellow.</a:t>
+            </a:r>
+          </a:p>
+          <a:p>
+            <a:r>
+              <a:rPr lang="en-GB" dirty="0" smtClean="0"/>
+              <a:t>We also may want to have a spacing around the element and that is called the margin . It is not a part of the core element which ends at the border but it comes after that . It is the distance between the element and its next sibling . The &lt;h1&gt; element has a margin which is default browser margin we can see this by scrolling up and we will notice the </a:t>
+            </a:r>
+            <a:r>
+              <a:rPr lang="en-GB" i="1" dirty="0" smtClean="0"/>
+              <a:t>margin-block-start and margin-block-end browser defaults . The margin is highlighted in light brown colour</a:t>
+            </a:r>
+            <a:r>
+              <a:rPr lang="en-GB" i="1" strike="sngStrike" dirty="0" smtClean="0"/>
+              <a:t>.</a:t>
+            </a:r>
+            <a:endParaRPr lang="en-GB" dirty="0" smtClean="0"/>
+          </a:p>
+          <a:p>
+            <a:r>
+              <a:rPr lang="en-GB" dirty="0" smtClean="0"/>
+              <a:t>You will notice that the </a:t>
+            </a:r>
+            <a:r>
+              <a:rPr lang="en-GB" smtClean="0"/>
+              <a:t>margin goes </a:t>
+            </a:r>
+            <a:r>
+              <a:rPr lang="en-GB" dirty="0" smtClean="0"/>
+              <a:t>outside the surrounding section as it is not the part of the element</a:t>
+            </a:r>
+            <a:endParaRPr lang="en-GB" dirty="0"/>
+          </a:p>
+        </p:txBody>
+      </p:sp>
+    </p:spTree>
+    <p:extLst>
+      <p:ext uri="{BB962C8B-B14F-4D97-AF65-F5344CB8AC3E}">
+        <p14:creationId xmlns:p14="http://schemas.microsoft.com/office/powerpoint/2010/main" val="3138295960"/>
+      </p:ext>
+    </p:extLst>
+  </p:cSld>
+  <p:clrMapOvr>
+    <a:masterClrMapping/>
+  </p:clrMapOvr>
+</p:sld>
+</file>
+
+<file path=ppt/slides/slide34.xml><?xml version="1.0" encoding="utf-8"?>
 <p:sld xmlns:a="http://schemas.openxmlformats.org/drawingml/2006/main" xmlns:r="http://schemas.openxmlformats.org/officeDocument/2006/relationships" xmlns:p="http://schemas.openxmlformats.org/presentationml/2006/main" showMasterSp="0">
   <p:cSld>
     <p:spTree>

</xml_diff>

<commit_message>
Understanding the Box Model
</commit_message>
<xml_diff>
--- a/PPT/Css-v3.pptx
+++ b/PPT/Css-v3.pptx
@@ -5,7 +5,7 @@
     <p:sldMasterId id="2147483660" r:id="rId1"/>
   </p:sldMasterIdLst>
   <p:notesMasterIdLst>
-    <p:notesMasterId r:id="rId36"/>
+    <p:notesMasterId r:id="rId37"/>
   </p:notesMasterIdLst>
   <p:sldIdLst>
     <p:sldId id="256" r:id="rId2"/>
@@ -41,7 +41,8 @@
     <p:sldId id="393" r:id="rId32"/>
     <p:sldId id="394" r:id="rId33"/>
     <p:sldId id="395" r:id="rId34"/>
-    <p:sldId id="268" r:id="rId35"/>
+    <p:sldId id="396" r:id="rId35"/>
+    <p:sldId id="268" r:id="rId36"/>
   </p:sldIdLst>
   <p:sldSz cx="12192000" cy="6858000"/>
   <p:notesSz cx="6858000" cy="9144000"/>
@@ -230,7 +231,7 @@
           <a:p>
             <a:fld id="{39CD3BCA-8732-46CA-ADDD-C24F968DBEAF}" type="datetimeFigureOut">
               <a:rPr lang="en-GB" smtClean="0"/>
-              <a:t>06/11/2020</a:t>
+              <a:t>07/11/2020</a:t>
             </a:fld>
             <a:endParaRPr lang="en-GB"/>
           </a:p>
@@ -2529,7 +2530,7 @@
           <a:p>
             <a:fld id="{D4BA8270-C9CF-44CA-BE5A-02C2BDCCEDE4}" type="datetimeFigureOut">
               <a:rPr lang="en-GB" smtClean="0"/>
-              <a:t>06/11/2020</a:t>
+              <a:t>07/11/2020</a:t>
             </a:fld>
             <a:endParaRPr lang="en-GB"/>
           </a:p>
@@ -2780,7 +2781,7 @@
           <a:p>
             <a:fld id="{D4BA8270-C9CF-44CA-BE5A-02C2BDCCEDE4}" type="datetimeFigureOut">
               <a:rPr lang="en-GB" smtClean="0"/>
-              <a:t>06/11/2020</a:t>
+              <a:t>07/11/2020</a:t>
             </a:fld>
             <a:endParaRPr lang="en-GB"/>
           </a:p>
@@ -3094,7 +3095,7 @@
           <a:p>
             <a:fld id="{D4BA8270-C9CF-44CA-BE5A-02C2BDCCEDE4}" type="datetimeFigureOut">
               <a:rPr lang="en-GB" smtClean="0"/>
-              <a:t>06/11/2020</a:t>
+              <a:t>07/11/2020</a:t>
             </a:fld>
             <a:endParaRPr lang="en-GB"/>
           </a:p>
@@ -3435,7 +3436,7 @@
           <a:p>
             <a:fld id="{D4BA8270-C9CF-44CA-BE5A-02C2BDCCEDE4}" type="datetimeFigureOut">
               <a:rPr lang="en-GB" smtClean="0"/>
-              <a:t>06/11/2020</a:t>
+              <a:t>07/11/2020</a:t>
             </a:fld>
             <a:endParaRPr lang="en-GB"/>
           </a:p>
@@ -3749,7 +3750,7 @@
           <a:p>
             <a:fld id="{D4BA8270-C9CF-44CA-BE5A-02C2BDCCEDE4}" type="datetimeFigureOut">
               <a:rPr lang="en-GB" smtClean="0"/>
-              <a:t>06/11/2020</a:t>
+              <a:t>07/11/2020</a:t>
             </a:fld>
             <a:endParaRPr lang="en-GB"/>
           </a:p>
@@ -4142,7 +4143,7 @@
           <a:p>
             <a:fld id="{D4BA8270-C9CF-44CA-BE5A-02C2BDCCEDE4}" type="datetimeFigureOut">
               <a:rPr lang="en-GB" smtClean="0"/>
-              <a:t>06/11/2020</a:t>
+              <a:t>07/11/2020</a:t>
             </a:fld>
             <a:endParaRPr lang="en-GB"/>
           </a:p>
@@ -4312,7 +4313,7 @@
           <a:p>
             <a:fld id="{D4BA8270-C9CF-44CA-BE5A-02C2BDCCEDE4}" type="datetimeFigureOut">
               <a:rPr lang="en-GB" smtClean="0"/>
-              <a:t>06/11/2020</a:t>
+              <a:t>07/11/2020</a:t>
             </a:fld>
             <a:endParaRPr lang="en-GB"/>
           </a:p>
@@ -4492,7 +4493,7 @@
           <a:p>
             <a:fld id="{D4BA8270-C9CF-44CA-BE5A-02C2BDCCEDE4}" type="datetimeFigureOut">
               <a:rPr lang="en-GB" smtClean="0"/>
-              <a:t>06/11/2020</a:t>
+              <a:t>07/11/2020</a:t>
             </a:fld>
             <a:endParaRPr lang="en-GB"/>
           </a:p>
@@ -4668,7 +4669,7 @@
           <a:p>
             <a:fld id="{D4BA8270-C9CF-44CA-BE5A-02C2BDCCEDE4}" type="datetimeFigureOut">
               <a:rPr lang="en-GB" smtClean="0"/>
-              <a:t>06/11/2020</a:t>
+              <a:t>07/11/2020</a:t>
             </a:fld>
             <a:endParaRPr lang="en-GB"/>
           </a:p>
@@ -4915,7 +4916,7 @@
           <a:p>
             <a:fld id="{D4BA8270-C9CF-44CA-BE5A-02C2BDCCEDE4}" type="datetimeFigureOut">
               <a:rPr lang="en-GB" smtClean="0"/>
-              <a:t>06/11/2020</a:t>
+              <a:t>07/11/2020</a:t>
             </a:fld>
             <a:endParaRPr lang="en-GB"/>
           </a:p>
@@ -5147,7 +5148,7 @@
           <a:p>
             <a:fld id="{D4BA8270-C9CF-44CA-BE5A-02C2BDCCEDE4}" type="datetimeFigureOut">
               <a:rPr lang="en-GB" smtClean="0"/>
-              <a:t>06/11/2020</a:t>
+              <a:t>07/11/2020</a:t>
             </a:fld>
             <a:endParaRPr lang="en-GB"/>
           </a:p>
@@ -5521,7 +5522,7 @@
           <a:p>
             <a:fld id="{D4BA8270-C9CF-44CA-BE5A-02C2BDCCEDE4}" type="datetimeFigureOut">
               <a:rPr lang="en-GB" smtClean="0"/>
-              <a:t>06/11/2020</a:t>
+              <a:t>07/11/2020</a:t>
             </a:fld>
             <a:endParaRPr lang="en-GB"/>
           </a:p>
@@ -5644,7 +5645,7 @@
           <a:p>
             <a:fld id="{D4BA8270-C9CF-44CA-BE5A-02C2BDCCEDE4}" type="datetimeFigureOut">
               <a:rPr lang="en-GB" smtClean="0"/>
-              <a:t>06/11/2020</a:t>
+              <a:t>07/11/2020</a:t>
             </a:fld>
             <a:endParaRPr lang="en-GB"/>
           </a:p>
@@ -5739,7 +5740,7 @@
           <a:p>
             <a:fld id="{D4BA8270-C9CF-44CA-BE5A-02C2BDCCEDE4}" type="datetimeFigureOut">
               <a:rPr lang="en-GB" smtClean="0"/>
-              <a:t>06/11/2020</a:t>
+              <a:t>07/11/2020</a:t>
             </a:fld>
             <a:endParaRPr lang="en-GB"/>
           </a:p>
@@ -5994,7 +5995,7 @@
           <a:p>
             <a:fld id="{D4BA8270-C9CF-44CA-BE5A-02C2BDCCEDE4}" type="datetimeFigureOut">
               <a:rPr lang="en-GB" smtClean="0"/>
-              <a:t>06/11/2020</a:t>
+              <a:t>07/11/2020</a:t>
             </a:fld>
             <a:endParaRPr lang="en-GB"/>
           </a:p>
@@ -6257,7 +6258,7 @@
           <a:p>
             <a:fld id="{D4BA8270-C9CF-44CA-BE5A-02C2BDCCEDE4}" type="datetimeFigureOut">
               <a:rPr lang="en-GB" smtClean="0"/>
-              <a:t>06/11/2020</a:t>
+              <a:t>07/11/2020</a:t>
             </a:fld>
             <a:endParaRPr lang="en-GB"/>
           </a:p>
@@ -7000,7 +7001,7 @@
           <a:p>
             <a:fld id="{D4BA8270-C9CF-44CA-BE5A-02C2BDCCEDE4}" type="datetimeFigureOut">
               <a:rPr lang="en-GB" smtClean="0"/>
-              <a:t>06/11/2020</a:t>
+              <a:t>07/11/2020</a:t>
             </a:fld>
             <a:endParaRPr lang="en-GB"/>
           </a:p>
@@ -20096,6 +20097,233 @@
 </file>
 
 <file path=ppt/slides/slide34.xml><?xml version="1.0" encoding="utf-8"?>
+<p:sld xmlns:a="http://schemas.openxmlformats.org/drawingml/2006/main" xmlns:r="http://schemas.openxmlformats.org/officeDocument/2006/relationships" xmlns:p="http://schemas.openxmlformats.org/presentationml/2006/main">
+  <p:cSld>
+    <p:spTree>
+      <p:nvGrpSpPr>
+        <p:cNvPr id="1" name=""/>
+        <p:cNvGrpSpPr/>
+        <p:nvPr/>
+      </p:nvGrpSpPr>
+      <p:grpSpPr>
+        <a:xfrm>
+          <a:off x="0" y="0"/>
+          <a:ext cx="0" cy="0"/>
+          <a:chOff x="0" y="0"/>
+          <a:chExt cx="0" cy="0"/>
+        </a:xfrm>
+      </p:grpSpPr>
+      <p:sp>
+        <p:nvSpPr>
+          <p:cNvPr id="2" name="Title 1"/>
+          <p:cNvSpPr>
+            <a:spLocks noGrp="1"/>
+          </p:cNvSpPr>
+          <p:nvPr>
+            <p:ph type="title"/>
+          </p:nvPr>
+        </p:nvSpPr>
+        <p:spPr>
+          <a:xfrm>
+            <a:off x="517845" y="163033"/>
+            <a:ext cx="8596668" cy="676940"/>
+          </a:xfrm>
+        </p:spPr>
+        <p:txBody>
+          <a:bodyPr/>
+          <a:lstStyle/>
+          <a:p>
+            <a:r>
+              <a:rPr lang="en-GB" dirty="0"/>
+              <a:t>Understanding the Box Model</a:t>
+            </a:r>
+            <a:endParaRPr lang="en-GB" dirty="0"/>
+          </a:p>
+        </p:txBody>
+      </p:sp>
+      <p:sp>
+        <p:nvSpPr>
+          <p:cNvPr id="3" name="Content Placeholder 2"/>
+          <p:cNvSpPr>
+            <a:spLocks noGrp="1"/>
+          </p:cNvSpPr>
+          <p:nvPr>
+            <p:ph idx="1"/>
+          </p:nvPr>
+        </p:nvSpPr>
+        <p:spPr>
+          <a:xfrm>
+            <a:off x="900617" y="925033"/>
+            <a:ext cx="10348629" cy="4967474"/>
+          </a:xfrm>
+        </p:spPr>
+        <p:txBody>
+          <a:bodyPr/>
+          <a:lstStyle/>
+          <a:p>
+            <a:r>
+              <a:rPr lang="en-IN" dirty="0" smtClean="0"/>
+              <a:t>Lets add some spacing around the text in section 1 by adding a padding of  20px to the id selector</a:t>
+            </a:r>
+          </a:p>
+          <a:p>
+            <a:r>
+              <a:rPr lang="en-IN" dirty="0" smtClean="0"/>
+              <a:t>Now in our </a:t>
+            </a:r>
+            <a:r>
+              <a:rPr lang="en-IN" dirty="0" err="1" smtClean="0"/>
+              <a:t>devtools</a:t>
+            </a:r>
+            <a:r>
+              <a:rPr lang="en-IN" dirty="0" smtClean="0"/>
+              <a:t> we will notice we have a padding and the padding is even around the margin of h1 tag . This is because whenever a padding is added it is added after the child element’s content and margin  so that margin and padding don’t overlap.</a:t>
+            </a:r>
+          </a:p>
+          <a:p>
+            <a:r>
+              <a:rPr lang="en-IN" dirty="0" smtClean="0"/>
+              <a:t>Now after the padding lets add a border that should be </a:t>
+            </a:r>
+            <a:r>
+              <a:rPr lang="en-IN" dirty="0" err="1" smtClean="0"/>
+              <a:t>solid,black</a:t>
+            </a:r>
+            <a:r>
+              <a:rPr lang="en-IN" dirty="0" smtClean="0"/>
+              <a:t> and 5px wide so we can either add three properties:</a:t>
+            </a:r>
+          </a:p>
+          <a:p>
+            <a:pPr lvl="2"/>
+            <a:r>
+              <a:rPr lang="en-GB" dirty="0"/>
+              <a:t>    border-style: solid;</a:t>
+            </a:r>
+          </a:p>
+          <a:p>
+            <a:pPr marL="800100" lvl="2" indent="0">
+              <a:buNone/>
+            </a:pPr>
+            <a:r>
+              <a:rPr lang="en-GB" dirty="0"/>
+              <a:t>  </a:t>
+            </a:r>
+            <a:r>
+              <a:rPr lang="en-GB" dirty="0" smtClean="0"/>
+              <a:t>	</a:t>
+            </a:r>
+            <a:r>
+              <a:rPr lang="en-GB" dirty="0"/>
+              <a:t>  </a:t>
+            </a:r>
+            <a:r>
+              <a:rPr lang="en-GB" dirty="0" smtClean="0"/>
+              <a:t>      border-</a:t>
+            </a:r>
+            <a:r>
+              <a:rPr lang="en-GB" dirty="0" err="1" smtClean="0"/>
+              <a:t>color</a:t>
+            </a:r>
+            <a:r>
+              <a:rPr lang="en-GB" dirty="0"/>
+              <a:t>: black;</a:t>
+            </a:r>
+          </a:p>
+          <a:p>
+            <a:pPr marL="800100" lvl="2" indent="0">
+              <a:buNone/>
+            </a:pPr>
+            <a:r>
+              <a:rPr lang="en-GB" dirty="0"/>
+              <a:t>   </a:t>
+            </a:r>
+            <a:r>
+              <a:rPr lang="en-GB" dirty="0" smtClean="0"/>
+              <a:t>      </a:t>
+            </a:r>
+            <a:r>
+              <a:rPr lang="en-GB" dirty="0"/>
+              <a:t> border-width: 5px</a:t>
+            </a:r>
+            <a:r>
+              <a:rPr lang="en-GB" dirty="0" smtClean="0"/>
+              <a:t>;</a:t>
+            </a:r>
+            <a:endParaRPr lang="en-GB" dirty="0"/>
+          </a:p>
+          <a:p>
+            <a:pPr marL="800100" lvl="2" indent="0">
+              <a:buNone/>
+            </a:pPr>
+            <a:r>
+              <a:rPr lang="en-IN" dirty="0" smtClean="0"/>
+              <a:t>Or we can add all three together using a special shorthand notation which we will explore more in upcoming slides :</a:t>
+            </a:r>
+          </a:p>
+          <a:p>
+            <a:pPr marL="1085850" lvl="2" indent="-285750"/>
+            <a:r>
+              <a:rPr lang="en-IN" dirty="0" smtClean="0"/>
+              <a:t>Border : solid black 5px;</a:t>
+            </a:r>
+          </a:p>
+          <a:p>
+            <a:pPr marL="285750"/>
+            <a:r>
+              <a:rPr lang="en-IN" dirty="0" smtClean="0"/>
+              <a:t>To complete the box model lets add a margin of 20px</a:t>
+            </a:r>
+            <a:endParaRPr lang="en-IN" dirty="0"/>
+          </a:p>
+          <a:p>
+            <a:pPr marL="1085850" lvl="2" indent="-285750"/>
+            <a:endParaRPr lang="en-IN" dirty="0" smtClean="0"/>
+          </a:p>
+          <a:p>
+            <a:pPr marL="1085850" lvl="2" indent="-285750"/>
+            <a:endParaRPr lang="en-GB" dirty="0"/>
+          </a:p>
+        </p:txBody>
+      </p:sp>
+      <p:pic>
+        <p:nvPicPr>
+          <p:cNvPr id="4" name="Picture 3"/>
+          <p:cNvPicPr>
+            <a:picLocks noChangeAspect="1"/>
+          </p:cNvPicPr>
+          <p:nvPr/>
+        </p:nvPicPr>
+        <p:blipFill>
+          <a:blip r:embed="rId2"/>
+          <a:stretch>
+            <a:fillRect/>
+          </a:stretch>
+        </p:blipFill>
+        <p:spPr>
+          <a:xfrm>
+            <a:off x="8118052" y="4541319"/>
+            <a:ext cx="3419952" cy="2231621"/>
+          </a:xfrm>
+          <a:prstGeom prst="rect">
+            <a:avLst/>
+          </a:prstGeom>
+        </p:spPr>
+      </p:pic>
+    </p:spTree>
+    <p:extLst>
+      <p:ext uri="{BB962C8B-B14F-4D97-AF65-F5344CB8AC3E}">
+        <p14:creationId xmlns:p14="http://schemas.microsoft.com/office/powerpoint/2010/main" val="1503121974"/>
+      </p:ext>
+    </p:extLst>
+  </p:cSld>
+  <p:clrMapOvr>
+    <a:masterClrMapping/>
+  </p:clrMapOvr>
+</p:sld>
+</file>
+
+<file path=ppt/slides/slide35.xml><?xml version="1.0" encoding="utf-8"?>
 <p:sld xmlns:a="http://schemas.openxmlformats.org/drawingml/2006/main" xmlns:r="http://schemas.openxmlformats.org/officeDocument/2006/relationships" xmlns:p="http://schemas.openxmlformats.org/presentationml/2006/main" showMasterSp="0">
   <p:cSld>
     <p:spTree>

</xml_diff>

<commit_message>
Understanding Margin Collapsing and Removing Default
</commit_message>
<xml_diff>
--- a/PPT/Css-v3.pptx
+++ b/PPT/Css-v3.pptx
@@ -5,7 +5,7 @@
     <p:sldMasterId id="2147483660" r:id="rId1"/>
   </p:sldMasterIdLst>
   <p:notesMasterIdLst>
-    <p:notesMasterId r:id="rId37"/>
+    <p:notesMasterId r:id="rId39"/>
   </p:notesMasterIdLst>
   <p:sldIdLst>
     <p:sldId id="256" r:id="rId2"/>
@@ -42,7 +42,9 @@
     <p:sldId id="394" r:id="rId33"/>
     <p:sldId id="395" r:id="rId34"/>
     <p:sldId id="396" r:id="rId35"/>
-    <p:sldId id="268" r:id="rId36"/>
+    <p:sldId id="397" r:id="rId36"/>
+    <p:sldId id="398" r:id="rId37"/>
+    <p:sldId id="268" r:id="rId38"/>
   </p:sldIdLst>
   <p:sldSz cx="12192000" cy="6858000"/>
   <p:notesSz cx="6858000" cy="9144000"/>
@@ -20137,7 +20139,6 @@
               <a:rPr lang="en-GB" dirty="0"/>
               <a:t>Understanding the Box Model</a:t>
             </a:r>
-            <a:endParaRPr lang="en-GB" dirty="0"/>
           </a:p>
         </p:txBody>
       </p:sp>
@@ -20324,6 +20325,727 @@
 </file>
 
 <file path=ppt/slides/slide35.xml><?xml version="1.0" encoding="utf-8"?>
+<p:sld xmlns:a="http://schemas.openxmlformats.org/drawingml/2006/main" xmlns:r="http://schemas.openxmlformats.org/officeDocument/2006/relationships" xmlns:p="http://schemas.openxmlformats.org/presentationml/2006/main">
+  <p:cSld>
+    <p:spTree>
+      <p:nvGrpSpPr>
+        <p:cNvPr id="1" name=""/>
+        <p:cNvGrpSpPr/>
+        <p:nvPr/>
+      </p:nvGrpSpPr>
+      <p:grpSpPr>
+        <a:xfrm>
+          <a:off x="0" y="0"/>
+          <a:ext cx="0" cy="0"/>
+          <a:chOff x="0" y="0"/>
+          <a:chExt cx="0" cy="0"/>
+        </a:xfrm>
+      </p:grpSpPr>
+      <p:sp>
+        <p:nvSpPr>
+          <p:cNvPr id="2" name="Title 1"/>
+          <p:cNvSpPr>
+            <a:spLocks noGrp="1"/>
+          </p:cNvSpPr>
+          <p:nvPr>
+            <p:ph type="title"/>
+          </p:nvPr>
+        </p:nvSpPr>
+        <p:spPr>
+          <a:xfrm>
+            <a:off x="212652" y="184297"/>
+            <a:ext cx="11844668" cy="730102"/>
+          </a:xfrm>
+        </p:spPr>
+        <p:txBody>
+          <a:bodyPr>
+            <a:normAutofit/>
+          </a:bodyPr>
+          <a:lstStyle/>
+          <a:p>
+            <a:r>
+              <a:rPr lang="en-IN" sz="2800" dirty="0"/>
+              <a:t>Understanding Margin Collapsing and Removing </a:t>
+            </a:r>
+            <a:r>
+              <a:rPr lang="en-IN" sz="2800" dirty="0" smtClean="0"/>
+              <a:t>Default Margins</a:t>
+            </a:r>
+            <a:endParaRPr lang="en-GB" sz="2800" dirty="0"/>
+          </a:p>
+        </p:txBody>
+      </p:sp>
+      <p:sp>
+        <p:nvSpPr>
+          <p:cNvPr id="3" name="Content Placeholder 2"/>
+          <p:cNvSpPr>
+            <a:spLocks noGrp="1"/>
+          </p:cNvSpPr>
+          <p:nvPr>
+            <p:ph idx="1"/>
+          </p:nvPr>
+        </p:nvSpPr>
+        <p:spPr>
+          <a:xfrm>
+            <a:off x="677334" y="914399"/>
+            <a:ext cx="10752666" cy="5126963"/>
+          </a:xfrm>
+        </p:spPr>
+        <p:txBody>
+          <a:bodyPr/>
+          <a:lstStyle/>
+          <a:p>
+            <a:r>
+              <a:rPr lang="en-IN" dirty="0" smtClean="0"/>
+              <a:t>If we inspect our section we will notice some whitespace to the left and right before and after the margin this is coming from the body actually we can see that the body has a default margin of 8px.</a:t>
+            </a:r>
+          </a:p>
+          <a:p>
+            <a:r>
+              <a:rPr lang="en-IN" dirty="0" smtClean="0"/>
+              <a:t>To prevent this we can set the margin of body to 0 and we will notice that the margin for our section tag is from edge to edge now.</a:t>
+            </a:r>
+          </a:p>
+          <a:p>
+            <a:r>
+              <a:rPr lang="en-IN" dirty="0" smtClean="0"/>
+              <a:t>So remember body be default has a margin</a:t>
+            </a:r>
+          </a:p>
+          <a:p>
+            <a:r>
+              <a:rPr lang="en-IN" dirty="0" smtClean="0"/>
+              <a:t>Also if we inspect the h1 tag in the second section we will notice it has a default margin coming from browser defaults but from the top it overlaps the margin from section 1.This behaviour is called Margin collapsing.</a:t>
+            </a:r>
+          </a:p>
+          <a:p>
+            <a:r>
+              <a:rPr lang="en-IN" dirty="0" smtClean="0"/>
+              <a:t>Margin collapsing means if we have two block elements next to each other the margins between them are actually collapsed to one single margin and the bigger margin wins.</a:t>
+            </a:r>
+          </a:p>
+          <a:p>
+            <a:r>
+              <a:rPr lang="en-IN" dirty="0" smtClean="0"/>
+              <a:t>This is not a bug this is enforced by </a:t>
+            </a:r>
+            <a:r>
+              <a:rPr lang="en-IN" dirty="0" err="1" smtClean="0"/>
+              <a:t>css</a:t>
+            </a:r>
+            <a:r>
+              <a:rPr lang="en-IN" dirty="0" smtClean="0"/>
+              <a:t> so that we don’t get big distances between elements.</a:t>
+            </a:r>
+          </a:p>
+          <a:p>
+            <a:r>
+              <a:rPr lang="en-IN" dirty="0" smtClean="0"/>
+              <a:t>To get around this we can specifically use margin-top or margin-bottom so set the appropriate spacing between elements</a:t>
+            </a:r>
+            <a:endParaRPr lang="en-GB" dirty="0"/>
+          </a:p>
+        </p:txBody>
+      </p:sp>
+    </p:spTree>
+    <p:extLst>
+      <p:ext uri="{BB962C8B-B14F-4D97-AF65-F5344CB8AC3E}">
+        <p14:creationId xmlns:p14="http://schemas.microsoft.com/office/powerpoint/2010/main" val="3396106296"/>
+      </p:ext>
+    </p:extLst>
+  </p:cSld>
+  <p:clrMapOvr>
+    <a:masterClrMapping/>
+  </p:clrMapOvr>
+</p:sld>
+</file>
+
+<file path=ppt/slides/slide36.xml><?xml version="1.0" encoding="utf-8"?>
+<p:sld xmlns:a="http://schemas.openxmlformats.org/drawingml/2006/main" xmlns:r="http://schemas.openxmlformats.org/officeDocument/2006/relationships" xmlns:p="http://schemas.openxmlformats.org/presentationml/2006/main">
+  <p:cSld>
+    <p:spTree>
+      <p:nvGrpSpPr>
+        <p:cNvPr id="1" name=""/>
+        <p:cNvGrpSpPr/>
+        <p:nvPr/>
+      </p:nvGrpSpPr>
+      <p:grpSpPr>
+        <a:xfrm>
+          <a:off x="0" y="0"/>
+          <a:ext cx="0" cy="0"/>
+          <a:chOff x="0" y="0"/>
+          <a:chExt cx="0" cy="0"/>
+        </a:xfrm>
+      </p:grpSpPr>
+      <p:sp>
+        <p:nvSpPr>
+          <p:cNvPr id="2" name="Title 1"/>
+          <p:cNvSpPr>
+            <a:spLocks noGrp="1"/>
+          </p:cNvSpPr>
+          <p:nvPr>
+            <p:ph type="title"/>
+          </p:nvPr>
+        </p:nvSpPr>
+        <p:spPr>
+          <a:xfrm>
+            <a:off x="212652" y="0"/>
+            <a:ext cx="11844668" cy="730102"/>
+          </a:xfrm>
+        </p:spPr>
+        <p:txBody>
+          <a:bodyPr>
+            <a:normAutofit/>
+          </a:bodyPr>
+          <a:lstStyle/>
+          <a:p>
+            <a:r>
+              <a:rPr lang="en-IN" sz="2800" dirty="0"/>
+              <a:t>Understanding Margin </a:t>
+            </a:r>
+            <a:r>
+              <a:rPr lang="en-IN" sz="2800" dirty="0" smtClean="0"/>
+              <a:t>Collapsing</a:t>
+            </a:r>
+            <a:endParaRPr lang="en-GB" sz="2800" dirty="0"/>
+          </a:p>
+        </p:txBody>
+      </p:sp>
+      <p:sp>
+        <p:nvSpPr>
+          <p:cNvPr id="5" name="Content Placeholder 4"/>
+          <p:cNvSpPr>
+            <a:spLocks noGrp="1"/>
+          </p:cNvSpPr>
+          <p:nvPr>
+            <p:ph idx="1"/>
+          </p:nvPr>
+        </p:nvSpPr>
+        <p:spPr>
+          <a:xfrm>
+            <a:off x="340242" y="637953"/>
+            <a:ext cx="11589488" cy="5879805"/>
+          </a:xfrm>
+        </p:spPr>
+        <p:txBody>
+          <a:bodyPr>
+            <a:normAutofit lnSpcReduction="10000"/>
+          </a:bodyPr>
+          <a:lstStyle/>
+          <a:p>
+            <a:pPr marL="0" lvl="0" indent="0" defTabSz="914400" eaLnBrk="0" fontAlgn="base" hangingPunct="0">
+              <a:spcBef>
+                <a:spcPct val="0"/>
+              </a:spcBef>
+              <a:spcAft>
+                <a:spcPct val="0"/>
+              </a:spcAft>
+              <a:buClrTx/>
+              <a:buSzTx/>
+              <a:buNone/>
+            </a:pPr>
+            <a:r>
+              <a:rPr lang="en-US" altLang="en-US" dirty="0">
+                <a:solidFill>
+                  <a:srgbClr val="29303B"/>
+                </a:solidFill>
+                <a:latin typeface="Times New Roman" panose="02020603050405020304" pitchFamily="18" charset="0"/>
+                <a:cs typeface="Times New Roman" panose="02020603050405020304" pitchFamily="18" charset="0"/>
+              </a:rPr>
+              <a:t>Three cases arise in Margin </a:t>
+            </a:r>
+            <a:r>
+              <a:rPr lang="en-US" altLang="en-US" dirty="0" smtClean="0">
+                <a:solidFill>
+                  <a:srgbClr val="29303B"/>
+                </a:solidFill>
+                <a:latin typeface="Times New Roman" panose="02020603050405020304" pitchFamily="18" charset="0"/>
+                <a:cs typeface="Times New Roman" panose="02020603050405020304" pitchFamily="18" charset="0"/>
+              </a:rPr>
+              <a:t>collapsing:-</a:t>
+            </a:r>
+            <a:endParaRPr lang="en-US" altLang="en-US" dirty="0">
+              <a:solidFill>
+                <a:srgbClr val="29303B"/>
+              </a:solidFill>
+              <a:latin typeface="Times New Roman" panose="02020603050405020304" pitchFamily="18" charset="0"/>
+              <a:cs typeface="Times New Roman" panose="02020603050405020304" pitchFamily="18" charset="0"/>
+            </a:endParaRPr>
+          </a:p>
+          <a:p>
+            <a:pPr marL="400050" lvl="1" indent="0" defTabSz="914400">
+              <a:buClrTx/>
+              <a:buSzTx/>
+              <a:buFontTx/>
+              <a:buAutoNum type="arabicPeriod"/>
+            </a:pPr>
+            <a:r>
+              <a:rPr lang="en-US" altLang="en-US" dirty="0">
+                <a:solidFill>
+                  <a:srgbClr val="29303B"/>
+                </a:solidFill>
+                <a:latin typeface="Times New Roman" panose="02020603050405020304" pitchFamily="18" charset="0"/>
+                <a:cs typeface="Times New Roman" panose="02020603050405020304" pitchFamily="18" charset="0"/>
+              </a:rPr>
+              <a:t>Adjacent siblings which both have margins</a:t>
+            </a:r>
+          </a:p>
+          <a:p>
+            <a:pPr marL="400050" lvl="1" indent="0" defTabSz="914400">
+              <a:buClrTx/>
+              <a:buSzTx/>
+              <a:buFontTx/>
+              <a:buAutoNum type="arabicPeriod"/>
+            </a:pPr>
+            <a:r>
+              <a:rPr lang="en-US" altLang="en-US" dirty="0">
+                <a:solidFill>
+                  <a:srgbClr val="29303B"/>
+                </a:solidFill>
+                <a:latin typeface="Times New Roman" panose="02020603050405020304" pitchFamily="18" charset="0"/>
+                <a:cs typeface="Times New Roman" panose="02020603050405020304" pitchFamily="18" charset="0"/>
+              </a:rPr>
+              <a:t>A parent which holds one or more child elements where the first and/ or last (or the only) child has margins</a:t>
+            </a:r>
+          </a:p>
+          <a:p>
+            <a:pPr marL="400050" lvl="1" indent="0" defTabSz="914400">
+              <a:buClrTx/>
+              <a:buSzTx/>
+              <a:buFontTx/>
+              <a:buAutoNum type="arabicPeriod"/>
+            </a:pPr>
+            <a:r>
+              <a:rPr lang="en-US" altLang="en-US" dirty="0">
+                <a:solidFill>
+                  <a:srgbClr val="29303B"/>
+                </a:solidFill>
+                <a:latin typeface="Times New Roman" panose="02020603050405020304" pitchFamily="18" charset="0"/>
+                <a:cs typeface="Times New Roman" panose="02020603050405020304" pitchFamily="18" charset="0"/>
+              </a:rPr>
+              <a:t>An element without content, padding, border and height</a:t>
+            </a:r>
+          </a:p>
+          <a:p>
+            <a:pPr marL="400050" lvl="1" indent="0" defTabSz="914400">
+              <a:buClrTx/>
+              <a:buSzTx/>
+              <a:buFontTx/>
+              <a:buAutoNum type="arabicPeriod"/>
+            </a:pPr>
+            <a:endParaRPr lang="en-US" altLang="en-US" dirty="0">
+              <a:solidFill>
+                <a:srgbClr val="29303B"/>
+              </a:solidFill>
+              <a:latin typeface="Times New Roman" panose="02020603050405020304" pitchFamily="18" charset="0"/>
+              <a:cs typeface="Times New Roman" panose="02020603050405020304" pitchFamily="18" charset="0"/>
+            </a:endParaRPr>
+          </a:p>
+          <a:p>
+            <a:pPr marL="0" lvl="0" indent="0" defTabSz="914400" eaLnBrk="0" fontAlgn="base" hangingPunct="0">
+              <a:spcBef>
+                <a:spcPct val="0"/>
+              </a:spcBef>
+              <a:spcAft>
+                <a:spcPct val="0"/>
+              </a:spcAft>
+              <a:buClrTx/>
+              <a:buSzTx/>
+              <a:buNone/>
+            </a:pPr>
+            <a:r>
+              <a:rPr lang="en-US" altLang="en-US" b="1" dirty="0">
+                <a:solidFill>
+                  <a:srgbClr val="29303B"/>
+                </a:solidFill>
+                <a:latin typeface="Times New Roman" panose="02020603050405020304" pitchFamily="18" charset="0"/>
+                <a:cs typeface="Times New Roman" panose="02020603050405020304" pitchFamily="18" charset="0"/>
+              </a:rPr>
+              <a:t>1. Adjacent Siblings</a:t>
+            </a:r>
+            <a:endParaRPr lang="en-US" altLang="en-US" dirty="0">
+              <a:solidFill>
+                <a:schemeClr val="tx1"/>
+              </a:solidFill>
+              <a:latin typeface="Times New Roman" panose="02020603050405020304" pitchFamily="18" charset="0"/>
+              <a:cs typeface="Times New Roman" panose="02020603050405020304" pitchFamily="18" charset="0"/>
+            </a:endParaRPr>
+          </a:p>
+          <a:p>
+            <a:pPr marL="0" lvl="0" indent="0" defTabSz="914400" eaLnBrk="0" fontAlgn="base" hangingPunct="0">
+              <a:spcBef>
+                <a:spcPct val="0"/>
+              </a:spcBef>
+              <a:spcAft>
+                <a:spcPct val="0"/>
+              </a:spcAft>
+              <a:buClrTx/>
+              <a:buSzTx/>
+              <a:buNone/>
+            </a:pPr>
+            <a:r>
+              <a:rPr lang="en-US" altLang="en-US" dirty="0">
+                <a:solidFill>
+                  <a:srgbClr val="29303B"/>
+                </a:solidFill>
+                <a:latin typeface="Times New Roman" panose="02020603050405020304" pitchFamily="18" charset="0"/>
+                <a:cs typeface="Times New Roman" panose="02020603050405020304" pitchFamily="18" charset="0"/>
+              </a:rPr>
+              <a:t>In this case, the first element might have a margin of </a:t>
+            </a:r>
+            <a:r>
+              <a:rPr lang="en-US" altLang="en-US" dirty="0">
+                <a:solidFill>
+                  <a:srgbClr val="EC5252"/>
+                </a:solidFill>
+                <a:latin typeface="Times New Roman" panose="02020603050405020304" pitchFamily="18" charset="0"/>
+                <a:cs typeface="Times New Roman" panose="02020603050405020304" pitchFamily="18" charset="0"/>
+              </a:rPr>
+              <a:t>10px</a:t>
+            </a:r>
+            <a:r>
+              <a:rPr lang="en-US" altLang="en-US" dirty="0">
+                <a:solidFill>
+                  <a:srgbClr val="29303B"/>
+                </a:solidFill>
+                <a:latin typeface="Times New Roman" panose="02020603050405020304" pitchFamily="18" charset="0"/>
+                <a:cs typeface="Times New Roman" panose="02020603050405020304" pitchFamily="18" charset="0"/>
+              </a:rPr>
+              <a:t>  (on all sides let's say) and the second one has </a:t>
+            </a:r>
+            <a:r>
+              <a:rPr lang="en-US" altLang="en-US" dirty="0">
+                <a:solidFill>
+                  <a:srgbClr val="EC5252"/>
+                </a:solidFill>
+                <a:latin typeface="Times New Roman" panose="02020603050405020304" pitchFamily="18" charset="0"/>
+                <a:cs typeface="Times New Roman" panose="02020603050405020304" pitchFamily="18" charset="0"/>
+              </a:rPr>
+              <a:t>5px</a:t>
+            </a:r>
+            <a:r>
+              <a:rPr lang="en-US" altLang="en-US" dirty="0">
+                <a:solidFill>
+                  <a:srgbClr val="29303B"/>
+                </a:solidFill>
+                <a:latin typeface="Times New Roman" panose="02020603050405020304" pitchFamily="18" charset="0"/>
+                <a:cs typeface="Times New Roman" panose="02020603050405020304" pitchFamily="18" charset="0"/>
+              </a:rPr>
+              <a:t>  (or </a:t>
+            </a:r>
+            <a:r>
+              <a:rPr lang="en-US" altLang="en-US" dirty="0">
+                <a:solidFill>
+                  <a:srgbClr val="EC5252"/>
+                </a:solidFill>
+                <a:latin typeface="Times New Roman" panose="02020603050405020304" pitchFamily="18" charset="0"/>
+                <a:cs typeface="Times New Roman" panose="02020603050405020304" pitchFamily="18" charset="0"/>
+              </a:rPr>
+              <a:t>20px</a:t>
+            </a:r>
+            <a:r>
+              <a:rPr lang="en-US" altLang="en-US" dirty="0">
+                <a:solidFill>
+                  <a:srgbClr val="29303B"/>
+                </a:solidFill>
+                <a:latin typeface="Times New Roman" panose="02020603050405020304" pitchFamily="18" charset="0"/>
+                <a:cs typeface="Times New Roman" panose="02020603050405020304" pitchFamily="18" charset="0"/>
+              </a:rPr>
+              <a:t>  - the values don't matter).</a:t>
+            </a:r>
+            <a:endParaRPr lang="en-US" altLang="en-US" dirty="0">
+              <a:solidFill>
+                <a:schemeClr val="tx1"/>
+              </a:solidFill>
+              <a:latin typeface="Times New Roman" panose="02020603050405020304" pitchFamily="18" charset="0"/>
+              <a:cs typeface="Times New Roman" panose="02020603050405020304" pitchFamily="18" charset="0"/>
+            </a:endParaRPr>
+          </a:p>
+          <a:p>
+            <a:pPr marL="0" lvl="0" indent="0" defTabSz="914400" eaLnBrk="0" fontAlgn="base" hangingPunct="0">
+              <a:spcBef>
+                <a:spcPct val="0"/>
+              </a:spcBef>
+              <a:spcAft>
+                <a:spcPct val="0"/>
+              </a:spcAft>
+              <a:buClrTx/>
+              <a:buSzTx/>
+              <a:buNone/>
+            </a:pPr>
+            <a:r>
+              <a:rPr lang="en-US" altLang="en-US" dirty="0">
+                <a:solidFill>
+                  <a:srgbClr val="29303B"/>
+                </a:solidFill>
+                <a:latin typeface="Times New Roman" panose="02020603050405020304" pitchFamily="18" charset="0"/>
+                <a:cs typeface="Times New Roman" panose="02020603050405020304" pitchFamily="18" charset="0"/>
+              </a:rPr>
+              <a:t>CSS will collapse the margins and only add the bigger one between the elements. So if we got margins of </a:t>
+            </a:r>
+            <a:r>
+              <a:rPr lang="en-US" altLang="en-US" dirty="0">
+                <a:solidFill>
+                  <a:srgbClr val="EC5252"/>
+                </a:solidFill>
+                <a:latin typeface="Times New Roman" panose="02020603050405020304" pitchFamily="18" charset="0"/>
+                <a:cs typeface="Times New Roman" panose="02020603050405020304" pitchFamily="18" charset="0"/>
+              </a:rPr>
+              <a:t>10px</a:t>
+            </a:r>
+            <a:r>
+              <a:rPr lang="en-US" altLang="en-US" dirty="0">
+                <a:solidFill>
+                  <a:srgbClr val="29303B"/>
+                </a:solidFill>
+                <a:latin typeface="Times New Roman" panose="02020603050405020304" pitchFamily="18" charset="0"/>
+                <a:cs typeface="Times New Roman" panose="02020603050405020304" pitchFamily="18" charset="0"/>
+              </a:rPr>
+              <a:t>  and </a:t>
+            </a:r>
+            <a:r>
+              <a:rPr lang="en-US" altLang="en-US" dirty="0">
+                <a:solidFill>
+                  <a:srgbClr val="EC5252"/>
+                </a:solidFill>
+                <a:latin typeface="Times New Roman" panose="02020603050405020304" pitchFamily="18" charset="0"/>
+                <a:cs typeface="Times New Roman" panose="02020603050405020304" pitchFamily="18" charset="0"/>
+              </a:rPr>
+              <a:t>5px</a:t>
+            </a:r>
+            <a:r>
+              <a:rPr lang="en-US" altLang="en-US" dirty="0">
+                <a:solidFill>
+                  <a:srgbClr val="29303B"/>
+                </a:solidFill>
+                <a:latin typeface="Times New Roman" panose="02020603050405020304" pitchFamily="18" charset="0"/>
+                <a:cs typeface="Times New Roman" panose="02020603050405020304" pitchFamily="18" charset="0"/>
+              </a:rPr>
+              <a:t> , a </a:t>
+            </a:r>
+            <a:r>
+              <a:rPr lang="en-US" altLang="en-US" dirty="0">
+                <a:solidFill>
+                  <a:srgbClr val="EC5252"/>
+                </a:solidFill>
+                <a:latin typeface="Times New Roman" panose="02020603050405020304" pitchFamily="18" charset="0"/>
+                <a:cs typeface="Times New Roman" panose="02020603050405020304" pitchFamily="18" charset="0"/>
+              </a:rPr>
+              <a:t>10px</a:t>
+            </a:r>
+            <a:r>
+              <a:rPr lang="en-US" altLang="en-US" dirty="0">
+                <a:solidFill>
+                  <a:srgbClr val="29303B"/>
+                </a:solidFill>
+                <a:latin typeface="Times New Roman" panose="02020603050405020304" pitchFamily="18" charset="0"/>
+                <a:cs typeface="Times New Roman" panose="02020603050405020304" pitchFamily="18" charset="0"/>
+              </a:rPr>
+              <a:t>  margin would be added between the elements?</a:t>
+            </a:r>
+          </a:p>
+          <a:p>
+            <a:pPr marL="0" lvl="0" indent="0" defTabSz="914400" eaLnBrk="0" fontAlgn="base" hangingPunct="0">
+              <a:spcBef>
+                <a:spcPct val="0"/>
+              </a:spcBef>
+              <a:spcAft>
+                <a:spcPct val="0"/>
+              </a:spcAft>
+              <a:buClrTx/>
+              <a:buSzTx/>
+              <a:buNone/>
+            </a:pPr>
+            <a:endParaRPr lang="en-US" altLang="en-US" dirty="0">
+              <a:solidFill>
+                <a:schemeClr val="tx1"/>
+              </a:solidFill>
+              <a:latin typeface="Times New Roman" panose="02020603050405020304" pitchFamily="18" charset="0"/>
+              <a:cs typeface="Times New Roman" panose="02020603050405020304" pitchFamily="18" charset="0"/>
+            </a:endParaRPr>
+          </a:p>
+          <a:p>
+            <a:pPr marL="0" lvl="0" indent="0" defTabSz="914400" eaLnBrk="0" fontAlgn="base" hangingPunct="0">
+              <a:spcBef>
+                <a:spcPct val="0"/>
+              </a:spcBef>
+              <a:spcAft>
+                <a:spcPct val="0"/>
+              </a:spcAft>
+              <a:buClrTx/>
+              <a:buSzTx/>
+              <a:buNone/>
+            </a:pPr>
+            <a:r>
+              <a:rPr lang="en-US" altLang="en-US" b="1" dirty="0">
+                <a:solidFill>
+                  <a:srgbClr val="29303B"/>
+                </a:solidFill>
+                <a:latin typeface="Times New Roman" panose="02020603050405020304" pitchFamily="18" charset="0"/>
+                <a:cs typeface="Times New Roman" panose="02020603050405020304" pitchFamily="18" charset="0"/>
+              </a:rPr>
+              <a:t>2. A parent with children that have a margin</a:t>
+            </a:r>
+            <a:endParaRPr lang="en-US" altLang="en-US" dirty="0">
+              <a:solidFill>
+                <a:schemeClr val="tx1"/>
+              </a:solidFill>
+              <a:latin typeface="Times New Roman" panose="02020603050405020304" pitchFamily="18" charset="0"/>
+              <a:cs typeface="Times New Roman" panose="02020603050405020304" pitchFamily="18" charset="0"/>
+            </a:endParaRPr>
+          </a:p>
+          <a:p>
+            <a:pPr marL="0" lvl="0" indent="0" defTabSz="914400" eaLnBrk="0" fontAlgn="base" hangingPunct="0">
+              <a:spcBef>
+                <a:spcPct val="0"/>
+              </a:spcBef>
+              <a:spcAft>
+                <a:spcPct val="0"/>
+              </a:spcAft>
+              <a:buClrTx/>
+              <a:buSzTx/>
+              <a:buNone/>
+            </a:pPr>
+            <a:r>
+              <a:rPr lang="en-US" altLang="en-US" dirty="0">
+                <a:solidFill>
+                  <a:srgbClr val="29303B"/>
+                </a:solidFill>
+                <a:latin typeface="Times New Roman" panose="02020603050405020304" pitchFamily="18" charset="0"/>
+                <a:cs typeface="Times New Roman" panose="02020603050405020304" pitchFamily="18" charset="0"/>
+              </a:rPr>
+              <a:t>To be precise, the first and/ or last or the only child has to have margins (top and/ or bottom). In that case, the parent elements margin will collapse with the child element(s)' margins. Again, the bigger margin wins and will be applied to the parent element.</a:t>
+            </a:r>
+            <a:endParaRPr lang="en-US" altLang="en-US" dirty="0">
+              <a:solidFill>
+                <a:schemeClr val="tx1"/>
+              </a:solidFill>
+              <a:latin typeface="Times New Roman" panose="02020603050405020304" pitchFamily="18" charset="0"/>
+              <a:cs typeface="Times New Roman" panose="02020603050405020304" pitchFamily="18" charset="0"/>
+            </a:endParaRPr>
+          </a:p>
+          <a:p>
+            <a:pPr marL="0" lvl="0" indent="0" defTabSz="914400" eaLnBrk="0" fontAlgn="base" hangingPunct="0">
+              <a:spcBef>
+                <a:spcPct val="0"/>
+              </a:spcBef>
+              <a:spcAft>
+                <a:spcPct val="0"/>
+              </a:spcAft>
+              <a:buClrTx/>
+              <a:buSzTx/>
+              <a:buNone/>
+            </a:pPr>
+            <a:r>
+              <a:rPr lang="en-US" altLang="en-US" dirty="0">
+                <a:solidFill>
+                  <a:srgbClr val="29303B"/>
+                </a:solidFill>
+                <a:latin typeface="Times New Roman" panose="02020603050405020304" pitchFamily="18" charset="0"/>
+                <a:cs typeface="Times New Roman" panose="02020603050405020304" pitchFamily="18" charset="0"/>
+              </a:rPr>
+              <a:t>If the parent element has padding, inline content (other than the child elements) or a border, this behavior should not occur, the child margin will instead be added to the content of the wrapping parent element.</a:t>
+            </a:r>
+          </a:p>
+          <a:p>
+            <a:pPr marL="0" lvl="0" indent="0" defTabSz="914400" eaLnBrk="0" fontAlgn="base" hangingPunct="0">
+              <a:spcBef>
+                <a:spcPct val="0"/>
+              </a:spcBef>
+              <a:spcAft>
+                <a:spcPct val="0"/>
+              </a:spcAft>
+              <a:buClrTx/>
+              <a:buSzTx/>
+              <a:buNone/>
+            </a:pPr>
+            <a:endParaRPr lang="en-US" altLang="en-US" dirty="0">
+              <a:solidFill>
+                <a:schemeClr val="tx1"/>
+              </a:solidFill>
+              <a:latin typeface="Times New Roman" panose="02020603050405020304" pitchFamily="18" charset="0"/>
+              <a:cs typeface="Times New Roman" panose="02020603050405020304" pitchFamily="18" charset="0"/>
+            </a:endParaRPr>
+          </a:p>
+          <a:p>
+            <a:pPr marL="0" lvl="0" indent="0" defTabSz="914400" eaLnBrk="0" fontAlgn="base" hangingPunct="0">
+              <a:spcBef>
+                <a:spcPct val="0"/>
+              </a:spcBef>
+              <a:spcAft>
+                <a:spcPct val="0"/>
+              </a:spcAft>
+              <a:buClrTx/>
+              <a:buSzTx/>
+              <a:buNone/>
+            </a:pPr>
+            <a:r>
+              <a:rPr lang="en-US" altLang="en-US" b="1" dirty="0">
+                <a:solidFill>
+                  <a:srgbClr val="29303B"/>
+                </a:solidFill>
+                <a:latin typeface="Times New Roman" panose="02020603050405020304" pitchFamily="18" charset="0"/>
+                <a:cs typeface="Times New Roman" panose="02020603050405020304" pitchFamily="18" charset="0"/>
+              </a:rPr>
+              <a:t>3. An empty element with margins</a:t>
+            </a:r>
+            <a:endParaRPr lang="en-US" altLang="en-US" dirty="0">
+              <a:solidFill>
+                <a:schemeClr val="tx1"/>
+              </a:solidFill>
+              <a:latin typeface="Times New Roman" panose="02020603050405020304" pitchFamily="18" charset="0"/>
+              <a:cs typeface="Times New Roman" panose="02020603050405020304" pitchFamily="18" charset="0"/>
+            </a:endParaRPr>
+          </a:p>
+          <a:p>
+            <a:pPr marL="0" lvl="0" indent="0" defTabSz="914400" eaLnBrk="0" fontAlgn="base" hangingPunct="0">
+              <a:spcBef>
+                <a:spcPct val="0"/>
+              </a:spcBef>
+              <a:spcAft>
+                <a:spcPct val="0"/>
+              </a:spcAft>
+              <a:buClrTx/>
+              <a:buSzTx/>
+              <a:buNone/>
+            </a:pPr>
+            <a:r>
+              <a:rPr lang="en-US" altLang="en-US" dirty="0">
+                <a:solidFill>
+                  <a:srgbClr val="29303B"/>
+                </a:solidFill>
+                <a:latin typeface="Times New Roman" panose="02020603050405020304" pitchFamily="18" charset="0"/>
+                <a:cs typeface="Times New Roman" panose="02020603050405020304" pitchFamily="18" charset="0"/>
+              </a:rPr>
+              <a:t>This case probably doesn't occur that often but if you got an element with no content, no padding, no border and no height, then the top and bottom margin will be merged into one single margin. Again, the bigger one wins.</a:t>
+            </a:r>
+            <a:endParaRPr lang="en-US" altLang="en-US" dirty="0">
+              <a:solidFill>
+                <a:schemeClr val="tx1"/>
+              </a:solidFill>
+              <a:latin typeface="Times New Roman" panose="02020603050405020304" pitchFamily="18" charset="0"/>
+              <a:cs typeface="Times New Roman" panose="02020603050405020304" pitchFamily="18" charset="0"/>
+            </a:endParaRPr>
+          </a:p>
+          <a:p>
+            <a:endParaRPr lang="en-GB" dirty="0"/>
+          </a:p>
+        </p:txBody>
+      </p:sp>
+    </p:spTree>
+    <p:extLst>
+      <p:ext uri="{BB962C8B-B14F-4D97-AF65-F5344CB8AC3E}">
+        <p14:creationId xmlns:p14="http://schemas.microsoft.com/office/powerpoint/2010/main" val="2277099927"/>
+      </p:ext>
+    </p:extLst>
+  </p:cSld>
+  <p:clrMapOvr>
+    <a:masterClrMapping/>
+  </p:clrMapOvr>
+</p:sld>
+</file>
+
+<file path=ppt/slides/slide37.xml><?xml version="1.0" encoding="utf-8"?>
 <p:sld xmlns:a="http://schemas.openxmlformats.org/drawingml/2006/main" xmlns:r="http://schemas.openxmlformats.org/officeDocument/2006/relationships" xmlns:p="http://schemas.openxmlformats.org/presentationml/2006/main" showMasterSp="0">
   <p:cSld>
     <p:spTree>

</xml_diff>

<commit_message>
Working with Shorthand Properties
</commit_message>
<xml_diff>
--- a/PPT/Css-v3.pptx
+++ b/PPT/Css-v3.pptx
@@ -5,7 +5,7 @@
     <p:sldMasterId id="2147483660" r:id="rId1"/>
   </p:sldMasterIdLst>
   <p:notesMasterIdLst>
-    <p:notesMasterId r:id="rId39"/>
+    <p:notesMasterId r:id="rId41"/>
   </p:notesMasterIdLst>
   <p:sldIdLst>
     <p:sldId id="256" r:id="rId2"/>
@@ -44,7 +44,9 @@
     <p:sldId id="396" r:id="rId35"/>
     <p:sldId id="397" r:id="rId36"/>
     <p:sldId id="398" r:id="rId37"/>
-    <p:sldId id="268" r:id="rId38"/>
+    <p:sldId id="399" r:id="rId38"/>
+    <p:sldId id="401" r:id="rId39"/>
+    <p:sldId id="268" r:id="rId40"/>
   </p:sldIdLst>
   <p:sldSz cx="12192000" cy="6858000"/>
   <p:notesSz cx="6858000" cy="9144000"/>
@@ -691,6 +693,210 @@
     <p:extLst>
       <p:ext uri="{BB962C8B-B14F-4D97-AF65-F5344CB8AC3E}">
         <p14:creationId xmlns:p14="http://schemas.microsoft.com/office/powerpoint/2010/main" val="2383119555"/>
+      </p:ext>
+    </p:extLst>
+  </p:cSld>
+  <p:clrMapOvr>
+    <a:masterClrMapping/>
+  </p:clrMapOvr>
+</p:notes>
+</file>
+
+<file path=ppt/notesSlides/notesSlide11.xml><?xml version="1.0" encoding="utf-8"?>
+<p:notes xmlns:a="http://schemas.openxmlformats.org/drawingml/2006/main" xmlns:r="http://schemas.openxmlformats.org/officeDocument/2006/relationships" xmlns:p="http://schemas.openxmlformats.org/presentationml/2006/main">
+  <p:cSld>
+    <p:spTree>
+      <p:nvGrpSpPr>
+        <p:cNvPr id="1" name=""/>
+        <p:cNvGrpSpPr/>
+        <p:nvPr/>
+      </p:nvGrpSpPr>
+      <p:grpSpPr>
+        <a:xfrm>
+          <a:off x="0" y="0"/>
+          <a:ext cx="0" cy="0"/>
+          <a:chOff x="0" y="0"/>
+          <a:chExt cx="0" cy="0"/>
+        </a:xfrm>
+      </p:grpSpPr>
+      <p:sp>
+        <p:nvSpPr>
+          <p:cNvPr id="2" name="Slide Image Placeholder 1"/>
+          <p:cNvSpPr>
+            <a:spLocks noGrp="1" noRot="1" noChangeAspect="1"/>
+          </p:cNvSpPr>
+          <p:nvPr>
+            <p:ph type="sldImg"/>
+          </p:nvPr>
+        </p:nvSpPr>
+        <p:spPr/>
+      </p:sp>
+      <p:sp>
+        <p:nvSpPr>
+          <p:cNvPr id="3" name="Notes Placeholder 2"/>
+          <p:cNvSpPr>
+            <a:spLocks noGrp="1"/>
+          </p:cNvSpPr>
+          <p:nvPr>
+            <p:ph type="body" idx="1"/>
+          </p:nvPr>
+        </p:nvSpPr>
+        <p:spPr/>
+        <p:txBody>
+          <a:bodyPr/>
+          <a:lstStyle/>
+          <a:p>
+            <a:r>
+              <a:rPr lang="en-IN" dirty="0" smtClean="0"/>
+              <a:t>The sequence of </a:t>
+            </a:r>
+            <a:r>
+              <a:rPr lang="en-IN" dirty="0" err="1" smtClean="0"/>
+              <a:t>indivisual</a:t>
+            </a:r>
+            <a:r>
+              <a:rPr lang="en-IN" dirty="0" smtClean="0"/>
+              <a:t> properties does not matter if they have different type of values.</a:t>
+            </a:r>
+          </a:p>
+          <a:p>
+            <a:r>
+              <a:rPr lang="en-IN" dirty="0" smtClean="0"/>
+              <a:t>If they have similar type of values special handling is needed that we will study in upcoming slides</a:t>
+            </a:r>
+          </a:p>
+          <a:p>
+            <a:r>
+              <a:rPr lang="en-IN" dirty="0" smtClean="0"/>
+              <a:t>We can use shorthand to set only maybe just one property like</a:t>
+            </a:r>
+            <a:r>
+              <a:rPr lang="en-IN" baseline="0" dirty="0" smtClean="0"/>
+              <a:t> border </a:t>
+            </a:r>
+            <a:r>
+              <a:rPr lang="en-IN" baseline="0" dirty="0" err="1" smtClean="0"/>
+              <a:t>color</a:t>
+            </a:r>
+            <a:r>
+              <a:rPr lang="en-IN" baseline="0" dirty="0" smtClean="0"/>
+              <a:t> and all other properties take default values</a:t>
+            </a:r>
+            <a:endParaRPr lang="en-GB" dirty="0"/>
+          </a:p>
+        </p:txBody>
+      </p:sp>
+      <p:sp>
+        <p:nvSpPr>
+          <p:cNvPr id="4" name="Slide Number Placeholder 3"/>
+          <p:cNvSpPr>
+            <a:spLocks noGrp="1"/>
+          </p:cNvSpPr>
+          <p:nvPr>
+            <p:ph type="sldNum" sz="quarter" idx="10"/>
+          </p:nvPr>
+        </p:nvSpPr>
+        <p:spPr/>
+        <p:txBody>
+          <a:bodyPr/>
+          <a:lstStyle/>
+          <a:p>
+            <a:fld id="{D3B79ED6-4970-4D84-B25C-F520A9D9210C}" type="slidenum">
+              <a:rPr lang="en-GB" smtClean="0"/>
+              <a:t>37</a:t>
+            </a:fld>
+            <a:endParaRPr lang="en-GB"/>
+          </a:p>
+        </p:txBody>
+      </p:sp>
+    </p:spTree>
+    <p:extLst>
+      <p:ext uri="{BB962C8B-B14F-4D97-AF65-F5344CB8AC3E}">
+        <p14:creationId xmlns:p14="http://schemas.microsoft.com/office/powerpoint/2010/main" val="828542173"/>
+      </p:ext>
+    </p:extLst>
+  </p:cSld>
+  <p:clrMapOvr>
+    <a:masterClrMapping/>
+  </p:clrMapOvr>
+</p:notes>
+</file>
+
+<file path=ppt/notesSlides/notesSlide12.xml><?xml version="1.0" encoding="utf-8"?>
+<p:notes xmlns:a="http://schemas.openxmlformats.org/drawingml/2006/main" xmlns:r="http://schemas.openxmlformats.org/officeDocument/2006/relationships" xmlns:p="http://schemas.openxmlformats.org/presentationml/2006/main">
+  <p:cSld>
+    <p:spTree>
+      <p:nvGrpSpPr>
+        <p:cNvPr id="1" name=""/>
+        <p:cNvGrpSpPr/>
+        <p:nvPr/>
+      </p:nvGrpSpPr>
+      <p:grpSpPr>
+        <a:xfrm>
+          <a:off x="0" y="0"/>
+          <a:ext cx="0" cy="0"/>
+          <a:chOff x="0" y="0"/>
+          <a:chExt cx="0" cy="0"/>
+        </a:xfrm>
+      </p:grpSpPr>
+      <p:sp>
+        <p:nvSpPr>
+          <p:cNvPr id="2" name="Slide Image Placeholder 1"/>
+          <p:cNvSpPr>
+            <a:spLocks noGrp="1" noRot="1" noChangeAspect="1"/>
+          </p:cNvSpPr>
+          <p:nvPr>
+            <p:ph type="sldImg"/>
+          </p:nvPr>
+        </p:nvSpPr>
+        <p:spPr/>
+      </p:sp>
+      <p:sp>
+        <p:nvSpPr>
+          <p:cNvPr id="3" name="Notes Placeholder 2"/>
+          <p:cNvSpPr>
+            <a:spLocks noGrp="1"/>
+          </p:cNvSpPr>
+          <p:nvPr>
+            <p:ph type="body" idx="1"/>
+          </p:nvPr>
+        </p:nvSpPr>
+        <p:spPr/>
+        <p:txBody>
+          <a:bodyPr/>
+          <a:lstStyle/>
+          <a:p>
+            <a:endParaRPr lang="en-GB" dirty="0"/>
+          </a:p>
+        </p:txBody>
+      </p:sp>
+      <p:sp>
+        <p:nvSpPr>
+          <p:cNvPr id="4" name="Slide Number Placeholder 3"/>
+          <p:cNvSpPr>
+            <a:spLocks noGrp="1"/>
+          </p:cNvSpPr>
+          <p:nvPr>
+            <p:ph type="sldNum" sz="quarter" idx="10"/>
+          </p:nvPr>
+        </p:nvSpPr>
+        <p:spPr/>
+        <p:txBody>
+          <a:bodyPr/>
+          <a:lstStyle/>
+          <a:p>
+            <a:fld id="{D3B79ED6-4970-4D84-B25C-F520A9D9210C}" type="slidenum">
+              <a:rPr lang="en-GB" smtClean="0"/>
+              <a:t>38</a:t>
+            </a:fld>
+            <a:endParaRPr lang="en-GB"/>
+          </a:p>
+        </p:txBody>
+      </p:sp>
+    </p:spTree>
+    <p:extLst>
+      <p:ext uri="{BB962C8B-B14F-4D97-AF65-F5344CB8AC3E}">
+        <p14:creationId xmlns:p14="http://schemas.microsoft.com/office/powerpoint/2010/main" val="2105237002"/>
       </p:ext>
     </p:extLst>
   </p:cSld>
@@ -21046,6 +21252,1853 @@
 </file>
 
 <file path=ppt/slides/slide37.xml><?xml version="1.0" encoding="utf-8"?>
+<p:sld xmlns:a="http://schemas.openxmlformats.org/drawingml/2006/main" xmlns:r="http://schemas.openxmlformats.org/officeDocument/2006/relationships" xmlns:p="http://schemas.openxmlformats.org/presentationml/2006/main">
+  <p:cSld>
+    <p:spTree>
+      <p:nvGrpSpPr>
+        <p:cNvPr id="1" name=""/>
+        <p:cNvGrpSpPr/>
+        <p:nvPr/>
+      </p:nvGrpSpPr>
+      <p:grpSpPr>
+        <a:xfrm>
+          <a:off x="0" y="0"/>
+          <a:ext cx="0" cy="0"/>
+          <a:chOff x="0" y="0"/>
+          <a:chExt cx="0" cy="0"/>
+        </a:xfrm>
+      </p:grpSpPr>
+      <p:sp>
+        <p:nvSpPr>
+          <p:cNvPr id="2" name="Title 1"/>
+          <p:cNvSpPr>
+            <a:spLocks noGrp="1"/>
+          </p:cNvSpPr>
+          <p:nvPr>
+            <p:ph type="title"/>
+          </p:nvPr>
+        </p:nvSpPr>
+        <p:spPr>
+          <a:xfrm>
+            <a:off x="677334" y="109870"/>
+            <a:ext cx="8596668" cy="613144"/>
+          </a:xfrm>
+        </p:spPr>
+        <p:txBody>
+          <a:bodyPr>
+            <a:normAutofit fontScale="90000"/>
+          </a:bodyPr>
+          <a:lstStyle/>
+          <a:p>
+            <a:r>
+              <a:rPr lang="en-GB" dirty="0"/>
+              <a:t>Working with Shorthand Properties</a:t>
+            </a:r>
+            <a:endParaRPr lang="en-GB" dirty="0"/>
+          </a:p>
+        </p:txBody>
+      </p:sp>
+      <p:sp>
+        <p:nvSpPr>
+          <p:cNvPr id="3" name="Content Placeholder 2"/>
+          <p:cNvSpPr>
+            <a:spLocks noGrp="1"/>
+          </p:cNvSpPr>
+          <p:nvPr>
+            <p:ph idx="1"/>
+          </p:nvPr>
+        </p:nvSpPr>
+        <p:spPr>
+          <a:xfrm>
+            <a:off x="308344" y="946299"/>
+            <a:ext cx="11206716" cy="5095064"/>
+          </a:xfrm>
+        </p:spPr>
+        <p:txBody>
+          <a:bodyPr/>
+          <a:lstStyle/>
+          <a:p>
+            <a:r>
+              <a:rPr lang="en-IN" dirty="0" smtClean="0"/>
+              <a:t>Shorthand properties help us to combine values of multiple properties in a single property .</a:t>
+            </a:r>
+          </a:p>
+          <a:p>
+            <a:endParaRPr lang="en-GB" dirty="0"/>
+          </a:p>
+        </p:txBody>
+      </p:sp>
+      <p:sp>
+        <p:nvSpPr>
+          <p:cNvPr id="5" name="Rectangle 4"/>
+          <p:cNvSpPr/>
+          <p:nvPr/>
+        </p:nvSpPr>
+        <p:spPr>
+          <a:xfrm>
+            <a:off x="754911" y="1605513"/>
+            <a:ext cx="2806995" cy="1222744"/>
+          </a:xfrm>
+          <a:prstGeom prst="rect">
+            <a:avLst/>
+          </a:prstGeom>
+          <a:solidFill>
+            <a:srgbClr val="7131A1"/>
+          </a:solidFill>
+        </p:spPr>
+        <p:style>
+          <a:lnRef idx="2">
+            <a:schemeClr val="accent1">
+              <a:shade val="50000"/>
+            </a:schemeClr>
+          </a:lnRef>
+          <a:fillRef idx="1">
+            <a:schemeClr val="accent1"/>
+          </a:fillRef>
+          <a:effectRef idx="0">
+            <a:schemeClr val="accent1"/>
+          </a:effectRef>
+          <a:fontRef idx="minor">
+            <a:schemeClr val="lt1"/>
+          </a:fontRef>
+        </p:style>
+        <p:txBody>
+          <a:bodyPr rtlCol="0" anchor="ctr"/>
+          <a:lstStyle/>
+          <a:p>
+            <a:r>
+              <a:rPr lang="en-IN" dirty="0" smtClean="0"/>
+              <a:t>border-width:2px</a:t>
+            </a:r>
+          </a:p>
+          <a:p>
+            <a:r>
+              <a:rPr lang="en-IN" dirty="0" smtClean="0"/>
+              <a:t>border-style :solid</a:t>
+            </a:r>
+          </a:p>
+          <a:p>
+            <a:r>
+              <a:rPr lang="en-IN" dirty="0" smtClean="0"/>
+              <a:t>border-</a:t>
+            </a:r>
+            <a:r>
+              <a:rPr lang="en-IN" dirty="0" err="1" smtClean="0"/>
+              <a:t>color</a:t>
+            </a:r>
+            <a:r>
+              <a:rPr lang="en-IN" dirty="0" smtClean="0"/>
+              <a:t>: orange</a:t>
+            </a:r>
+          </a:p>
+          <a:p>
+            <a:pPr algn="ctr"/>
+            <a:endParaRPr lang="en-GB" dirty="0"/>
+          </a:p>
+        </p:txBody>
+      </p:sp>
+      <p:sp>
+        <p:nvSpPr>
+          <p:cNvPr id="6" name="Rectangle 5"/>
+          <p:cNvSpPr/>
+          <p:nvPr/>
+        </p:nvSpPr>
+        <p:spPr>
+          <a:xfrm>
+            <a:off x="6039293" y="1669308"/>
+            <a:ext cx="4933507" cy="1095153"/>
+          </a:xfrm>
+          <a:prstGeom prst="rect">
+            <a:avLst/>
+          </a:prstGeom>
+          <a:solidFill>
+            <a:srgbClr val="7E37B3"/>
+          </a:solidFill>
+        </p:spPr>
+        <p:style>
+          <a:lnRef idx="2">
+            <a:schemeClr val="accent1">
+              <a:shade val="50000"/>
+            </a:schemeClr>
+          </a:lnRef>
+          <a:fillRef idx="1">
+            <a:schemeClr val="accent1"/>
+          </a:fillRef>
+          <a:effectRef idx="0">
+            <a:schemeClr val="accent1"/>
+          </a:effectRef>
+          <a:fontRef idx="minor">
+            <a:schemeClr val="lt1"/>
+          </a:fontRef>
+        </p:style>
+        <p:txBody>
+          <a:bodyPr rtlCol="0" anchor="ctr"/>
+          <a:lstStyle/>
+          <a:p>
+            <a:pPr algn="ctr"/>
+            <a:r>
+              <a:rPr lang="en-IN" dirty="0"/>
+              <a:t>b</a:t>
+            </a:r>
+            <a:r>
+              <a:rPr lang="en-IN" dirty="0" smtClean="0"/>
+              <a:t>order : 2px solid orange</a:t>
+            </a:r>
+            <a:endParaRPr lang="en-GB" dirty="0"/>
+          </a:p>
+        </p:txBody>
+      </p:sp>
+      <p:cxnSp>
+        <p:nvCxnSpPr>
+          <p:cNvPr id="8" name="Straight Arrow Connector 7"/>
+          <p:cNvCxnSpPr/>
+          <p:nvPr/>
+        </p:nvCxnSpPr>
+        <p:spPr>
+          <a:xfrm flipV="1">
+            <a:off x="3561906" y="2222201"/>
+            <a:ext cx="2413592" cy="10633"/>
+          </a:xfrm>
+          <a:prstGeom prst="straightConnector1">
+            <a:avLst/>
+          </a:prstGeom>
+          <a:ln w="38100">
+            <a:tailEnd type="triangle"/>
+          </a:ln>
+        </p:spPr>
+        <p:style>
+          <a:lnRef idx="1">
+            <a:schemeClr val="dk1"/>
+          </a:lnRef>
+          <a:fillRef idx="0">
+            <a:schemeClr val="dk1"/>
+          </a:fillRef>
+          <a:effectRef idx="0">
+            <a:schemeClr val="dk1"/>
+          </a:effectRef>
+          <a:fontRef idx="minor">
+            <a:schemeClr val="tx1"/>
+          </a:fontRef>
+        </p:style>
+      </p:cxnSp>
+      <p:sp>
+        <p:nvSpPr>
+          <p:cNvPr id="9" name="Rectangle 8"/>
+          <p:cNvSpPr/>
+          <p:nvPr/>
+        </p:nvSpPr>
+        <p:spPr>
+          <a:xfrm>
+            <a:off x="754911" y="4206223"/>
+            <a:ext cx="2806995" cy="1382230"/>
+          </a:xfrm>
+          <a:prstGeom prst="rect">
+            <a:avLst/>
+          </a:prstGeom>
+          <a:solidFill>
+            <a:srgbClr val="7131A1"/>
+          </a:solidFill>
+        </p:spPr>
+        <p:style>
+          <a:lnRef idx="2">
+            <a:schemeClr val="accent1">
+              <a:shade val="50000"/>
+            </a:schemeClr>
+          </a:lnRef>
+          <a:fillRef idx="1">
+            <a:schemeClr val="accent1"/>
+          </a:fillRef>
+          <a:effectRef idx="0">
+            <a:schemeClr val="accent1"/>
+          </a:effectRef>
+          <a:fontRef idx="minor">
+            <a:schemeClr val="lt1"/>
+          </a:fontRef>
+        </p:style>
+        <p:txBody>
+          <a:bodyPr rtlCol="0" anchor="ctr"/>
+          <a:lstStyle/>
+          <a:p>
+            <a:endParaRPr lang="en-IN" dirty="0" smtClean="0"/>
+          </a:p>
+          <a:p>
+            <a:endParaRPr lang="en-IN" dirty="0"/>
+          </a:p>
+          <a:p>
+            <a:r>
+              <a:rPr lang="en-IN" dirty="0" smtClean="0"/>
+              <a:t>margin-top:5px</a:t>
+            </a:r>
+          </a:p>
+          <a:p>
+            <a:r>
+              <a:rPr lang="en-IN" dirty="0" smtClean="0"/>
+              <a:t>margin-right:10px</a:t>
+            </a:r>
+          </a:p>
+          <a:p>
+            <a:r>
+              <a:rPr lang="en-IN" dirty="0" smtClean="0"/>
+              <a:t>margin-bottom:5px</a:t>
+            </a:r>
+          </a:p>
+          <a:p>
+            <a:r>
+              <a:rPr lang="en-IN" dirty="0" smtClean="0"/>
+              <a:t>Margin-left :10px</a:t>
+            </a:r>
+            <a:endParaRPr lang="en-IN" dirty="0"/>
+          </a:p>
+          <a:p>
+            <a:endParaRPr lang="en-IN" dirty="0"/>
+          </a:p>
+          <a:p>
+            <a:endParaRPr lang="en-IN" dirty="0" smtClean="0"/>
+          </a:p>
+          <a:p>
+            <a:pPr algn="ctr"/>
+            <a:endParaRPr lang="en-GB" dirty="0"/>
+          </a:p>
+        </p:txBody>
+      </p:sp>
+      <p:sp>
+        <p:nvSpPr>
+          <p:cNvPr id="10" name="Rectangle 9"/>
+          <p:cNvSpPr/>
+          <p:nvPr/>
+        </p:nvSpPr>
+        <p:spPr>
+          <a:xfrm>
+            <a:off x="6039292" y="3070670"/>
+            <a:ext cx="4933507" cy="1095153"/>
+          </a:xfrm>
+          <a:prstGeom prst="rect">
+            <a:avLst/>
+          </a:prstGeom>
+          <a:solidFill>
+            <a:srgbClr val="7E37B3"/>
+          </a:solidFill>
+        </p:spPr>
+        <p:style>
+          <a:lnRef idx="2">
+            <a:schemeClr val="accent1">
+              <a:shade val="50000"/>
+            </a:schemeClr>
+          </a:lnRef>
+          <a:fillRef idx="1">
+            <a:schemeClr val="accent1"/>
+          </a:fillRef>
+          <a:effectRef idx="0">
+            <a:schemeClr val="accent1"/>
+          </a:effectRef>
+          <a:fontRef idx="minor">
+            <a:schemeClr val="lt1"/>
+          </a:fontRef>
+        </p:style>
+        <p:txBody>
+          <a:bodyPr rtlCol="0" anchor="ctr"/>
+          <a:lstStyle/>
+          <a:p>
+            <a:pPr algn="ctr"/>
+            <a:r>
+              <a:rPr lang="en-IN" dirty="0" smtClean="0"/>
+              <a:t>margin :       5px       10px      5px         10px</a:t>
+            </a:r>
+            <a:endParaRPr lang="en-GB" dirty="0"/>
+          </a:p>
+        </p:txBody>
+      </p:sp>
+      <p:sp>
+        <p:nvSpPr>
+          <p:cNvPr id="11" name="Rectangle 10"/>
+          <p:cNvSpPr/>
+          <p:nvPr/>
+        </p:nvSpPr>
+        <p:spPr>
+          <a:xfrm>
+            <a:off x="6039292" y="4389108"/>
+            <a:ext cx="4933507" cy="1095153"/>
+          </a:xfrm>
+          <a:prstGeom prst="rect">
+            <a:avLst/>
+          </a:prstGeom>
+          <a:solidFill>
+            <a:srgbClr val="7E37B3"/>
+          </a:solidFill>
+        </p:spPr>
+        <p:style>
+          <a:lnRef idx="2">
+            <a:schemeClr val="accent1">
+              <a:shade val="50000"/>
+            </a:schemeClr>
+          </a:lnRef>
+          <a:fillRef idx="1">
+            <a:schemeClr val="accent1"/>
+          </a:fillRef>
+          <a:effectRef idx="0">
+            <a:schemeClr val="accent1"/>
+          </a:effectRef>
+          <a:fontRef idx="minor">
+            <a:schemeClr val="lt1"/>
+          </a:fontRef>
+        </p:style>
+        <p:txBody>
+          <a:bodyPr rtlCol="0" anchor="ctr"/>
+          <a:lstStyle/>
+          <a:p>
+            <a:r>
+              <a:rPr lang="en-IN" dirty="0" smtClean="0"/>
+              <a:t>margin :      5px                     10px</a:t>
+            </a:r>
+            <a:endParaRPr lang="en-GB" dirty="0"/>
+          </a:p>
+        </p:txBody>
+      </p:sp>
+      <p:sp>
+        <p:nvSpPr>
+          <p:cNvPr id="12" name="Rectangle 11"/>
+          <p:cNvSpPr/>
+          <p:nvPr/>
+        </p:nvSpPr>
+        <p:spPr>
+          <a:xfrm>
+            <a:off x="6081822" y="5623514"/>
+            <a:ext cx="4933507" cy="1095153"/>
+          </a:xfrm>
+          <a:prstGeom prst="rect">
+            <a:avLst/>
+          </a:prstGeom>
+          <a:solidFill>
+            <a:srgbClr val="7E37B3"/>
+          </a:solidFill>
+        </p:spPr>
+        <p:style>
+          <a:lnRef idx="2">
+            <a:schemeClr val="accent1">
+              <a:shade val="50000"/>
+            </a:schemeClr>
+          </a:lnRef>
+          <a:fillRef idx="1">
+            <a:schemeClr val="accent1"/>
+          </a:fillRef>
+          <a:effectRef idx="0">
+            <a:schemeClr val="accent1"/>
+          </a:effectRef>
+          <a:fontRef idx="minor">
+            <a:schemeClr val="lt1"/>
+          </a:fontRef>
+        </p:style>
+        <p:txBody>
+          <a:bodyPr rtlCol="0" anchor="ctr"/>
+          <a:lstStyle/>
+          <a:p>
+            <a:r>
+              <a:rPr lang="en-IN" dirty="0" smtClean="0"/>
+              <a:t>margin    :         10px</a:t>
+            </a:r>
+            <a:endParaRPr lang="en-GB" dirty="0"/>
+          </a:p>
+        </p:txBody>
+      </p:sp>
+      <p:sp>
+        <p:nvSpPr>
+          <p:cNvPr id="13" name="Rectangle 12"/>
+          <p:cNvSpPr/>
+          <p:nvPr/>
+        </p:nvSpPr>
+        <p:spPr>
+          <a:xfrm>
+            <a:off x="7581014" y="3817089"/>
+            <a:ext cx="712381" cy="255182"/>
+          </a:xfrm>
+          <a:prstGeom prst="rect">
+            <a:avLst/>
+          </a:prstGeom>
+        </p:spPr>
+        <p:style>
+          <a:lnRef idx="2">
+            <a:schemeClr val="accent1">
+              <a:shade val="50000"/>
+            </a:schemeClr>
+          </a:lnRef>
+          <a:fillRef idx="1">
+            <a:schemeClr val="accent1"/>
+          </a:fillRef>
+          <a:effectRef idx="0">
+            <a:schemeClr val="accent1"/>
+          </a:effectRef>
+          <a:fontRef idx="minor">
+            <a:schemeClr val="lt1"/>
+          </a:fontRef>
+        </p:style>
+        <p:txBody>
+          <a:bodyPr rtlCol="0" anchor="ctr"/>
+          <a:lstStyle/>
+          <a:p>
+            <a:pPr algn="ctr"/>
+            <a:r>
+              <a:rPr lang="en-IN" dirty="0" smtClean="0"/>
+              <a:t>Top</a:t>
+            </a:r>
+            <a:endParaRPr lang="en-GB" dirty="0"/>
+          </a:p>
+        </p:txBody>
+      </p:sp>
+      <p:sp>
+        <p:nvSpPr>
+          <p:cNvPr id="14" name="Rectangle 13"/>
+          <p:cNvSpPr/>
+          <p:nvPr/>
+        </p:nvSpPr>
+        <p:spPr>
+          <a:xfrm>
+            <a:off x="8371367" y="3840423"/>
+            <a:ext cx="712381" cy="255182"/>
+          </a:xfrm>
+          <a:prstGeom prst="rect">
+            <a:avLst/>
+          </a:prstGeom>
+        </p:spPr>
+        <p:style>
+          <a:lnRef idx="2">
+            <a:schemeClr val="accent1">
+              <a:shade val="50000"/>
+            </a:schemeClr>
+          </a:lnRef>
+          <a:fillRef idx="1">
+            <a:schemeClr val="accent1"/>
+          </a:fillRef>
+          <a:effectRef idx="0">
+            <a:schemeClr val="accent1"/>
+          </a:effectRef>
+          <a:fontRef idx="minor">
+            <a:schemeClr val="lt1"/>
+          </a:fontRef>
+        </p:style>
+        <p:txBody>
+          <a:bodyPr rtlCol="0" anchor="ctr"/>
+          <a:lstStyle/>
+          <a:p>
+            <a:pPr algn="ctr"/>
+            <a:r>
+              <a:rPr lang="en-IN" dirty="0" smtClean="0"/>
+              <a:t>Right</a:t>
+            </a:r>
+            <a:endParaRPr lang="en-GB" dirty="0"/>
+          </a:p>
+        </p:txBody>
+      </p:sp>
+      <p:sp>
+        <p:nvSpPr>
+          <p:cNvPr id="15" name="Rectangle 14"/>
+          <p:cNvSpPr/>
+          <p:nvPr/>
+        </p:nvSpPr>
+        <p:spPr>
+          <a:xfrm>
+            <a:off x="9143998" y="3819159"/>
+            <a:ext cx="978197" cy="253112"/>
+          </a:xfrm>
+          <a:prstGeom prst="rect">
+            <a:avLst/>
+          </a:prstGeom>
+        </p:spPr>
+        <p:style>
+          <a:lnRef idx="2">
+            <a:schemeClr val="accent1">
+              <a:shade val="50000"/>
+            </a:schemeClr>
+          </a:lnRef>
+          <a:fillRef idx="1">
+            <a:schemeClr val="accent1"/>
+          </a:fillRef>
+          <a:effectRef idx="0">
+            <a:schemeClr val="accent1"/>
+          </a:effectRef>
+          <a:fontRef idx="minor">
+            <a:schemeClr val="lt1"/>
+          </a:fontRef>
+        </p:style>
+        <p:txBody>
+          <a:bodyPr rtlCol="0" anchor="ctr"/>
+          <a:lstStyle/>
+          <a:p>
+            <a:pPr algn="ctr"/>
+            <a:r>
+              <a:rPr lang="en-IN" dirty="0" smtClean="0"/>
+              <a:t>Bottom</a:t>
+            </a:r>
+            <a:endParaRPr lang="en-GB" dirty="0"/>
+          </a:p>
+        </p:txBody>
+      </p:sp>
+      <p:sp>
+        <p:nvSpPr>
+          <p:cNvPr id="16" name="Rectangle 15"/>
+          <p:cNvSpPr/>
+          <p:nvPr/>
+        </p:nvSpPr>
+        <p:spPr>
+          <a:xfrm>
+            <a:off x="10175358" y="3817089"/>
+            <a:ext cx="712381" cy="255182"/>
+          </a:xfrm>
+          <a:prstGeom prst="rect">
+            <a:avLst/>
+          </a:prstGeom>
+        </p:spPr>
+        <p:style>
+          <a:lnRef idx="2">
+            <a:schemeClr val="accent1">
+              <a:shade val="50000"/>
+            </a:schemeClr>
+          </a:lnRef>
+          <a:fillRef idx="1">
+            <a:schemeClr val="accent1"/>
+          </a:fillRef>
+          <a:effectRef idx="0">
+            <a:schemeClr val="accent1"/>
+          </a:effectRef>
+          <a:fontRef idx="minor">
+            <a:schemeClr val="lt1"/>
+          </a:fontRef>
+        </p:style>
+        <p:txBody>
+          <a:bodyPr rtlCol="0" anchor="ctr"/>
+          <a:lstStyle/>
+          <a:p>
+            <a:pPr algn="ctr"/>
+            <a:r>
+              <a:rPr lang="en-IN" dirty="0" smtClean="0"/>
+              <a:t>Left</a:t>
+            </a:r>
+            <a:endParaRPr lang="en-GB" dirty="0"/>
+          </a:p>
+        </p:txBody>
+      </p:sp>
+      <p:sp>
+        <p:nvSpPr>
+          <p:cNvPr id="17" name="Rectangle 16"/>
+          <p:cNvSpPr/>
+          <p:nvPr/>
+        </p:nvSpPr>
+        <p:spPr>
+          <a:xfrm>
+            <a:off x="7228368" y="5114225"/>
+            <a:ext cx="1596656" cy="331751"/>
+          </a:xfrm>
+          <a:prstGeom prst="rect">
+            <a:avLst/>
+          </a:prstGeom>
+        </p:spPr>
+        <p:style>
+          <a:lnRef idx="2">
+            <a:schemeClr val="accent1">
+              <a:shade val="50000"/>
+            </a:schemeClr>
+          </a:lnRef>
+          <a:fillRef idx="1">
+            <a:schemeClr val="accent1"/>
+          </a:fillRef>
+          <a:effectRef idx="0">
+            <a:schemeClr val="accent1"/>
+          </a:effectRef>
+          <a:fontRef idx="minor">
+            <a:schemeClr val="lt1"/>
+          </a:fontRef>
+        </p:style>
+        <p:txBody>
+          <a:bodyPr rtlCol="0" anchor="ctr"/>
+          <a:lstStyle/>
+          <a:p>
+            <a:pPr algn="ctr"/>
+            <a:r>
+              <a:rPr lang="en-IN" dirty="0" smtClean="0"/>
+              <a:t>Top &amp; Bottom</a:t>
+            </a:r>
+            <a:endParaRPr lang="en-GB" dirty="0"/>
+          </a:p>
+        </p:txBody>
+      </p:sp>
+      <p:sp>
+        <p:nvSpPr>
+          <p:cNvPr id="18" name="Rectangle 17"/>
+          <p:cNvSpPr/>
+          <p:nvPr/>
+        </p:nvSpPr>
+        <p:spPr>
+          <a:xfrm>
+            <a:off x="9083748" y="5114224"/>
+            <a:ext cx="1596656" cy="331751"/>
+          </a:xfrm>
+          <a:prstGeom prst="rect">
+            <a:avLst/>
+          </a:prstGeom>
+        </p:spPr>
+        <p:style>
+          <a:lnRef idx="2">
+            <a:schemeClr val="accent1">
+              <a:shade val="50000"/>
+            </a:schemeClr>
+          </a:lnRef>
+          <a:fillRef idx="1">
+            <a:schemeClr val="accent1"/>
+          </a:fillRef>
+          <a:effectRef idx="0">
+            <a:schemeClr val="accent1"/>
+          </a:effectRef>
+          <a:fontRef idx="minor">
+            <a:schemeClr val="lt1"/>
+          </a:fontRef>
+        </p:style>
+        <p:txBody>
+          <a:bodyPr rtlCol="0" anchor="ctr"/>
+          <a:lstStyle/>
+          <a:p>
+            <a:pPr algn="ctr"/>
+            <a:r>
+              <a:rPr lang="en-IN" dirty="0" smtClean="0"/>
+              <a:t>Left &amp; Right</a:t>
+            </a:r>
+            <a:endParaRPr lang="en-GB" dirty="0"/>
+          </a:p>
+        </p:txBody>
+      </p:sp>
+      <p:sp>
+        <p:nvSpPr>
+          <p:cNvPr id="19" name="Rectangle 18"/>
+          <p:cNvSpPr/>
+          <p:nvPr/>
+        </p:nvSpPr>
+        <p:spPr>
+          <a:xfrm>
+            <a:off x="7444563" y="6339011"/>
+            <a:ext cx="1596656" cy="331751"/>
+          </a:xfrm>
+          <a:prstGeom prst="rect">
+            <a:avLst/>
+          </a:prstGeom>
+        </p:spPr>
+        <p:style>
+          <a:lnRef idx="2">
+            <a:schemeClr val="accent1">
+              <a:shade val="50000"/>
+            </a:schemeClr>
+          </a:lnRef>
+          <a:fillRef idx="1">
+            <a:schemeClr val="accent1"/>
+          </a:fillRef>
+          <a:effectRef idx="0">
+            <a:schemeClr val="accent1"/>
+          </a:effectRef>
+          <a:fontRef idx="minor">
+            <a:schemeClr val="lt1"/>
+          </a:fontRef>
+        </p:style>
+        <p:txBody>
+          <a:bodyPr rtlCol="0" anchor="ctr"/>
+          <a:lstStyle/>
+          <a:p>
+            <a:pPr algn="ctr"/>
+            <a:r>
+              <a:rPr lang="en-IN" dirty="0" smtClean="0"/>
+              <a:t>Top &amp; Bottom</a:t>
+            </a:r>
+            <a:endParaRPr lang="en-GB" dirty="0"/>
+          </a:p>
+        </p:txBody>
+      </p:sp>
+      <p:sp>
+        <p:nvSpPr>
+          <p:cNvPr id="20" name="Rectangle 19"/>
+          <p:cNvSpPr/>
+          <p:nvPr/>
+        </p:nvSpPr>
+        <p:spPr>
+          <a:xfrm>
+            <a:off x="7354185" y="5698911"/>
+            <a:ext cx="1596656" cy="331751"/>
+          </a:xfrm>
+          <a:prstGeom prst="rect">
+            <a:avLst/>
+          </a:prstGeom>
+        </p:spPr>
+        <p:style>
+          <a:lnRef idx="2">
+            <a:schemeClr val="accent1">
+              <a:shade val="50000"/>
+            </a:schemeClr>
+          </a:lnRef>
+          <a:fillRef idx="1">
+            <a:schemeClr val="accent1"/>
+          </a:fillRef>
+          <a:effectRef idx="0">
+            <a:schemeClr val="accent1"/>
+          </a:effectRef>
+          <a:fontRef idx="minor">
+            <a:schemeClr val="lt1"/>
+          </a:fontRef>
+        </p:style>
+        <p:txBody>
+          <a:bodyPr rtlCol="0" anchor="ctr"/>
+          <a:lstStyle/>
+          <a:p>
+            <a:pPr algn="ctr"/>
+            <a:r>
+              <a:rPr lang="en-IN" dirty="0" smtClean="0"/>
+              <a:t>Left &amp; Right</a:t>
+            </a:r>
+            <a:endParaRPr lang="en-GB" dirty="0"/>
+          </a:p>
+        </p:txBody>
+      </p:sp>
+      <p:cxnSp>
+        <p:nvCxnSpPr>
+          <p:cNvPr id="22" name="Straight Connector 21"/>
+          <p:cNvCxnSpPr/>
+          <p:nvPr/>
+        </p:nvCxnSpPr>
+        <p:spPr>
+          <a:xfrm>
+            <a:off x="4678326" y="3493831"/>
+            <a:ext cx="60250" cy="2606018"/>
+          </a:xfrm>
+          <a:prstGeom prst="line">
+            <a:avLst/>
+          </a:prstGeom>
+          <a:ln w="38100"/>
+        </p:spPr>
+        <p:style>
+          <a:lnRef idx="1">
+            <a:schemeClr val="dk1"/>
+          </a:lnRef>
+          <a:fillRef idx="0">
+            <a:schemeClr val="dk1"/>
+          </a:fillRef>
+          <a:effectRef idx="0">
+            <a:schemeClr val="dk1"/>
+          </a:effectRef>
+          <a:fontRef idx="minor">
+            <a:schemeClr val="tx1"/>
+          </a:fontRef>
+        </p:style>
+      </p:cxnSp>
+      <p:cxnSp>
+        <p:nvCxnSpPr>
+          <p:cNvPr id="25" name="Straight Connector 24"/>
+          <p:cNvCxnSpPr>
+            <a:stCxn id="9" idx="3"/>
+          </p:cNvCxnSpPr>
+          <p:nvPr/>
+        </p:nvCxnSpPr>
+        <p:spPr>
+          <a:xfrm>
+            <a:off x="3561906" y="4897338"/>
+            <a:ext cx="1116420" cy="0"/>
+          </a:xfrm>
+          <a:prstGeom prst="line">
+            <a:avLst/>
+          </a:prstGeom>
+          <a:ln w="38100"/>
+        </p:spPr>
+        <p:style>
+          <a:lnRef idx="1">
+            <a:schemeClr val="dk1"/>
+          </a:lnRef>
+          <a:fillRef idx="0">
+            <a:schemeClr val="dk1"/>
+          </a:fillRef>
+          <a:effectRef idx="0">
+            <a:schemeClr val="dk1"/>
+          </a:effectRef>
+          <a:fontRef idx="minor">
+            <a:schemeClr val="tx1"/>
+          </a:fontRef>
+        </p:style>
+      </p:cxnSp>
+      <p:cxnSp>
+        <p:nvCxnSpPr>
+          <p:cNvPr id="28" name="Straight Arrow Connector 27"/>
+          <p:cNvCxnSpPr/>
+          <p:nvPr/>
+        </p:nvCxnSpPr>
+        <p:spPr>
+          <a:xfrm>
+            <a:off x="4678326" y="3493831"/>
+            <a:ext cx="1360966" cy="0"/>
+          </a:xfrm>
+          <a:prstGeom prst="straightConnector1">
+            <a:avLst/>
+          </a:prstGeom>
+          <a:ln w="38100">
+            <a:tailEnd type="triangle"/>
+          </a:ln>
+        </p:spPr>
+        <p:style>
+          <a:lnRef idx="1">
+            <a:schemeClr val="dk1"/>
+          </a:lnRef>
+          <a:fillRef idx="0">
+            <a:schemeClr val="dk1"/>
+          </a:fillRef>
+          <a:effectRef idx="0">
+            <a:schemeClr val="dk1"/>
+          </a:effectRef>
+          <a:fontRef idx="minor">
+            <a:schemeClr val="tx1"/>
+          </a:fontRef>
+        </p:style>
+      </p:cxnSp>
+      <p:cxnSp>
+        <p:nvCxnSpPr>
+          <p:cNvPr id="29" name="Straight Arrow Connector 28"/>
+          <p:cNvCxnSpPr/>
+          <p:nvPr/>
+        </p:nvCxnSpPr>
+        <p:spPr>
+          <a:xfrm>
+            <a:off x="4735029" y="4900880"/>
+            <a:ext cx="1360966" cy="0"/>
+          </a:xfrm>
+          <a:prstGeom prst="straightConnector1">
+            <a:avLst/>
+          </a:prstGeom>
+          <a:ln w="38100">
+            <a:tailEnd type="triangle"/>
+          </a:ln>
+        </p:spPr>
+        <p:style>
+          <a:lnRef idx="1">
+            <a:schemeClr val="dk1"/>
+          </a:lnRef>
+          <a:fillRef idx="0">
+            <a:schemeClr val="dk1"/>
+          </a:fillRef>
+          <a:effectRef idx="0">
+            <a:schemeClr val="dk1"/>
+          </a:effectRef>
+          <a:fontRef idx="minor">
+            <a:schemeClr val="tx1"/>
+          </a:fontRef>
+        </p:style>
+      </p:cxnSp>
+      <p:cxnSp>
+        <p:nvCxnSpPr>
+          <p:cNvPr id="30" name="Straight Arrow Connector 29"/>
+          <p:cNvCxnSpPr/>
+          <p:nvPr/>
+        </p:nvCxnSpPr>
+        <p:spPr>
+          <a:xfrm>
+            <a:off x="4759833" y="6074008"/>
+            <a:ext cx="1360966" cy="0"/>
+          </a:xfrm>
+          <a:prstGeom prst="straightConnector1">
+            <a:avLst/>
+          </a:prstGeom>
+          <a:ln w="38100">
+            <a:tailEnd type="triangle"/>
+          </a:ln>
+        </p:spPr>
+        <p:style>
+          <a:lnRef idx="1">
+            <a:schemeClr val="dk1"/>
+          </a:lnRef>
+          <a:fillRef idx="0">
+            <a:schemeClr val="dk1"/>
+          </a:fillRef>
+          <a:effectRef idx="0">
+            <a:schemeClr val="dk1"/>
+          </a:effectRef>
+          <a:fontRef idx="minor">
+            <a:schemeClr val="tx1"/>
+          </a:fontRef>
+        </p:style>
+      </p:cxnSp>
+    </p:spTree>
+    <p:extLst>
+      <p:ext uri="{BB962C8B-B14F-4D97-AF65-F5344CB8AC3E}">
+        <p14:creationId xmlns:p14="http://schemas.microsoft.com/office/powerpoint/2010/main" val="1837898638"/>
+      </p:ext>
+    </p:extLst>
+  </p:cSld>
+  <p:clrMapOvr>
+    <a:masterClrMapping/>
+  </p:clrMapOvr>
+  <p:timing>
+    <p:tnLst>
+      <p:par>
+        <p:cTn id="1" dur="indefinite" restart="never" nodeType="tmRoot">
+          <p:childTnLst>
+            <p:seq concurrent="1" nextAc="seek">
+              <p:cTn id="2" dur="indefinite" nodeType="mainSeq">
+                <p:childTnLst>
+                  <p:par>
+                    <p:cTn id="3" fill="hold">
+                      <p:stCondLst>
+                        <p:cond delay="indefinite"/>
+                      </p:stCondLst>
+                      <p:childTnLst>
+                        <p:par>
+                          <p:cTn id="4" fill="hold">
+                            <p:stCondLst>
+                              <p:cond delay="0"/>
+                            </p:stCondLst>
+                            <p:childTnLst>
+                              <p:par>
+                                <p:cTn id="5" presetID="1" presetClass="entr" presetSubtype="0" fill="hold" grpId="0" nodeType="clickEffect">
+                                  <p:stCondLst>
+                                    <p:cond delay="0"/>
+                                  </p:stCondLst>
+                                  <p:childTnLst>
+                                    <p:set>
+                                      <p:cBhvr>
+                                        <p:cTn id="6" dur="1" fill="hold">
+                                          <p:stCondLst>
+                                            <p:cond delay="0"/>
+                                          </p:stCondLst>
+                                        </p:cTn>
+                                        <p:tgtEl>
+                                          <p:spTgt spid="5"/>
+                                        </p:tgtEl>
+                                        <p:attrNameLst>
+                                          <p:attrName>style.visibility</p:attrName>
+                                        </p:attrNameLst>
+                                      </p:cBhvr>
+                                      <p:to>
+                                        <p:strVal val="visible"/>
+                                      </p:to>
+                                    </p:set>
+                                  </p:childTnLst>
+                                </p:cTn>
+                              </p:par>
+                              <p:par>
+                                <p:cTn id="7" presetID="1" presetClass="entr" presetSubtype="0" fill="hold" nodeType="withEffect">
+                                  <p:stCondLst>
+                                    <p:cond delay="0"/>
+                                  </p:stCondLst>
+                                  <p:childTnLst>
+                                    <p:set>
+                                      <p:cBhvr>
+                                        <p:cTn id="8" dur="1" fill="hold">
+                                          <p:stCondLst>
+                                            <p:cond delay="0"/>
+                                          </p:stCondLst>
+                                        </p:cTn>
+                                        <p:tgtEl>
+                                          <p:spTgt spid="8"/>
+                                        </p:tgtEl>
+                                        <p:attrNameLst>
+                                          <p:attrName>style.visibility</p:attrName>
+                                        </p:attrNameLst>
+                                      </p:cBhvr>
+                                      <p:to>
+                                        <p:strVal val="visible"/>
+                                      </p:to>
+                                    </p:set>
+                                  </p:childTnLst>
+                                </p:cTn>
+                              </p:par>
+                              <p:par>
+                                <p:cTn id="9" presetID="1" presetClass="entr" presetSubtype="0" fill="hold" grpId="0" nodeType="withEffect">
+                                  <p:stCondLst>
+                                    <p:cond delay="0"/>
+                                  </p:stCondLst>
+                                  <p:childTnLst>
+                                    <p:set>
+                                      <p:cBhvr>
+                                        <p:cTn id="10" dur="1" fill="hold">
+                                          <p:stCondLst>
+                                            <p:cond delay="0"/>
+                                          </p:stCondLst>
+                                        </p:cTn>
+                                        <p:tgtEl>
+                                          <p:spTgt spid="6"/>
+                                        </p:tgtEl>
+                                        <p:attrNameLst>
+                                          <p:attrName>style.visibility</p:attrName>
+                                        </p:attrNameLst>
+                                      </p:cBhvr>
+                                      <p:to>
+                                        <p:strVal val="visible"/>
+                                      </p:to>
+                                    </p:set>
+                                  </p:childTnLst>
+                                </p:cTn>
+                              </p:par>
+                            </p:childTnLst>
+                          </p:cTn>
+                        </p:par>
+                      </p:childTnLst>
+                    </p:cTn>
+                  </p:par>
+                  <p:par>
+                    <p:cTn id="11" fill="hold">
+                      <p:stCondLst>
+                        <p:cond delay="indefinite"/>
+                      </p:stCondLst>
+                      <p:childTnLst>
+                        <p:par>
+                          <p:cTn id="12" fill="hold">
+                            <p:stCondLst>
+                              <p:cond delay="0"/>
+                            </p:stCondLst>
+                            <p:childTnLst>
+                              <p:par>
+                                <p:cTn id="13" presetID="1" presetClass="entr" presetSubtype="0" fill="hold" grpId="0" nodeType="clickEffect">
+                                  <p:stCondLst>
+                                    <p:cond delay="0"/>
+                                  </p:stCondLst>
+                                  <p:childTnLst>
+                                    <p:set>
+                                      <p:cBhvr>
+                                        <p:cTn id="14" dur="1" fill="hold">
+                                          <p:stCondLst>
+                                            <p:cond delay="0"/>
+                                          </p:stCondLst>
+                                        </p:cTn>
+                                        <p:tgtEl>
+                                          <p:spTgt spid="9"/>
+                                        </p:tgtEl>
+                                        <p:attrNameLst>
+                                          <p:attrName>style.visibility</p:attrName>
+                                        </p:attrNameLst>
+                                      </p:cBhvr>
+                                      <p:to>
+                                        <p:strVal val="visible"/>
+                                      </p:to>
+                                    </p:set>
+                                  </p:childTnLst>
+                                </p:cTn>
+                              </p:par>
+                              <p:par>
+                                <p:cTn id="15" presetID="1" presetClass="entr" presetSubtype="0" fill="hold" nodeType="withEffect">
+                                  <p:stCondLst>
+                                    <p:cond delay="0"/>
+                                  </p:stCondLst>
+                                  <p:childTnLst>
+                                    <p:set>
+                                      <p:cBhvr>
+                                        <p:cTn id="16" dur="1" fill="hold">
+                                          <p:stCondLst>
+                                            <p:cond delay="0"/>
+                                          </p:stCondLst>
+                                        </p:cTn>
+                                        <p:tgtEl>
+                                          <p:spTgt spid="25"/>
+                                        </p:tgtEl>
+                                        <p:attrNameLst>
+                                          <p:attrName>style.visibility</p:attrName>
+                                        </p:attrNameLst>
+                                      </p:cBhvr>
+                                      <p:to>
+                                        <p:strVal val="visible"/>
+                                      </p:to>
+                                    </p:set>
+                                  </p:childTnLst>
+                                </p:cTn>
+                              </p:par>
+                              <p:par>
+                                <p:cTn id="17" presetID="1" presetClass="entr" presetSubtype="0" fill="hold" nodeType="withEffect">
+                                  <p:stCondLst>
+                                    <p:cond delay="0"/>
+                                  </p:stCondLst>
+                                  <p:childTnLst>
+                                    <p:set>
+                                      <p:cBhvr>
+                                        <p:cTn id="18" dur="1" fill="hold">
+                                          <p:stCondLst>
+                                            <p:cond delay="0"/>
+                                          </p:stCondLst>
+                                        </p:cTn>
+                                        <p:tgtEl>
+                                          <p:spTgt spid="22"/>
+                                        </p:tgtEl>
+                                        <p:attrNameLst>
+                                          <p:attrName>style.visibility</p:attrName>
+                                        </p:attrNameLst>
+                                      </p:cBhvr>
+                                      <p:to>
+                                        <p:strVal val="visible"/>
+                                      </p:to>
+                                    </p:set>
+                                  </p:childTnLst>
+                                </p:cTn>
+                              </p:par>
+                              <p:par>
+                                <p:cTn id="19" presetID="1" presetClass="entr" presetSubtype="0" fill="hold" nodeType="withEffect">
+                                  <p:stCondLst>
+                                    <p:cond delay="0"/>
+                                  </p:stCondLst>
+                                  <p:childTnLst>
+                                    <p:set>
+                                      <p:cBhvr>
+                                        <p:cTn id="20" dur="1" fill="hold">
+                                          <p:stCondLst>
+                                            <p:cond delay="0"/>
+                                          </p:stCondLst>
+                                        </p:cTn>
+                                        <p:tgtEl>
+                                          <p:spTgt spid="28"/>
+                                        </p:tgtEl>
+                                        <p:attrNameLst>
+                                          <p:attrName>style.visibility</p:attrName>
+                                        </p:attrNameLst>
+                                      </p:cBhvr>
+                                      <p:to>
+                                        <p:strVal val="visible"/>
+                                      </p:to>
+                                    </p:set>
+                                  </p:childTnLst>
+                                </p:cTn>
+                              </p:par>
+                              <p:par>
+                                <p:cTn id="21" presetID="1" presetClass="entr" presetSubtype="0" fill="hold" grpId="0" nodeType="withEffect">
+                                  <p:stCondLst>
+                                    <p:cond delay="0"/>
+                                  </p:stCondLst>
+                                  <p:childTnLst>
+                                    <p:set>
+                                      <p:cBhvr>
+                                        <p:cTn id="22" dur="1" fill="hold">
+                                          <p:stCondLst>
+                                            <p:cond delay="0"/>
+                                          </p:stCondLst>
+                                        </p:cTn>
+                                        <p:tgtEl>
+                                          <p:spTgt spid="13"/>
+                                        </p:tgtEl>
+                                        <p:attrNameLst>
+                                          <p:attrName>style.visibility</p:attrName>
+                                        </p:attrNameLst>
+                                      </p:cBhvr>
+                                      <p:to>
+                                        <p:strVal val="visible"/>
+                                      </p:to>
+                                    </p:set>
+                                  </p:childTnLst>
+                                </p:cTn>
+                              </p:par>
+                              <p:par>
+                                <p:cTn id="23" presetID="1" presetClass="entr" presetSubtype="0" fill="hold" grpId="0" nodeType="withEffect">
+                                  <p:stCondLst>
+                                    <p:cond delay="0"/>
+                                  </p:stCondLst>
+                                  <p:childTnLst>
+                                    <p:set>
+                                      <p:cBhvr>
+                                        <p:cTn id="24" dur="1" fill="hold">
+                                          <p:stCondLst>
+                                            <p:cond delay="0"/>
+                                          </p:stCondLst>
+                                        </p:cTn>
+                                        <p:tgtEl>
+                                          <p:spTgt spid="14"/>
+                                        </p:tgtEl>
+                                        <p:attrNameLst>
+                                          <p:attrName>style.visibility</p:attrName>
+                                        </p:attrNameLst>
+                                      </p:cBhvr>
+                                      <p:to>
+                                        <p:strVal val="visible"/>
+                                      </p:to>
+                                    </p:set>
+                                  </p:childTnLst>
+                                </p:cTn>
+                              </p:par>
+                              <p:par>
+                                <p:cTn id="25" presetID="1" presetClass="entr" presetSubtype="0" fill="hold" grpId="0" nodeType="withEffect">
+                                  <p:stCondLst>
+                                    <p:cond delay="0"/>
+                                  </p:stCondLst>
+                                  <p:childTnLst>
+                                    <p:set>
+                                      <p:cBhvr>
+                                        <p:cTn id="26" dur="1" fill="hold">
+                                          <p:stCondLst>
+                                            <p:cond delay="0"/>
+                                          </p:stCondLst>
+                                        </p:cTn>
+                                        <p:tgtEl>
+                                          <p:spTgt spid="15"/>
+                                        </p:tgtEl>
+                                        <p:attrNameLst>
+                                          <p:attrName>style.visibility</p:attrName>
+                                        </p:attrNameLst>
+                                      </p:cBhvr>
+                                      <p:to>
+                                        <p:strVal val="visible"/>
+                                      </p:to>
+                                    </p:set>
+                                  </p:childTnLst>
+                                </p:cTn>
+                              </p:par>
+                              <p:par>
+                                <p:cTn id="27" presetID="1" presetClass="entr" presetSubtype="0" fill="hold" grpId="0" nodeType="withEffect">
+                                  <p:stCondLst>
+                                    <p:cond delay="0"/>
+                                  </p:stCondLst>
+                                  <p:childTnLst>
+                                    <p:set>
+                                      <p:cBhvr>
+                                        <p:cTn id="28" dur="1" fill="hold">
+                                          <p:stCondLst>
+                                            <p:cond delay="0"/>
+                                          </p:stCondLst>
+                                        </p:cTn>
+                                        <p:tgtEl>
+                                          <p:spTgt spid="16"/>
+                                        </p:tgtEl>
+                                        <p:attrNameLst>
+                                          <p:attrName>style.visibility</p:attrName>
+                                        </p:attrNameLst>
+                                      </p:cBhvr>
+                                      <p:to>
+                                        <p:strVal val="visible"/>
+                                      </p:to>
+                                    </p:set>
+                                  </p:childTnLst>
+                                </p:cTn>
+                              </p:par>
+                              <p:par>
+                                <p:cTn id="29" presetID="1" presetClass="entr" presetSubtype="0" fill="hold" grpId="0" nodeType="withEffect">
+                                  <p:stCondLst>
+                                    <p:cond delay="0"/>
+                                  </p:stCondLst>
+                                  <p:childTnLst>
+                                    <p:set>
+                                      <p:cBhvr>
+                                        <p:cTn id="30" dur="1" fill="hold">
+                                          <p:stCondLst>
+                                            <p:cond delay="0"/>
+                                          </p:stCondLst>
+                                        </p:cTn>
+                                        <p:tgtEl>
+                                          <p:spTgt spid="10"/>
+                                        </p:tgtEl>
+                                        <p:attrNameLst>
+                                          <p:attrName>style.visibility</p:attrName>
+                                        </p:attrNameLst>
+                                      </p:cBhvr>
+                                      <p:to>
+                                        <p:strVal val="visible"/>
+                                      </p:to>
+                                    </p:set>
+                                  </p:childTnLst>
+                                </p:cTn>
+                              </p:par>
+                            </p:childTnLst>
+                          </p:cTn>
+                        </p:par>
+                      </p:childTnLst>
+                    </p:cTn>
+                  </p:par>
+                  <p:par>
+                    <p:cTn id="31" fill="hold">
+                      <p:stCondLst>
+                        <p:cond delay="indefinite"/>
+                      </p:stCondLst>
+                      <p:childTnLst>
+                        <p:par>
+                          <p:cTn id="32" fill="hold">
+                            <p:stCondLst>
+                              <p:cond delay="0"/>
+                            </p:stCondLst>
+                            <p:childTnLst>
+                              <p:par>
+                                <p:cTn id="33" presetID="1" presetClass="entr" presetSubtype="0" fill="hold" nodeType="clickEffect">
+                                  <p:stCondLst>
+                                    <p:cond delay="0"/>
+                                  </p:stCondLst>
+                                  <p:childTnLst>
+                                    <p:set>
+                                      <p:cBhvr>
+                                        <p:cTn id="34" dur="1" fill="hold">
+                                          <p:stCondLst>
+                                            <p:cond delay="0"/>
+                                          </p:stCondLst>
+                                        </p:cTn>
+                                        <p:tgtEl>
+                                          <p:spTgt spid="29"/>
+                                        </p:tgtEl>
+                                        <p:attrNameLst>
+                                          <p:attrName>style.visibility</p:attrName>
+                                        </p:attrNameLst>
+                                      </p:cBhvr>
+                                      <p:to>
+                                        <p:strVal val="visible"/>
+                                      </p:to>
+                                    </p:set>
+                                  </p:childTnLst>
+                                </p:cTn>
+                              </p:par>
+                              <p:par>
+                                <p:cTn id="35" presetID="1" presetClass="entr" presetSubtype="0" fill="hold" grpId="0" nodeType="withEffect">
+                                  <p:stCondLst>
+                                    <p:cond delay="0"/>
+                                  </p:stCondLst>
+                                  <p:childTnLst>
+                                    <p:set>
+                                      <p:cBhvr>
+                                        <p:cTn id="36" dur="1" fill="hold">
+                                          <p:stCondLst>
+                                            <p:cond delay="0"/>
+                                          </p:stCondLst>
+                                        </p:cTn>
+                                        <p:tgtEl>
+                                          <p:spTgt spid="11"/>
+                                        </p:tgtEl>
+                                        <p:attrNameLst>
+                                          <p:attrName>style.visibility</p:attrName>
+                                        </p:attrNameLst>
+                                      </p:cBhvr>
+                                      <p:to>
+                                        <p:strVal val="visible"/>
+                                      </p:to>
+                                    </p:set>
+                                  </p:childTnLst>
+                                </p:cTn>
+                              </p:par>
+                              <p:par>
+                                <p:cTn id="37" presetID="1" presetClass="entr" presetSubtype="0" fill="hold" grpId="0" nodeType="withEffect">
+                                  <p:stCondLst>
+                                    <p:cond delay="0"/>
+                                  </p:stCondLst>
+                                  <p:childTnLst>
+                                    <p:set>
+                                      <p:cBhvr>
+                                        <p:cTn id="38" dur="1" fill="hold">
+                                          <p:stCondLst>
+                                            <p:cond delay="0"/>
+                                          </p:stCondLst>
+                                        </p:cTn>
+                                        <p:tgtEl>
+                                          <p:spTgt spid="17"/>
+                                        </p:tgtEl>
+                                        <p:attrNameLst>
+                                          <p:attrName>style.visibility</p:attrName>
+                                        </p:attrNameLst>
+                                      </p:cBhvr>
+                                      <p:to>
+                                        <p:strVal val="visible"/>
+                                      </p:to>
+                                    </p:set>
+                                  </p:childTnLst>
+                                </p:cTn>
+                              </p:par>
+                              <p:par>
+                                <p:cTn id="39" presetID="1" presetClass="entr" presetSubtype="0" fill="hold" grpId="0" nodeType="withEffect">
+                                  <p:stCondLst>
+                                    <p:cond delay="0"/>
+                                  </p:stCondLst>
+                                  <p:childTnLst>
+                                    <p:set>
+                                      <p:cBhvr>
+                                        <p:cTn id="40" dur="1" fill="hold">
+                                          <p:stCondLst>
+                                            <p:cond delay="0"/>
+                                          </p:stCondLst>
+                                        </p:cTn>
+                                        <p:tgtEl>
+                                          <p:spTgt spid="18"/>
+                                        </p:tgtEl>
+                                        <p:attrNameLst>
+                                          <p:attrName>style.visibility</p:attrName>
+                                        </p:attrNameLst>
+                                      </p:cBhvr>
+                                      <p:to>
+                                        <p:strVal val="visible"/>
+                                      </p:to>
+                                    </p:set>
+                                  </p:childTnLst>
+                                </p:cTn>
+                              </p:par>
+                            </p:childTnLst>
+                          </p:cTn>
+                        </p:par>
+                      </p:childTnLst>
+                    </p:cTn>
+                  </p:par>
+                  <p:par>
+                    <p:cTn id="41" fill="hold">
+                      <p:stCondLst>
+                        <p:cond delay="indefinite"/>
+                      </p:stCondLst>
+                      <p:childTnLst>
+                        <p:par>
+                          <p:cTn id="42" fill="hold">
+                            <p:stCondLst>
+                              <p:cond delay="0"/>
+                            </p:stCondLst>
+                            <p:childTnLst>
+                              <p:par>
+                                <p:cTn id="43" presetID="1" presetClass="entr" presetSubtype="0" fill="hold" nodeType="clickEffect">
+                                  <p:stCondLst>
+                                    <p:cond delay="0"/>
+                                  </p:stCondLst>
+                                  <p:childTnLst>
+                                    <p:set>
+                                      <p:cBhvr>
+                                        <p:cTn id="44" dur="1" fill="hold">
+                                          <p:stCondLst>
+                                            <p:cond delay="0"/>
+                                          </p:stCondLst>
+                                        </p:cTn>
+                                        <p:tgtEl>
+                                          <p:spTgt spid="30"/>
+                                        </p:tgtEl>
+                                        <p:attrNameLst>
+                                          <p:attrName>style.visibility</p:attrName>
+                                        </p:attrNameLst>
+                                      </p:cBhvr>
+                                      <p:to>
+                                        <p:strVal val="visible"/>
+                                      </p:to>
+                                    </p:set>
+                                  </p:childTnLst>
+                                </p:cTn>
+                              </p:par>
+                              <p:par>
+                                <p:cTn id="45" presetID="1" presetClass="entr" presetSubtype="0" fill="hold" grpId="0" nodeType="withEffect">
+                                  <p:stCondLst>
+                                    <p:cond delay="0"/>
+                                  </p:stCondLst>
+                                  <p:childTnLst>
+                                    <p:set>
+                                      <p:cBhvr>
+                                        <p:cTn id="46" dur="1" fill="hold">
+                                          <p:stCondLst>
+                                            <p:cond delay="0"/>
+                                          </p:stCondLst>
+                                        </p:cTn>
+                                        <p:tgtEl>
+                                          <p:spTgt spid="12"/>
+                                        </p:tgtEl>
+                                        <p:attrNameLst>
+                                          <p:attrName>style.visibility</p:attrName>
+                                        </p:attrNameLst>
+                                      </p:cBhvr>
+                                      <p:to>
+                                        <p:strVal val="visible"/>
+                                      </p:to>
+                                    </p:set>
+                                  </p:childTnLst>
+                                </p:cTn>
+                              </p:par>
+                              <p:par>
+                                <p:cTn id="47" presetID="1" presetClass="entr" presetSubtype="0" fill="hold" grpId="0" nodeType="withEffect">
+                                  <p:stCondLst>
+                                    <p:cond delay="0"/>
+                                  </p:stCondLst>
+                                  <p:childTnLst>
+                                    <p:set>
+                                      <p:cBhvr>
+                                        <p:cTn id="48" dur="1" fill="hold">
+                                          <p:stCondLst>
+                                            <p:cond delay="0"/>
+                                          </p:stCondLst>
+                                        </p:cTn>
+                                        <p:tgtEl>
+                                          <p:spTgt spid="19"/>
+                                        </p:tgtEl>
+                                        <p:attrNameLst>
+                                          <p:attrName>style.visibility</p:attrName>
+                                        </p:attrNameLst>
+                                      </p:cBhvr>
+                                      <p:to>
+                                        <p:strVal val="visible"/>
+                                      </p:to>
+                                    </p:set>
+                                  </p:childTnLst>
+                                </p:cTn>
+                              </p:par>
+                              <p:par>
+                                <p:cTn id="49" presetID="1" presetClass="entr" presetSubtype="0" fill="hold" grpId="0" nodeType="withEffect">
+                                  <p:stCondLst>
+                                    <p:cond delay="0"/>
+                                  </p:stCondLst>
+                                  <p:childTnLst>
+                                    <p:set>
+                                      <p:cBhvr>
+                                        <p:cTn id="50" dur="1" fill="hold">
+                                          <p:stCondLst>
+                                            <p:cond delay="0"/>
+                                          </p:stCondLst>
+                                        </p:cTn>
+                                        <p:tgtEl>
+                                          <p:spTgt spid="20"/>
+                                        </p:tgtEl>
+                                        <p:attrNameLst>
+                                          <p:attrName>style.visibility</p:attrName>
+                                        </p:attrNameLst>
+                                      </p:cBhvr>
+                                      <p:to>
+                                        <p:strVal val="visible"/>
+                                      </p:to>
+                                    </p:set>
+                                  </p:childTnLst>
+                                </p:cTn>
+                              </p:par>
+                            </p:childTnLst>
+                          </p:cTn>
+                        </p:par>
+                      </p:childTnLst>
+                    </p:cTn>
+                  </p:par>
+                </p:childTnLst>
+              </p:cTn>
+              <p:prevCondLst>
+                <p:cond evt="onPrev" delay="0">
+                  <p:tgtEl>
+                    <p:sldTgt/>
+                  </p:tgtEl>
+                </p:cond>
+              </p:prevCondLst>
+              <p:nextCondLst>
+                <p:cond evt="onNext" delay="0">
+                  <p:tgtEl>
+                    <p:sldTgt/>
+                  </p:tgtEl>
+                </p:cond>
+              </p:nextCondLst>
+            </p:seq>
+          </p:childTnLst>
+        </p:cTn>
+      </p:par>
+    </p:tnLst>
+    <p:bldLst>
+      <p:bldP spid="5" grpId="0" animBg="1"/>
+      <p:bldP spid="6" grpId="0" animBg="1"/>
+      <p:bldP spid="9" grpId="0" animBg="1"/>
+      <p:bldP spid="10" grpId="0" animBg="1"/>
+      <p:bldP spid="11" grpId="0" animBg="1"/>
+      <p:bldP spid="12" grpId="0" animBg="1"/>
+      <p:bldP spid="13" grpId="0" animBg="1"/>
+      <p:bldP spid="14" grpId="0" animBg="1"/>
+      <p:bldP spid="15" grpId="0" animBg="1"/>
+      <p:bldP spid="16" grpId="0" animBg="1"/>
+      <p:bldP spid="17" grpId="0" animBg="1"/>
+      <p:bldP spid="18" grpId="0" animBg="1"/>
+      <p:bldP spid="19" grpId="0" animBg="1"/>
+      <p:bldP spid="20" grpId="0" animBg="1"/>
+    </p:bldLst>
+  </p:timing>
+</p:sld>
+</file>
+
+<file path=ppt/slides/slide38.xml><?xml version="1.0" encoding="utf-8"?>
+<p:sld xmlns:a="http://schemas.openxmlformats.org/drawingml/2006/main" xmlns:r="http://schemas.openxmlformats.org/officeDocument/2006/relationships" xmlns:p="http://schemas.openxmlformats.org/presentationml/2006/main">
+  <p:cSld>
+    <p:spTree>
+      <p:nvGrpSpPr>
+        <p:cNvPr id="1" name=""/>
+        <p:cNvGrpSpPr/>
+        <p:nvPr/>
+      </p:nvGrpSpPr>
+      <p:grpSpPr>
+        <a:xfrm>
+          <a:off x="0" y="0"/>
+          <a:ext cx="0" cy="0"/>
+          <a:chOff x="0" y="0"/>
+          <a:chExt cx="0" cy="0"/>
+        </a:xfrm>
+      </p:grpSpPr>
+      <p:sp>
+        <p:nvSpPr>
+          <p:cNvPr id="2" name="Title 1"/>
+          <p:cNvSpPr>
+            <a:spLocks noGrp="1"/>
+          </p:cNvSpPr>
+          <p:nvPr>
+            <p:ph type="title"/>
+          </p:nvPr>
+        </p:nvSpPr>
+        <p:spPr>
+          <a:xfrm>
+            <a:off x="677334" y="109870"/>
+            <a:ext cx="8596668" cy="613144"/>
+          </a:xfrm>
+        </p:spPr>
+        <p:txBody>
+          <a:bodyPr>
+            <a:normAutofit fontScale="90000"/>
+          </a:bodyPr>
+          <a:lstStyle/>
+          <a:p>
+            <a:r>
+              <a:rPr lang="en-GB" dirty="0"/>
+              <a:t>Working with Shorthand Properties</a:t>
+            </a:r>
+            <a:endParaRPr lang="en-GB" dirty="0"/>
+          </a:p>
+        </p:txBody>
+      </p:sp>
+      <p:sp>
+        <p:nvSpPr>
+          <p:cNvPr id="3" name="Content Placeholder 2"/>
+          <p:cNvSpPr>
+            <a:spLocks noGrp="1"/>
+          </p:cNvSpPr>
+          <p:nvPr>
+            <p:ph idx="1"/>
+          </p:nvPr>
+        </p:nvSpPr>
+        <p:spPr>
+          <a:xfrm>
+            <a:off x="379621" y="874900"/>
+            <a:ext cx="11206716" cy="5876773"/>
+          </a:xfrm>
+        </p:spPr>
+        <p:txBody>
+          <a:bodyPr/>
+          <a:lstStyle/>
+          <a:p>
+            <a:r>
+              <a:rPr lang="en-IN" dirty="0"/>
+              <a:t>The sequence of </a:t>
+            </a:r>
+            <a:r>
+              <a:rPr lang="en-IN" dirty="0" smtClean="0"/>
+              <a:t>individual </a:t>
+            </a:r>
+            <a:r>
+              <a:rPr lang="en-IN" dirty="0"/>
+              <a:t>properties does not matter if they have different type of values.</a:t>
+            </a:r>
+          </a:p>
+          <a:p>
+            <a:r>
+              <a:rPr lang="en-IN" dirty="0"/>
+              <a:t>If they have similar type of values special handling is needed that we will study in upcoming slides</a:t>
+            </a:r>
+          </a:p>
+          <a:p>
+            <a:r>
+              <a:rPr lang="en-IN" dirty="0"/>
+              <a:t>We can use shorthand to set only maybe just one property like border </a:t>
+            </a:r>
+            <a:r>
+              <a:rPr lang="en-IN" dirty="0" err="1"/>
+              <a:t>color</a:t>
+            </a:r>
+            <a:r>
+              <a:rPr lang="en-IN" dirty="0"/>
+              <a:t> and all other properties take default values</a:t>
+            </a:r>
+            <a:endParaRPr lang="en-GB" dirty="0"/>
+          </a:p>
+          <a:p>
+            <a:r>
+              <a:rPr lang="en-IN" dirty="0" smtClean="0"/>
+              <a:t>If we go to developer tools we will notice an arrow after all the </a:t>
+            </a:r>
+            <a:r>
+              <a:rPr lang="en-IN" dirty="0" err="1" smtClean="0"/>
+              <a:t>shorthands</a:t>
+            </a:r>
+            <a:r>
+              <a:rPr lang="en-IN" dirty="0" smtClean="0"/>
+              <a:t> we used and if we click on that we can see all the individual long form properties that were set implicitly</a:t>
+            </a:r>
+          </a:p>
+          <a:p>
+            <a:endParaRPr lang="en-GB" dirty="0"/>
+          </a:p>
+        </p:txBody>
+      </p:sp>
+      <p:pic>
+        <p:nvPicPr>
+          <p:cNvPr id="4" name="Picture 3"/>
+          <p:cNvPicPr>
+            <a:picLocks noChangeAspect="1"/>
+          </p:cNvPicPr>
+          <p:nvPr/>
+        </p:nvPicPr>
+        <p:blipFill>
+          <a:blip r:embed="rId3"/>
+          <a:stretch>
+            <a:fillRect/>
+          </a:stretch>
+        </p:blipFill>
+        <p:spPr>
+          <a:xfrm>
+            <a:off x="176974" y="3143356"/>
+            <a:ext cx="3353268" cy="3229426"/>
+          </a:xfrm>
+          <a:prstGeom prst="rect">
+            <a:avLst/>
+          </a:prstGeom>
+        </p:spPr>
+      </p:pic>
+      <p:pic>
+        <p:nvPicPr>
+          <p:cNvPr id="7" name="Picture 6"/>
+          <p:cNvPicPr>
+            <a:picLocks noChangeAspect="1"/>
+          </p:cNvPicPr>
+          <p:nvPr/>
+        </p:nvPicPr>
+        <p:blipFill>
+          <a:blip r:embed="rId4"/>
+          <a:stretch>
+            <a:fillRect/>
+          </a:stretch>
+        </p:blipFill>
+        <p:spPr>
+          <a:xfrm>
+            <a:off x="3732889" y="3143356"/>
+            <a:ext cx="3543795" cy="3262768"/>
+          </a:xfrm>
+          <a:prstGeom prst="rect">
+            <a:avLst/>
+          </a:prstGeom>
+        </p:spPr>
+      </p:pic>
+      <p:pic>
+        <p:nvPicPr>
+          <p:cNvPr id="23" name="Picture 22"/>
+          <p:cNvPicPr>
+            <a:picLocks noChangeAspect="1"/>
+          </p:cNvPicPr>
+          <p:nvPr/>
+        </p:nvPicPr>
+        <p:blipFill>
+          <a:blip r:embed="rId5"/>
+          <a:stretch>
+            <a:fillRect/>
+          </a:stretch>
+        </p:blipFill>
+        <p:spPr>
+          <a:xfrm>
+            <a:off x="7591645" y="3110014"/>
+            <a:ext cx="4465676" cy="3296110"/>
+          </a:xfrm>
+          <a:prstGeom prst="rect">
+            <a:avLst/>
+          </a:prstGeom>
+        </p:spPr>
+      </p:pic>
+    </p:spTree>
+    <p:extLst>
+      <p:ext uri="{BB962C8B-B14F-4D97-AF65-F5344CB8AC3E}">
+        <p14:creationId xmlns:p14="http://schemas.microsoft.com/office/powerpoint/2010/main" val="2539947009"/>
+      </p:ext>
+    </p:extLst>
+  </p:cSld>
+  <p:clrMapOvr>
+    <a:masterClrMapping/>
+  </p:clrMapOvr>
+  <p:timing>
+    <p:tnLst>
+      <p:par>
+        <p:cTn id="1" dur="indefinite" restart="never" nodeType="tmRoot"/>
+      </p:par>
+    </p:tnLst>
+  </p:timing>
+</p:sld>
+</file>
+
+<file path=ppt/slides/slide39.xml><?xml version="1.0" encoding="utf-8"?>
 <p:sld xmlns:a="http://schemas.openxmlformats.org/drawingml/2006/main" xmlns:r="http://schemas.openxmlformats.org/officeDocument/2006/relationships" xmlns:p="http://schemas.openxmlformats.org/presentationml/2006/main" showMasterSp="0">
   <p:cSld>
     <p:spTree>

</xml_diff>

<commit_message>
Diving Into the Height & Width Properties
</commit_message>
<xml_diff>
--- a/PPT/Css-v3.pptx
+++ b/PPT/Css-v3.pptx
@@ -5,7 +5,7 @@
     <p:sldMasterId id="2147483660" r:id="rId1"/>
   </p:sldMasterIdLst>
   <p:notesMasterIdLst>
-    <p:notesMasterId r:id="rId41"/>
+    <p:notesMasterId r:id="rId42"/>
   </p:notesMasterIdLst>
   <p:sldIdLst>
     <p:sldId id="256" r:id="rId2"/>
@@ -46,7 +46,8 @@
     <p:sldId id="398" r:id="rId37"/>
     <p:sldId id="399" r:id="rId38"/>
     <p:sldId id="401" r:id="rId39"/>
-    <p:sldId id="268" r:id="rId40"/>
+    <p:sldId id="402" r:id="rId40"/>
+    <p:sldId id="268" r:id="rId41"/>
   </p:sldIdLst>
   <p:sldSz cx="12192000" cy="6858000"/>
   <p:notesSz cx="6858000" cy="9144000"/>
@@ -21294,7 +21295,6 @@
               <a:rPr lang="en-GB" dirty="0"/>
               <a:t>Working with Shorthand Properties</a:t>
             </a:r>
-            <a:endParaRPr lang="en-GB" dirty="0"/>
           </a:p>
         </p:txBody>
       </p:sp>
@@ -22929,7 +22929,6 @@
               <a:rPr lang="en-GB" dirty="0"/>
               <a:t>Working with Shorthand Properties</a:t>
             </a:r>
-            <a:endParaRPr lang="en-GB" dirty="0"/>
           </a:p>
         </p:txBody>
       </p:sp>
@@ -23099,7 +23098,7 @@
 </file>
 
 <file path=ppt/slides/slide39.xml><?xml version="1.0" encoding="utf-8"?>
-<p:sld xmlns:a="http://schemas.openxmlformats.org/drawingml/2006/main" xmlns:r="http://schemas.openxmlformats.org/officeDocument/2006/relationships" xmlns:p="http://schemas.openxmlformats.org/presentationml/2006/main" showMasterSp="0">
+<p:sld xmlns:a="http://schemas.openxmlformats.org/drawingml/2006/main" xmlns:r="http://schemas.openxmlformats.org/officeDocument/2006/relationships" xmlns:p="http://schemas.openxmlformats.org/presentationml/2006/main">
   <p:cSld>
     <p:spTree>
       <p:nvGrpSpPr>
@@ -23117,6 +23116,34 @@
       </p:grpSpPr>
       <p:sp>
         <p:nvSpPr>
+          <p:cNvPr id="2" name="Title 1"/>
+          <p:cNvSpPr>
+            <a:spLocks noGrp="1"/>
+          </p:cNvSpPr>
+          <p:nvPr>
+            <p:ph type="title"/>
+          </p:nvPr>
+        </p:nvSpPr>
+        <p:spPr>
+          <a:xfrm>
+            <a:off x="868719" y="120503"/>
+            <a:ext cx="10571913" cy="655674"/>
+          </a:xfrm>
+        </p:spPr>
+        <p:txBody>
+          <a:bodyPr/>
+          <a:lstStyle/>
+          <a:p>
+            <a:r>
+              <a:rPr lang="en-IN" dirty="0"/>
+              <a:t>Diving Into the Height &amp; Width Properties</a:t>
+            </a:r>
+            <a:endParaRPr lang="en-GB" dirty="0"/>
+          </a:p>
+        </p:txBody>
+      </p:sp>
+      <p:sp>
+        <p:nvSpPr>
           <p:cNvPr id="3" name="Content Placeholder 2"/>
           <p:cNvSpPr>
             <a:spLocks noGrp="1"/>
@@ -23127,44 +23154,123 @@
         </p:nvSpPr>
         <p:spPr>
           <a:xfrm>
-            <a:off x="3163860" y="2754147"/>
-            <a:ext cx="8596668" cy="3880773"/>
+            <a:off x="677333" y="776177"/>
+            <a:ext cx="10497485" cy="6081823"/>
           </a:xfrm>
         </p:spPr>
         <p:txBody>
           <a:bodyPr>
-            <a:normAutofit/>
+            <a:normAutofit lnSpcReduction="10000"/>
           </a:bodyPr>
           <a:lstStyle/>
           <a:p>
-            <a:pPr marL="0" indent="0">
-              <a:buNone/>
-            </a:pPr>
-            <a:r>
-              <a:rPr lang="en-IN" sz="5400" b="1" smtClean="0"/>
-              <a:t>Thanks!!!!!</a:t>
-            </a:r>
-            <a:endParaRPr lang="en-GB" sz="5400" b="1" dirty="0"/>
+            <a:r>
+              <a:rPr lang="en-GB" dirty="0" smtClean="0"/>
+              <a:t>Now we have a fair understanding of margin and border  now lets remove the  margin border and padding of </a:t>
+            </a:r>
+            <a:r>
+              <a:rPr lang="en-IN" dirty="0" smtClean="0"/>
+              <a:t>#</a:t>
+            </a:r>
+            <a:r>
+              <a:rPr lang="en-GB" dirty="0" smtClean="0"/>
+              <a:t>product-overview selector . Now we only have one change that we don’t have the margin applied by the body.</a:t>
+            </a:r>
+          </a:p>
+          <a:p>
+            <a:r>
+              <a:rPr lang="en-GB" dirty="0" smtClean="0"/>
+              <a:t>Now if we set the width of section to 100% we don’t see any change because section div </a:t>
+            </a:r>
+            <a:r>
+              <a:rPr lang="en-GB" dirty="0" err="1" smtClean="0"/>
+              <a:t>etc</a:t>
+            </a:r>
+            <a:r>
+              <a:rPr lang="en-GB" dirty="0" smtClean="0"/>
+              <a:t> are block elements and by default take 100% of the screen width.</a:t>
+            </a:r>
+          </a:p>
+          <a:p>
+            <a:r>
+              <a:rPr lang="en-GB" dirty="0" smtClean="0"/>
+              <a:t>If we now set the width to 50% we will see the box shrinks to 50% of page </a:t>
+            </a:r>
+            <a:r>
+              <a:rPr lang="en-GB" dirty="0" err="1" smtClean="0"/>
+              <a:t>width.It</a:t>
+            </a:r>
+            <a:r>
+              <a:rPr lang="en-GB" dirty="0" smtClean="0"/>
+              <a:t> actually shrinks to 50% of the width taken by surrounding container i.e. the &lt;main&gt; tag which is again a block element and takes whole page width so 50% of width of main which in turn is 50% of width of the page.</a:t>
+            </a:r>
+          </a:p>
+          <a:p>
+            <a:r>
+              <a:rPr lang="en-GB" dirty="0" smtClean="0"/>
+              <a:t>So width can either be set relatively with % or with absolute values like </a:t>
+            </a:r>
+            <a:r>
+              <a:rPr lang="en-GB" dirty="0" err="1" smtClean="0"/>
+              <a:t>px</a:t>
+            </a:r>
+            <a:r>
+              <a:rPr lang="en-GB" dirty="0" smtClean="0"/>
+              <a:t> or rem </a:t>
+            </a:r>
+            <a:r>
+              <a:rPr lang="en-GB" dirty="0" err="1" smtClean="0"/>
+              <a:t>etc</a:t>
+            </a:r>
+            <a:endParaRPr lang="en-GB" dirty="0" smtClean="0"/>
+          </a:p>
+          <a:p>
+            <a:r>
+              <a:rPr lang="en-GB" dirty="0" smtClean="0"/>
+              <a:t>Now if we set the height of our section to 100% we will see only a small change it wont span to the end of the page.</a:t>
+            </a:r>
+          </a:p>
+          <a:p>
+            <a:r>
+              <a:rPr lang="en-GB" dirty="0" smtClean="0"/>
+              <a:t>The reason is 100% refers to the available height of surrounding element </a:t>
+            </a:r>
+            <a:r>
+              <a:rPr lang="en-GB" dirty="0" err="1" smtClean="0"/>
+              <a:t>i.e</a:t>
+            </a:r>
+            <a:r>
+              <a:rPr lang="en-GB" dirty="0" smtClean="0"/>
+              <a:t> &lt;main&gt; and the height of main grows dynamically it grows based on the content it has.</a:t>
+            </a:r>
+          </a:p>
+          <a:p>
+            <a:r>
+              <a:rPr lang="en-GB" dirty="0" smtClean="0"/>
+              <a:t>So if we set the height of main to 100% we still don’t see a change because it’s parent is &lt;Body&gt; which has dynamic height too and its parent is &lt;html&gt; which has dynamic height too so to see a change we need to set height 100% on all of them to creating a chain and passing the height of 100% down to our section element.</a:t>
+            </a:r>
+          </a:p>
+          <a:p>
+            <a:r>
+              <a:rPr lang="en-GB" dirty="0" smtClean="0"/>
+              <a:t>For now just remove all these heights and set the height of section to 528px;</a:t>
+            </a:r>
+          </a:p>
+          <a:p>
+            <a:endParaRPr lang="en-GB" dirty="0"/>
           </a:p>
         </p:txBody>
       </p:sp>
     </p:spTree>
     <p:extLst>
       <p:ext uri="{BB962C8B-B14F-4D97-AF65-F5344CB8AC3E}">
-        <p14:creationId xmlns:p14="http://schemas.microsoft.com/office/powerpoint/2010/main" val="3977684842"/>
+        <p14:creationId xmlns:p14="http://schemas.microsoft.com/office/powerpoint/2010/main" val="949907730"/>
       </p:ext>
     </p:extLst>
   </p:cSld>
   <p:clrMapOvr>
     <a:masterClrMapping/>
   </p:clrMapOvr>
-  <p:timing>
-    <p:tnLst>
-      <p:par>
-        <p:cTn id="1" dur="indefinite" restart="never" nodeType="tmRoot"/>
-      </p:par>
-    </p:tnLst>
-  </p:timing>
 </p:sld>
 </file>
 
@@ -23272,6 +23378,76 @@
     <p:extLst>
       <p:ext uri="{BB962C8B-B14F-4D97-AF65-F5344CB8AC3E}">
         <p14:creationId xmlns:p14="http://schemas.microsoft.com/office/powerpoint/2010/main" val="1886457352"/>
+      </p:ext>
+    </p:extLst>
+  </p:cSld>
+  <p:clrMapOvr>
+    <a:masterClrMapping/>
+  </p:clrMapOvr>
+  <p:timing>
+    <p:tnLst>
+      <p:par>
+        <p:cTn id="1" dur="indefinite" restart="never" nodeType="tmRoot"/>
+      </p:par>
+    </p:tnLst>
+  </p:timing>
+</p:sld>
+</file>
+
+<file path=ppt/slides/slide40.xml><?xml version="1.0" encoding="utf-8"?>
+<p:sld xmlns:a="http://schemas.openxmlformats.org/drawingml/2006/main" xmlns:r="http://schemas.openxmlformats.org/officeDocument/2006/relationships" xmlns:p="http://schemas.openxmlformats.org/presentationml/2006/main" showMasterSp="0">
+  <p:cSld>
+    <p:spTree>
+      <p:nvGrpSpPr>
+        <p:cNvPr id="1" name=""/>
+        <p:cNvGrpSpPr/>
+        <p:nvPr/>
+      </p:nvGrpSpPr>
+      <p:grpSpPr>
+        <a:xfrm>
+          <a:off x="0" y="0"/>
+          <a:ext cx="0" cy="0"/>
+          <a:chOff x="0" y="0"/>
+          <a:chExt cx="0" cy="0"/>
+        </a:xfrm>
+      </p:grpSpPr>
+      <p:sp>
+        <p:nvSpPr>
+          <p:cNvPr id="3" name="Content Placeholder 2"/>
+          <p:cNvSpPr>
+            <a:spLocks noGrp="1"/>
+          </p:cNvSpPr>
+          <p:nvPr>
+            <p:ph idx="1"/>
+          </p:nvPr>
+        </p:nvSpPr>
+        <p:spPr>
+          <a:xfrm>
+            <a:off x="3163860" y="2754147"/>
+            <a:ext cx="8596668" cy="3880773"/>
+          </a:xfrm>
+        </p:spPr>
+        <p:txBody>
+          <a:bodyPr>
+            <a:normAutofit/>
+          </a:bodyPr>
+          <a:lstStyle/>
+          <a:p>
+            <a:pPr marL="0" indent="0">
+              <a:buNone/>
+            </a:pPr>
+            <a:r>
+              <a:rPr lang="en-IN" sz="5400" b="1" smtClean="0"/>
+              <a:t>Thanks!!!!!</a:t>
+            </a:r>
+            <a:endParaRPr lang="en-GB" sz="5400" b="1" dirty="0"/>
+          </a:p>
+        </p:txBody>
+      </p:sp>
+    </p:spTree>
+    <p:extLst>
+      <p:ext uri="{BB962C8B-B14F-4D97-AF65-F5344CB8AC3E}">
+        <p14:creationId xmlns:p14="http://schemas.microsoft.com/office/powerpoint/2010/main" val="3977684842"/>
       </p:ext>
     </p:extLst>
   </p:cSld>

</xml_diff>

<commit_message>
Adding the Header to our Project
</commit_message>
<xml_diff>
--- a/PPT/Css-v3.pptx
+++ b/PPT/Css-v3.pptx
@@ -5,7 +5,7 @@
     <p:sldMasterId id="2147483660" r:id="rId1"/>
   </p:sldMasterIdLst>
   <p:notesMasterIdLst>
-    <p:notesMasterId r:id="rId43"/>
+    <p:notesMasterId r:id="rId44"/>
   </p:notesMasterIdLst>
   <p:sldIdLst>
     <p:sldId id="256" r:id="rId2"/>
@@ -48,7 +48,8 @@
     <p:sldId id="401" r:id="rId39"/>
     <p:sldId id="402" r:id="rId40"/>
     <p:sldId id="403" r:id="rId41"/>
-    <p:sldId id="268" r:id="rId42"/>
+    <p:sldId id="404" r:id="rId42"/>
+    <p:sldId id="268" r:id="rId43"/>
   </p:sldIdLst>
   <p:sldSz cx="12192000" cy="6858000"/>
   <p:notesSz cx="6858000" cy="9144000"/>
@@ -23438,7 +23439,6 @@
               <a:rPr lang="en-GB" dirty="0"/>
               <a:t>Understanding Box Sizing</a:t>
             </a:r>
-            <a:endParaRPr lang="en-GB" dirty="0"/>
           </a:p>
         </p:txBody>
       </p:sp>
@@ -23535,6 +23535,165 @@
 </file>
 
 <file path=ppt/slides/slide41.xml><?xml version="1.0" encoding="utf-8"?>
+<p:sld xmlns:a="http://schemas.openxmlformats.org/drawingml/2006/main" xmlns:r="http://schemas.openxmlformats.org/officeDocument/2006/relationships" xmlns:p="http://schemas.openxmlformats.org/presentationml/2006/main">
+  <p:cSld>
+    <p:spTree>
+      <p:nvGrpSpPr>
+        <p:cNvPr id="1" name=""/>
+        <p:cNvGrpSpPr/>
+        <p:nvPr/>
+      </p:nvGrpSpPr>
+      <p:grpSpPr>
+        <a:xfrm>
+          <a:off x="0" y="0"/>
+          <a:ext cx="0" cy="0"/>
+          <a:chOff x="0" y="0"/>
+          <a:chExt cx="0" cy="0"/>
+        </a:xfrm>
+      </p:grpSpPr>
+      <p:sp>
+        <p:nvSpPr>
+          <p:cNvPr id="2" name="Title 1"/>
+          <p:cNvSpPr>
+            <a:spLocks noGrp="1"/>
+          </p:cNvSpPr>
+          <p:nvPr>
+            <p:ph type="title"/>
+          </p:nvPr>
+        </p:nvSpPr>
+        <p:spPr>
+          <a:xfrm>
+            <a:off x="677334" y="193964"/>
+            <a:ext cx="8596668" cy="647700"/>
+          </a:xfrm>
+        </p:spPr>
+        <p:txBody>
+          <a:bodyPr/>
+          <a:lstStyle/>
+          <a:p>
+            <a:r>
+              <a:rPr lang="en-IN" dirty="0"/>
+              <a:t>Adding the Header to our Project</a:t>
+            </a:r>
+            <a:endParaRPr lang="en-GB" dirty="0"/>
+          </a:p>
+        </p:txBody>
+      </p:sp>
+      <p:sp>
+        <p:nvSpPr>
+          <p:cNvPr id="3" name="Content Placeholder 2"/>
+          <p:cNvSpPr>
+            <a:spLocks noGrp="1"/>
+          </p:cNvSpPr>
+          <p:nvPr>
+            <p:ph idx="1"/>
+          </p:nvPr>
+        </p:nvSpPr>
+        <p:spPr>
+          <a:xfrm>
+            <a:off x="677334" y="987137"/>
+            <a:ext cx="10981266" cy="5054226"/>
+          </a:xfrm>
+        </p:spPr>
+        <p:txBody>
+          <a:bodyPr/>
+          <a:lstStyle/>
+          <a:p>
+            <a:r>
+              <a:rPr lang="en-GB" dirty="0" smtClean="0"/>
+              <a:t>Now lets remove the border too from the section.</a:t>
+            </a:r>
+          </a:p>
+          <a:p>
+            <a:r>
+              <a:rPr lang="en-GB" dirty="0" smtClean="0"/>
+              <a:t>Also I have added some code to our index.html to add an ugly looking navigation bar to the code.</a:t>
+            </a:r>
+          </a:p>
+          <a:p>
+            <a:r>
+              <a:rPr lang="en-GB" dirty="0" smtClean="0"/>
+              <a:t>Now lets try to make the header look a bit better so first since we might use the header tag again in our code so lets add a class main-header to our header tag and use the class selector to add </a:t>
+            </a:r>
+            <a:r>
+              <a:rPr lang="en-GB" dirty="0" err="1" smtClean="0"/>
+              <a:t>css</a:t>
+            </a:r>
+            <a:r>
+              <a:rPr lang="en-GB" dirty="0" smtClean="0"/>
+              <a:t> to it</a:t>
+            </a:r>
+          </a:p>
+          <a:p>
+            <a:r>
+              <a:rPr lang="en-IN" dirty="0" smtClean="0"/>
+              <a:t>So now we want to have a navigation bar that spans the whole screen width ,has a green background </a:t>
+            </a:r>
+            <a:r>
+              <a:rPr lang="en-IN" dirty="0" err="1" smtClean="0"/>
+              <a:t>color</a:t>
+            </a:r>
+            <a:r>
+              <a:rPr lang="en-IN" dirty="0" smtClean="0"/>
+              <a:t>, and also it should have some padding so that the content of the header doesn’t sit on the edges</a:t>
+            </a:r>
+          </a:p>
+          <a:p>
+            <a:r>
+              <a:rPr lang="en-IN" dirty="0" smtClean="0"/>
+              <a:t>So now add width:100% , </a:t>
+            </a:r>
+            <a:r>
+              <a:rPr lang="en-IN" smtClean="0"/>
+              <a:t>background:#2ddf5c,padding:8px </a:t>
+            </a:r>
+            <a:r>
+              <a:rPr lang="en-IN" dirty="0" smtClean="0"/>
+              <a:t>16px to achieve the full </a:t>
+            </a:r>
+            <a:r>
+              <a:rPr lang="en-IN" dirty="0" err="1" smtClean="0"/>
+              <a:t>width,background</a:t>
+            </a:r>
+            <a:r>
+              <a:rPr lang="en-IN" dirty="0" smtClean="0"/>
+              <a:t> </a:t>
+            </a:r>
+            <a:r>
+              <a:rPr lang="en-IN" dirty="0" err="1" smtClean="0"/>
+              <a:t>color</a:t>
+            </a:r>
+            <a:r>
+              <a:rPr lang="en-IN" dirty="0" smtClean="0"/>
+              <a:t> and padding.</a:t>
+            </a:r>
+          </a:p>
+          <a:p>
+            <a:pPr marL="0" indent="0">
+              <a:buNone/>
+            </a:pPr>
+            <a:r>
+              <a:rPr lang="en-IN" dirty="0" smtClean="0"/>
+              <a:t> </a:t>
+            </a:r>
+            <a:endParaRPr lang="en-GB" dirty="0"/>
+          </a:p>
+        </p:txBody>
+      </p:sp>
+    </p:spTree>
+    <p:extLst>
+      <p:ext uri="{BB962C8B-B14F-4D97-AF65-F5344CB8AC3E}">
+        <p14:creationId xmlns:p14="http://schemas.microsoft.com/office/powerpoint/2010/main" val="4086477632"/>
+      </p:ext>
+    </p:extLst>
+  </p:cSld>
+  <p:clrMapOvr>
+    <a:masterClrMapping/>
+  </p:clrMapOvr>
+</p:sld>
+</file>
+
+<file path=ppt/slides/slide42.xml><?xml version="1.0" encoding="utf-8"?>
 <p:sld xmlns:a="http://schemas.openxmlformats.org/drawingml/2006/main" xmlns:r="http://schemas.openxmlformats.org/officeDocument/2006/relationships" xmlns:p="http://schemas.openxmlformats.org/presentationml/2006/main" showMasterSp="0">
   <p:cSld>
     <p:spTree>

</xml_diff>

<commit_message>
Understanding the Display Property
</commit_message>
<xml_diff>
--- a/PPT/Css-v3.pptx
+++ b/PPT/Css-v3.pptx
@@ -5,7 +5,7 @@
     <p:sldMasterId id="2147483660" r:id="rId1"/>
   </p:sldMasterIdLst>
   <p:notesMasterIdLst>
-    <p:notesMasterId r:id="rId44"/>
+    <p:notesMasterId r:id="rId47"/>
   </p:notesMasterIdLst>
   <p:sldIdLst>
     <p:sldId id="256" r:id="rId2"/>
@@ -49,7 +49,10 @@
     <p:sldId id="402" r:id="rId40"/>
     <p:sldId id="403" r:id="rId41"/>
     <p:sldId id="404" r:id="rId42"/>
-    <p:sldId id="268" r:id="rId43"/>
+    <p:sldId id="405" r:id="rId43"/>
+    <p:sldId id="406" r:id="rId44"/>
+    <p:sldId id="407" r:id="rId45"/>
+    <p:sldId id="268" r:id="rId46"/>
   </p:sldIdLst>
   <p:sldSz cx="12192000" cy="6858000"/>
   <p:notesSz cx="6858000" cy="9144000"/>
@@ -23694,6 +23697,554 @@
 </file>
 
 <file path=ppt/slides/slide42.xml><?xml version="1.0" encoding="utf-8"?>
+<p:sld xmlns:a="http://schemas.openxmlformats.org/drawingml/2006/main" xmlns:r="http://schemas.openxmlformats.org/officeDocument/2006/relationships" xmlns:p="http://schemas.openxmlformats.org/presentationml/2006/main">
+  <p:cSld>
+    <p:spTree>
+      <p:nvGrpSpPr>
+        <p:cNvPr id="1" name=""/>
+        <p:cNvGrpSpPr/>
+        <p:nvPr/>
+      </p:nvGrpSpPr>
+      <p:grpSpPr>
+        <a:xfrm>
+          <a:off x="0" y="0"/>
+          <a:ext cx="0" cy="0"/>
+          <a:chOff x="0" y="0"/>
+          <a:chExt cx="0" cy="0"/>
+        </a:xfrm>
+      </p:grpSpPr>
+      <p:sp>
+        <p:nvSpPr>
+          <p:cNvPr id="2" name="Title 1"/>
+          <p:cNvSpPr>
+            <a:spLocks noGrp="1"/>
+          </p:cNvSpPr>
+          <p:nvPr>
+            <p:ph type="title"/>
+          </p:nvPr>
+        </p:nvSpPr>
+        <p:spPr>
+          <a:xfrm>
+            <a:off x="874761" y="142009"/>
+            <a:ext cx="8596668" cy="554182"/>
+          </a:xfrm>
+        </p:spPr>
+        <p:txBody>
+          <a:bodyPr>
+            <a:normAutofit fontScale="90000"/>
+          </a:bodyPr>
+          <a:lstStyle/>
+          <a:p>
+            <a:r>
+              <a:rPr lang="en-GB" dirty="0"/>
+              <a:t>Understanding the Display Property</a:t>
+            </a:r>
+            <a:endParaRPr lang="en-GB" dirty="0"/>
+          </a:p>
+        </p:txBody>
+      </p:sp>
+      <p:sp>
+        <p:nvSpPr>
+          <p:cNvPr id="3" name="Content Placeholder 2"/>
+          <p:cNvSpPr>
+            <a:spLocks noGrp="1"/>
+          </p:cNvSpPr>
+          <p:nvPr>
+            <p:ph idx="1"/>
+          </p:nvPr>
+        </p:nvSpPr>
+        <p:spPr>
+          <a:xfrm>
+            <a:off x="448733" y="1059872"/>
+            <a:ext cx="11220257" cy="5064617"/>
+          </a:xfrm>
+        </p:spPr>
+        <p:txBody>
+          <a:bodyPr/>
+          <a:lstStyle/>
+          <a:p>
+            <a:r>
+              <a:rPr lang="en-IN" dirty="0" smtClean="0"/>
+              <a:t>Now if we notice in our header the list elements don’t look so good it would have been better if we could change their placement.</a:t>
+            </a:r>
+          </a:p>
+          <a:p>
+            <a:r>
+              <a:rPr lang="en-IN" dirty="0" smtClean="0"/>
+              <a:t>So now first of all to access them in </a:t>
+            </a:r>
+            <a:r>
+              <a:rPr lang="en-IN" dirty="0" err="1" smtClean="0"/>
+              <a:t>css</a:t>
+            </a:r>
+            <a:r>
+              <a:rPr lang="en-IN" dirty="0" smtClean="0"/>
+              <a:t> lets add a class to them ,lets use a specific naming convention called </a:t>
+            </a:r>
+            <a:r>
+              <a:rPr lang="en-IN" dirty="0" err="1" smtClean="0"/>
+              <a:t>bem</a:t>
+            </a:r>
+            <a:r>
+              <a:rPr lang="en-IN" dirty="0" smtClean="0"/>
+              <a:t>(block element modifier) to name our classes we will study </a:t>
+            </a:r>
+            <a:r>
+              <a:rPr lang="en-IN" dirty="0" err="1" smtClean="0"/>
+              <a:t>bem</a:t>
+            </a:r>
+            <a:r>
+              <a:rPr lang="en-IN" dirty="0" smtClean="0"/>
+              <a:t> later in our </a:t>
+            </a:r>
+            <a:r>
+              <a:rPr lang="en-IN" dirty="0" err="1" smtClean="0"/>
+              <a:t>trainingso</a:t>
+            </a:r>
+            <a:r>
+              <a:rPr lang="en-IN" dirty="0" smtClean="0"/>
+              <a:t> the name will be main-</a:t>
+            </a:r>
+            <a:r>
+              <a:rPr lang="en-IN" dirty="0" err="1" smtClean="0"/>
+              <a:t>nav</a:t>
+            </a:r>
+            <a:r>
+              <a:rPr lang="en-IN" dirty="0" smtClean="0"/>
+              <a:t>__item this signifies that it is an item in the main-</a:t>
+            </a:r>
+            <a:r>
+              <a:rPr lang="en-IN" dirty="0" err="1" smtClean="0"/>
+              <a:t>nav</a:t>
+            </a:r>
+            <a:endParaRPr lang="en-IN" dirty="0" smtClean="0"/>
+          </a:p>
+          <a:p>
+            <a:r>
+              <a:rPr lang="en-IN" dirty="0" smtClean="0"/>
+              <a:t>Use this class on all list items</a:t>
+            </a:r>
+          </a:p>
+          <a:p>
+            <a:r>
+              <a:rPr lang="en-IN" dirty="0" smtClean="0"/>
+              <a:t>To our </a:t>
+            </a:r>
+            <a:r>
+              <a:rPr lang="en-IN" dirty="0" err="1" smtClean="0"/>
+              <a:t>ul</a:t>
+            </a:r>
+            <a:r>
+              <a:rPr lang="en-IN" dirty="0" smtClean="0"/>
+              <a:t> tag add a class </a:t>
+            </a:r>
+            <a:r>
+              <a:rPr lang="en-GB" dirty="0" smtClean="0"/>
+              <a:t>“main-</a:t>
+            </a:r>
+            <a:r>
+              <a:rPr lang="en-GB" dirty="0" err="1" smtClean="0"/>
+              <a:t>nav</a:t>
+            </a:r>
+            <a:r>
+              <a:rPr lang="en-GB" dirty="0"/>
+              <a:t>__</a:t>
+            </a:r>
+            <a:r>
+              <a:rPr lang="en-GB" dirty="0" smtClean="0"/>
+              <a:t>items”</a:t>
+            </a:r>
+          </a:p>
+          <a:p>
+            <a:r>
+              <a:rPr lang="en-IN" dirty="0" smtClean="0"/>
+              <a:t>To our </a:t>
+            </a:r>
+            <a:r>
+              <a:rPr lang="en-IN" dirty="0" err="1" smtClean="0"/>
+              <a:t>nav</a:t>
+            </a:r>
+            <a:r>
+              <a:rPr lang="en-IN" dirty="0" smtClean="0"/>
+              <a:t> tag add the class “main-</a:t>
+            </a:r>
+            <a:r>
+              <a:rPr lang="en-IN" dirty="0" err="1" smtClean="0"/>
+              <a:t>nav</a:t>
+            </a:r>
+            <a:r>
+              <a:rPr lang="en-IN" dirty="0" smtClean="0"/>
+              <a:t>”</a:t>
+            </a:r>
+          </a:p>
+          <a:p>
+            <a:r>
+              <a:rPr lang="en-IN" dirty="0" smtClean="0"/>
+              <a:t>So now we kind of have an hierarchy </a:t>
+            </a:r>
+            <a:r>
+              <a:rPr lang="en-IN" b="1" dirty="0" smtClean="0"/>
+              <a:t>main-</a:t>
+            </a:r>
+            <a:r>
+              <a:rPr lang="en-IN" b="1" dirty="0" err="1" smtClean="0"/>
+              <a:t>nav</a:t>
+            </a:r>
+            <a:r>
+              <a:rPr lang="en-IN" dirty="0" smtClean="0"/>
+              <a:t> contains </a:t>
+            </a:r>
+            <a:r>
+              <a:rPr lang="en-IN" b="1" dirty="0" smtClean="0"/>
+              <a:t>main-</a:t>
+            </a:r>
+            <a:r>
+              <a:rPr lang="en-IN" b="1" dirty="0" err="1" smtClean="0"/>
+              <a:t>nav</a:t>
+            </a:r>
+            <a:r>
+              <a:rPr lang="en-IN" b="1" dirty="0" smtClean="0"/>
+              <a:t>__items</a:t>
+            </a:r>
+            <a:r>
+              <a:rPr lang="en-IN" dirty="0" smtClean="0"/>
+              <a:t> which contain multiple </a:t>
+            </a:r>
+            <a:r>
+              <a:rPr lang="en-IN" b="1" dirty="0" smtClean="0"/>
+              <a:t>main-</a:t>
+            </a:r>
+            <a:r>
+              <a:rPr lang="en-IN" b="1" dirty="0" err="1" smtClean="0"/>
+              <a:t>nav</a:t>
+            </a:r>
+            <a:r>
+              <a:rPr lang="en-IN" b="1" dirty="0" smtClean="0"/>
+              <a:t>__item</a:t>
+            </a:r>
+          </a:p>
+          <a:p>
+            <a:r>
+              <a:rPr lang="en-IN" dirty="0" smtClean="0"/>
+              <a:t>In html we have inline elements which are rendered in a same line like &lt;a&gt; tags if we have multiple &lt;a&gt; tags simultaneously the are rendered in the same line, we also have block elements which are rendered one after the other like div, section ,h1 </a:t>
+            </a:r>
+            <a:r>
+              <a:rPr lang="en-IN" dirty="0" err="1" smtClean="0"/>
+              <a:t>etc</a:t>
+            </a:r>
+            <a:r>
+              <a:rPr lang="en-IN" dirty="0" smtClean="0"/>
+              <a:t> these elements take the full available width of the container</a:t>
+            </a:r>
+            <a:endParaRPr lang="en-GB" dirty="0"/>
+          </a:p>
+          <a:p>
+            <a:endParaRPr lang="en-GB" dirty="0"/>
+          </a:p>
+        </p:txBody>
+      </p:sp>
+    </p:spTree>
+    <p:extLst>
+      <p:ext uri="{BB962C8B-B14F-4D97-AF65-F5344CB8AC3E}">
+        <p14:creationId xmlns:p14="http://schemas.microsoft.com/office/powerpoint/2010/main" val="2746061635"/>
+      </p:ext>
+    </p:extLst>
+  </p:cSld>
+  <p:clrMapOvr>
+    <a:masterClrMapping/>
+  </p:clrMapOvr>
+</p:sld>
+</file>
+
+<file path=ppt/slides/slide43.xml><?xml version="1.0" encoding="utf-8"?>
+<p:sld xmlns:a="http://schemas.openxmlformats.org/drawingml/2006/main" xmlns:r="http://schemas.openxmlformats.org/officeDocument/2006/relationships" xmlns:p="http://schemas.openxmlformats.org/presentationml/2006/main">
+  <p:cSld>
+    <p:spTree>
+      <p:nvGrpSpPr>
+        <p:cNvPr id="1" name=""/>
+        <p:cNvGrpSpPr/>
+        <p:nvPr/>
+      </p:nvGrpSpPr>
+      <p:grpSpPr>
+        <a:xfrm>
+          <a:off x="0" y="0"/>
+          <a:ext cx="0" cy="0"/>
+          <a:chOff x="0" y="0"/>
+          <a:chExt cx="0" cy="0"/>
+        </a:xfrm>
+      </p:grpSpPr>
+      <p:sp>
+        <p:nvSpPr>
+          <p:cNvPr id="2" name="Title 1"/>
+          <p:cNvSpPr>
+            <a:spLocks noGrp="1"/>
+          </p:cNvSpPr>
+          <p:nvPr>
+            <p:ph type="title"/>
+          </p:nvPr>
+        </p:nvSpPr>
+        <p:spPr>
+          <a:xfrm>
+            <a:off x="874761" y="142009"/>
+            <a:ext cx="8596668" cy="554182"/>
+          </a:xfrm>
+        </p:spPr>
+        <p:txBody>
+          <a:bodyPr>
+            <a:normAutofit fontScale="90000"/>
+          </a:bodyPr>
+          <a:lstStyle/>
+          <a:p>
+            <a:r>
+              <a:rPr lang="en-GB" dirty="0"/>
+              <a:t>Understanding the Display </a:t>
+            </a:r>
+            <a:r>
+              <a:rPr lang="en-GB" dirty="0" smtClean="0"/>
+              <a:t>Property </a:t>
+            </a:r>
+            <a:r>
+              <a:rPr lang="en-GB" dirty="0" err="1" smtClean="0"/>
+              <a:t>Cont</a:t>
+            </a:r>
+            <a:r>
+              <a:rPr lang="en-GB" dirty="0" smtClean="0"/>
+              <a:t>…</a:t>
+            </a:r>
+            <a:endParaRPr lang="en-GB" dirty="0"/>
+          </a:p>
+        </p:txBody>
+      </p:sp>
+      <p:sp>
+        <p:nvSpPr>
+          <p:cNvPr id="3" name="Content Placeholder 2"/>
+          <p:cNvSpPr>
+            <a:spLocks noGrp="1"/>
+          </p:cNvSpPr>
+          <p:nvPr>
+            <p:ph idx="1"/>
+          </p:nvPr>
+        </p:nvSpPr>
+        <p:spPr>
+          <a:xfrm>
+            <a:off x="448733" y="1059872"/>
+            <a:ext cx="11220257" cy="5064617"/>
+          </a:xfrm>
+        </p:spPr>
+        <p:txBody>
+          <a:bodyPr/>
+          <a:lstStyle/>
+          <a:p>
+            <a:r>
+              <a:rPr lang="en-IN" dirty="0" smtClean="0"/>
+              <a:t>Now since inline elements are usually adjacent to other inline elements therefore setting the margin ,padding </a:t>
+            </a:r>
+            <a:r>
+              <a:rPr lang="en-IN" dirty="0" err="1" smtClean="0"/>
+              <a:t>etc</a:t>
+            </a:r>
+            <a:r>
+              <a:rPr lang="en-IN" dirty="0" smtClean="0"/>
+              <a:t> is not plainly possible as multiple elements in one single line cant have different margin(top , bottom) ,padding etc.</a:t>
+            </a:r>
+          </a:p>
+          <a:p>
+            <a:r>
+              <a:rPr lang="en-IN" dirty="0" smtClean="0"/>
+              <a:t>But for block elements since they span the whole width of the container these properties can be set.</a:t>
+            </a:r>
+          </a:p>
+          <a:p>
+            <a:r>
+              <a:rPr lang="en-IN" dirty="0" smtClean="0"/>
+              <a:t>Using display property we can although change the default behaviour of elements we can set the display property to block to make an element behave like a block element, to inline to make it behave like inline, change it to none to hide it from </a:t>
+            </a:r>
+            <a:r>
+              <a:rPr lang="en-IN" dirty="0" err="1" smtClean="0"/>
+              <a:t>visisble</a:t>
+            </a:r>
+            <a:r>
+              <a:rPr lang="en-IN" dirty="0" smtClean="0"/>
+              <a:t> flow although it will still be part of the </a:t>
+            </a:r>
+            <a:r>
+              <a:rPr lang="en-IN" dirty="0" err="1" smtClean="0"/>
+              <a:t>dom</a:t>
+            </a:r>
+            <a:r>
+              <a:rPr lang="en-IN" dirty="0" smtClean="0"/>
+              <a:t> but hidden from display.</a:t>
+            </a:r>
+          </a:p>
+          <a:p>
+            <a:r>
+              <a:rPr lang="en-IN" dirty="0" smtClean="0"/>
+              <a:t>We can also set it to inline-block such elements will continue to behave like inline but the block properties like margin padding </a:t>
+            </a:r>
+            <a:r>
+              <a:rPr lang="en-IN" dirty="0" err="1" smtClean="0"/>
+              <a:t>etc</a:t>
+            </a:r>
+            <a:r>
+              <a:rPr lang="en-IN" dirty="0" smtClean="0"/>
+              <a:t> can also be set.</a:t>
+            </a:r>
+          </a:p>
+          <a:p>
+            <a:r>
+              <a:rPr lang="en-IN" dirty="0" smtClean="0"/>
+              <a:t>So lets set the display property for our list items to inline block using the class selector for </a:t>
+            </a:r>
+            <a:r>
+              <a:rPr lang="en-GB" dirty="0"/>
+              <a:t>main-</a:t>
+            </a:r>
+            <a:r>
+              <a:rPr lang="en-GB" dirty="0" err="1"/>
+              <a:t>nav</a:t>
+            </a:r>
+            <a:r>
+              <a:rPr lang="en-GB" dirty="0"/>
+              <a:t>__items</a:t>
+            </a:r>
+            <a:endParaRPr lang="en-GB" dirty="0"/>
+          </a:p>
+          <a:p>
+            <a:endParaRPr lang="en-GB" dirty="0"/>
+          </a:p>
+        </p:txBody>
+      </p:sp>
+    </p:spTree>
+    <p:extLst>
+      <p:ext uri="{BB962C8B-B14F-4D97-AF65-F5344CB8AC3E}">
+        <p14:creationId xmlns:p14="http://schemas.microsoft.com/office/powerpoint/2010/main" val="1948294138"/>
+      </p:ext>
+    </p:extLst>
+  </p:cSld>
+  <p:clrMapOvr>
+    <a:masterClrMapping/>
+  </p:clrMapOvr>
+</p:sld>
+</file>
+
+<file path=ppt/slides/slide44.xml><?xml version="1.0" encoding="utf-8"?>
+<p:sld xmlns:a="http://schemas.openxmlformats.org/drawingml/2006/main" xmlns:r="http://schemas.openxmlformats.org/officeDocument/2006/relationships" xmlns:p="http://schemas.openxmlformats.org/presentationml/2006/main">
+  <p:cSld>
+    <p:spTree>
+      <p:nvGrpSpPr>
+        <p:cNvPr id="1" name=""/>
+        <p:cNvGrpSpPr/>
+        <p:nvPr/>
+      </p:nvGrpSpPr>
+      <p:grpSpPr>
+        <a:xfrm>
+          <a:off x="0" y="0"/>
+          <a:ext cx="0" cy="0"/>
+          <a:chOff x="0" y="0"/>
+          <a:chExt cx="0" cy="0"/>
+        </a:xfrm>
+      </p:grpSpPr>
+      <p:sp>
+        <p:nvSpPr>
+          <p:cNvPr id="2" name="Title 1"/>
+          <p:cNvSpPr>
+            <a:spLocks noGrp="1"/>
+          </p:cNvSpPr>
+          <p:nvPr>
+            <p:ph type="title"/>
+          </p:nvPr>
+        </p:nvSpPr>
+        <p:spPr>
+          <a:xfrm>
+            <a:off x="760461" y="173182"/>
+            <a:ext cx="8596668" cy="710045"/>
+          </a:xfrm>
+        </p:spPr>
+        <p:txBody>
+          <a:bodyPr/>
+          <a:lstStyle/>
+          <a:p>
+            <a:r>
+              <a:rPr lang="en-IN" dirty="0"/>
+              <a:t>display: none vs visibility: hidden</a:t>
+            </a:r>
+            <a:endParaRPr lang="en-GB" dirty="0"/>
+          </a:p>
+        </p:txBody>
+      </p:sp>
+      <p:sp>
+        <p:nvSpPr>
+          <p:cNvPr id="3" name="Content Placeholder 2"/>
+          <p:cNvSpPr>
+            <a:spLocks noGrp="1"/>
+          </p:cNvSpPr>
+          <p:nvPr>
+            <p:ph idx="1"/>
+          </p:nvPr>
+        </p:nvSpPr>
+        <p:spPr>
+          <a:xfrm>
+            <a:off x="677333" y="883227"/>
+            <a:ext cx="10586411" cy="5158135"/>
+          </a:xfrm>
+        </p:spPr>
+        <p:txBody>
+          <a:bodyPr/>
+          <a:lstStyle/>
+          <a:p>
+            <a:r>
+              <a:rPr lang="en-IN" dirty="0"/>
+              <a:t>We had a look at display: none;  - this value removes the element to which you apply it from the document flow. This means that the element is not visible and it also doesn't "block its position". Other elements can (and will) take its place instead.</a:t>
+            </a:r>
+          </a:p>
+          <a:p>
+            <a:endParaRPr lang="en-IN" dirty="0"/>
+          </a:p>
+          <a:p>
+            <a:r>
+              <a:rPr lang="en-IN" dirty="0"/>
+              <a:t>There is an alternative to that though.</a:t>
+            </a:r>
+          </a:p>
+          <a:p>
+            <a:endParaRPr lang="en-IN" dirty="0"/>
+          </a:p>
+          <a:p>
+            <a:r>
+              <a:rPr lang="en-IN" dirty="0"/>
+              <a:t>If you only want to hide an element but you want to keep its place (i.e. other elements don't fill the empty spot), you can use visibility: hidden</a:t>
+            </a:r>
+            <a:r>
+              <a:rPr lang="en-IN" dirty="0" smtClean="0"/>
+              <a:t>;</a:t>
+            </a:r>
+          </a:p>
+          <a:p>
+            <a:endParaRPr lang="en-IN" dirty="0"/>
+          </a:p>
+          <a:p>
+            <a:r>
+              <a:rPr lang="en-IN" dirty="0"/>
+              <a:t>The element is only invisible, it's not removed from the document flow and of course also not from the DOM.</a:t>
+            </a:r>
+            <a:endParaRPr lang="en-GB" dirty="0"/>
+          </a:p>
+        </p:txBody>
+      </p:sp>
+    </p:spTree>
+    <p:extLst>
+      <p:ext uri="{BB962C8B-B14F-4D97-AF65-F5344CB8AC3E}">
+        <p14:creationId xmlns:p14="http://schemas.microsoft.com/office/powerpoint/2010/main" val="2092777933"/>
+      </p:ext>
+    </p:extLst>
+  </p:cSld>
+  <p:clrMapOvr>
+    <a:masterClrMapping/>
+  </p:clrMapOvr>
+</p:sld>
+</file>
+
+<file path=ppt/slides/slide45.xml><?xml version="1.0" encoding="utf-8"?>
 <p:sld xmlns:a="http://schemas.openxmlformats.org/drawingml/2006/main" xmlns:r="http://schemas.openxmlformats.org/officeDocument/2006/relationships" xmlns:p="http://schemas.openxmlformats.org/presentationml/2006/main" showMasterSp="0">
   <p:cSld>
     <p:spTree>

</xml_diff>

<commit_message>
Applying the Display Property & Styling our Navigation Bar
</commit_message>
<xml_diff>
--- a/PPT/Css-v3.pptx
+++ b/PPT/Css-v3.pptx
@@ -5,7 +5,7 @@
     <p:sldMasterId id="2147483660" r:id="rId1"/>
   </p:sldMasterIdLst>
   <p:notesMasterIdLst>
-    <p:notesMasterId r:id="rId47"/>
+    <p:notesMasterId r:id="rId49"/>
   </p:notesMasterIdLst>
   <p:sldIdLst>
     <p:sldId id="256" r:id="rId2"/>
@@ -52,7 +52,9 @@
     <p:sldId id="405" r:id="rId43"/>
     <p:sldId id="406" r:id="rId44"/>
     <p:sldId id="407" r:id="rId45"/>
-    <p:sldId id="268" r:id="rId46"/>
+    <p:sldId id="408" r:id="rId46"/>
+    <p:sldId id="409" r:id="rId47"/>
+    <p:sldId id="268" r:id="rId48"/>
   </p:sldIdLst>
   <p:sldSz cx="12192000" cy="6858000"/>
   <p:notesSz cx="6858000" cy="9144000"/>
@@ -23739,7 +23741,6 @@
               <a:rPr lang="en-GB" dirty="0"/>
               <a:t>Understanding the Display Property</a:t>
             </a:r>
-            <a:endParaRPr lang="en-GB" dirty="0"/>
           </a:p>
         </p:txBody>
       </p:sp>
@@ -24107,7 +24108,6 @@
               <a:rPr lang="en-GB" dirty="0"/>
               <a:t>__items</a:t>
             </a:r>
-            <a:endParaRPr lang="en-GB" dirty="0"/>
           </a:p>
           <a:p>
             <a:endParaRPr lang="en-GB" dirty="0"/>
@@ -24245,6 +24245,505 @@
 </file>
 
 <file path=ppt/slides/slide45.xml><?xml version="1.0" encoding="utf-8"?>
+<p:sld xmlns:a="http://schemas.openxmlformats.org/drawingml/2006/main" xmlns:r="http://schemas.openxmlformats.org/officeDocument/2006/relationships" xmlns:p="http://schemas.openxmlformats.org/presentationml/2006/main">
+  <p:cSld>
+    <p:spTree>
+      <p:nvGrpSpPr>
+        <p:cNvPr id="1" name=""/>
+        <p:cNvGrpSpPr/>
+        <p:nvPr/>
+      </p:nvGrpSpPr>
+      <p:grpSpPr>
+        <a:xfrm>
+          <a:off x="0" y="0"/>
+          <a:ext cx="0" cy="0"/>
+          <a:chOff x="0" y="0"/>
+          <a:chExt cx="0" cy="0"/>
+        </a:xfrm>
+      </p:grpSpPr>
+      <p:sp>
+        <p:nvSpPr>
+          <p:cNvPr id="2" name="Title 1"/>
+          <p:cNvSpPr>
+            <a:spLocks noGrp="1"/>
+          </p:cNvSpPr>
+          <p:nvPr>
+            <p:ph type="title"/>
+          </p:nvPr>
+        </p:nvSpPr>
+        <p:spPr>
+          <a:xfrm>
+            <a:off x="598164" y="93025"/>
+            <a:ext cx="11362266" cy="609599"/>
+          </a:xfrm>
+        </p:spPr>
+        <p:txBody>
+          <a:bodyPr>
+            <a:normAutofit/>
+          </a:bodyPr>
+          <a:lstStyle/>
+          <a:p>
+            <a:r>
+              <a:rPr lang="en-IN" sz="3200" dirty="0"/>
+              <a:t>Applying the Display Property &amp; Styling our Navigation Bar</a:t>
+            </a:r>
+            <a:endParaRPr lang="en-GB" sz="3200" dirty="0"/>
+          </a:p>
+        </p:txBody>
+      </p:sp>
+      <p:sp>
+        <p:nvSpPr>
+          <p:cNvPr id="3" name="Content Placeholder 2"/>
+          <p:cNvSpPr>
+            <a:spLocks noGrp="1"/>
+          </p:cNvSpPr>
+          <p:nvPr>
+            <p:ph idx="1"/>
+          </p:nvPr>
+        </p:nvSpPr>
+        <p:spPr>
+          <a:xfrm>
+            <a:off x="677333" y="800100"/>
+            <a:ext cx="11003037" cy="5829299"/>
+          </a:xfrm>
+        </p:spPr>
+        <p:txBody>
+          <a:bodyPr>
+            <a:normAutofit lnSpcReduction="10000"/>
+          </a:bodyPr>
+          <a:lstStyle/>
+          <a:p>
+            <a:r>
+              <a:rPr lang="en-GB" dirty="0" smtClean="0"/>
+              <a:t>Now if we notice that our brand link </a:t>
+            </a:r>
+            <a:r>
+              <a:rPr lang="en-GB" dirty="0" err="1" smtClean="0"/>
+              <a:t>uhost</a:t>
+            </a:r>
+            <a:r>
+              <a:rPr lang="en-GB" dirty="0" smtClean="0"/>
+              <a:t> and other links are in separate lines.</a:t>
+            </a:r>
+          </a:p>
+          <a:p>
+            <a:r>
+              <a:rPr lang="en-GB" dirty="0" smtClean="0"/>
+              <a:t>Lets move them to same line we will notice that the brand link is a div and the other links are in a &lt;</a:t>
+            </a:r>
+            <a:r>
+              <a:rPr lang="en-GB" dirty="0" err="1" smtClean="0"/>
+              <a:t>nav</a:t>
+            </a:r>
+            <a:r>
+              <a:rPr lang="en-GB" dirty="0" smtClean="0"/>
+              <a:t>&gt; tag and both of them are block elements.</a:t>
+            </a:r>
+          </a:p>
+          <a:p>
+            <a:r>
+              <a:rPr lang="en-GB" dirty="0" smtClean="0"/>
+              <a:t>So we need to set display to inline-block for both ,we can either add a class to the div or use a </a:t>
+            </a:r>
+            <a:r>
+              <a:rPr lang="en-GB" dirty="0" err="1" smtClean="0"/>
+              <a:t>combinator</a:t>
+            </a:r>
+            <a:r>
+              <a:rPr lang="en-GB" dirty="0" smtClean="0"/>
+              <a:t> to select it, lets use a direct child </a:t>
+            </a:r>
+            <a:r>
+              <a:rPr lang="en-GB" dirty="0" err="1" smtClean="0"/>
+              <a:t>combinator</a:t>
+            </a:r>
+            <a:r>
+              <a:rPr lang="en-GB" dirty="0" smtClean="0"/>
+              <a:t> and also for the </a:t>
+            </a:r>
+            <a:r>
+              <a:rPr lang="en-GB" dirty="0" err="1" smtClean="0"/>
+              <a:t>nav</a:t>
+            </a:r>
+            <a:r>
+              <a:rPr lang="en-GB" dirty="0" smtClean="0"/>
+              <a:t> we already have a class lets select that too and add the </a:t>
+            </a:r>
+            <a:r>
+              <a:rPr lang="en-GB" dirty="0" err="1" smtClean="0"/>
+              <a:t>display:inline-block</a:t>
+            </a:r>
+            <a:r>
+              <a:rPr lang="en-GB" dirty="0" smtClean="0"/>
+              <a:t> to them.</a:t>
+            </a:r>
+          </a:p>
+          <a:p>
+            <a:r>
+              <a:rPr lang="en-GB" dirty="0" smtClean="0"/>
+              <a:t>We now have the brand link and other links on the same </a:t>
+            </a:r>
+            <a:r>
+              <a:rPr lang="en-GB" dirty="0" err="1" smtClean="0"/>
+              <a:t>line.Now</a:t>
+            </a:r>
+            <a:r>
+              <a:rPr lang="en-GB" dirty="0" smtClean="0"/>
+              <a:t> lets move the links(elements in the </a:t>
+            </a:r>
+            <a:r>
+              <a:rPr lang="en-GB" dirty="0" err="1" smtClean="0"/>
+              <a:t>nav</a:t>
+            </a:r>
+            <a:r>
+              <a:rPr lang="en-GB" dirty="0" smtClean="0"/>
+              <a:t> element) to the right side.</a:t>
+            </a:r>
+          </a:p>
+          <a:p>
+            <a:r>
+              <a:rPr lang="en-GB" dirty="0" smtClean="0"/>
+              <a:t> Now to do that we can add text-align :right to the main-</a:t>
+            </a:r>
+            <a:r>
+              <a:rPr lang="en-GB" dirty="0" err="1" smtClean="0"/>
+              <a:t>nav</a:t>
+            </a:r>
+            <a:r>
+              <a:rPr lang="en-GB" dirty="0" smtClean="0"/>
+              <a:t> element and all the elements are treated as text .</a:t>
+            </a:r>
+          </a:p>
+          <a:p>
+            <a:r>
+              <a:rPr lang="en-GB" dirty="0" smtClean="0"/>
+              <a:t>We will notice that it did not have any effect although if we check in our </a:t>
+            </a:r>
+            <a:r>
+              <a:rPr lang="en-GB" dirty="0" err="1" smtClean="0"/>
+              <a:t>devtools</a:t>
+            </a:r>
+            <a:r>
+              <a:rPr lang="en-GB" dirty="0" smtClean="0"/>
+              <a:t> the text-align right is inherited from the </a:t>
+            </a:r>
+            <a:r>
+              <a:rPr lang="en-GB" dirty="0" err="1" smtClean="0"/>
+              <a:t>nav</a:t>
+            </a:r>
+            <a:r>
+              <a:rPr lang="en-GB" dirty="0" smtClean="0"/>
+              <a:t> to </a:t>
+            </a:r>
+            <a:r>
+              <a:rPr lang="en-GB" dirty="0" err="1" smtClean="0"/>
+              <a:t>ul</a:t>
+            </a:r>
+            <a:r>
+              <a:rPr lang="en-GB" dirty="0" smtClean="0"/>
+              <a:t> this is because </a:t>
+            </a:r>
+            <a:r>
+              <a:rPr lang="en-GB" dirty="0" err="1" smtClean="0"/>
+              <a:t>ul</a:t>
+            </a:r>
+            <a:r>
+              <a:rPr lang="en-GB" dirty="0" smtClean="0"/>
+              <a:t> sits under </a:t>
+            </a:r>
+            <a:r>
+              <a:rPr lang="en-GB" dirty="0" err="1" smtClean="0"/>
+              <a:t>nav</a:t>
+            </a:r>
+            <a:r>
+              <a:rPr lang="en-GB" dirty="0" smtClean="0"/>
+              <a:t> which is inline-</a:t>
+            </a:r>
+            <a:r>
+              <a:rPr lang="en-GB" dirty="0" err="1" smtClean="0"/>
+              <a:t>bloack</a:t>
+            </a:r>
+            <a:r>
+              <a:rPr lang="en-GB" dirty="0" smtClean="0"/>
+              <a:t> element so does not take full available width it only takes width as needed so text align :right does not have an effect</a:t>
+            </a:r>
+          </a:p>
+          <a:p>
+            <a:r>
+              <a:rPr lang="en-GB" dirty="0" smtClean="0"/>
+              <a:t>So we need to set a width and the width should be the complete width of the header – the width of the div also we will notice that the </a:t>
+            </a:r>
+            <a:r>
+              <a:rPr lang="en-GB" dirty="0" err="1" smtClean="0"/>
+              <a:t>ul</a:t>
+            </a:r>
+            <a:r>
+              <a:rPr lang="en-GB" dirty="0" smtClean="0"/>
+              <a:t> has a default padding to the left and margin to top and bottom  which we need to remove</a:t>
+            </a:r>
+          </a:p>
+          <a:p>
+            <a:r>
+              <a:rPr lang="en-GB" dirty="0" smtClean="0"/>
+              <a:t>So lets set margin and padding to zero for the </a:t>
+            </a:r>
+            <a:r>
+              <a:rPr lang="en-GB" dirty="0" err="1" smtClean="0"/>
+              <a:t>ul</a:t>
+            </a:r>
+            <a:r>
+              <a:rPr lang="en-GB" dirty="0" smtClean="0"/>
+              <a:t> by selecting it using its class selector we should also set list-style: none to just remove any bullet points although padding:0 will automatically remove the bullet points</a:t>
+            </a:r>
+          </a:p>
+          <a:p>
+            <a:endParaRPr lang="en-GB" dirty="0"/>
+          </a:p>
+        </p:txBody>
+      </p:sp>
+    </p:spTree>
+    <p:extLst>
+      <p:ext uri="{BB962C8B-B14F-4D97-AF65-F5344CB8AC3E}">
+        <p14:creationId xmlns:p14="http://schemas.microsoft.com/office/powerpoint/2010/main" val="2470648646"/>
+      </p:ext>
+    </p:extLst>
+  </p:cSld>
+  <p:clrMapOvr>
+    <a:masterClrMapping/>
+  </p:clrMapOvr>
+</p:sld>
+</file>
+
+<file path=ppt/slides/slide46.xml><?xml version="1.0" encoding="utf-8"?>
+<p:sld xmlns:a="http://schemas.openxmlformats.org/drawingml/2006/main" xmlns:r="http://schemas.openxmlformats.org/officeDocument/2006/relationships" xmlns:p="http://schemas.openxmlformats.org/presentationml/2006/main">
+  <p:cSld>
+    <p:spTree>
+      <p:nvGrpSpPr>
+        <p:cNvPr id="1" name=""/>
+        <p:cNvGrpSpPr/>
+        <p:nvPr/>
+      </p:nvGrpSpPr>
+      <p:grpSpPr>
+        <a:xfrm>
+          <a:off x="0" y="0"/>
+          <a:ext cx="0" cy="0"/>
+          <a:chOff x="0" y="0"/>
+          <a:chExt cx="0" cy="0"/>
+        </a:xfrm>
+      </p:grpSpPr>
+      <p:sp>
+        <p:nvSpPr>
+          <p:cNvPr id="2" name="Title 1"/>
+          <p:cNvSpPr>
+            <a:spLocks noGrp="1"/>
+          </p:cNvSpPr>
+          <p:nvPr>
+            <p:ph type="title"/>
+          </p:nvPr>
+        </p:nvSpPr>
+        <p:spPr>
+          <a:xfrm>
+            <a:off x="598164" y="93025"/>
+            <a:ext cx="11362266" cy="609599"/>
+          </a:xfrm>
+        </p:spPr>
+        <p:txBody>
+          <a:bodyPr>
+            <a:normAutofit/>
+          </a:bodyPr>
+          <a:lstStyle/>
+          <a:p>
+            <a:r>
+              <a:rPr lang="en-IN" sz="3200" dirty="0"/>
+              <a:t>Applying the Display Property &amp; Styling our Navigation Bar</a:t>
+            </a:r>
+            <a:endParaRPr lang="en-GB" sz="3200" dirty="0"/>
+          </a:p>
+        </p:txBody>
+      </p:sp>
+      <p:sp>
+        <p:nvSpPr>
+          <p:cNvPr id="3" name="Content Placeholder 2"/>
+          <p:cNvSpPr>
+            <a:spLocks noGrp="1"/>
+          </p:cNvSpPr>
+          <p:nvPr>
+            <p:ph idx="1"/>
+          </p:nvPr>
+        </p:nvSpPr>
+        <p:spPr>
+          <a:xfrm>
+            <a:off x="677333" y="800100"/>
+            <a:ext cx="11003037" cy="5829299"/>
+          </a:xfrm>
+        </p:spPr>
+        <p:txBody>
+          <a:bodyPr>
+            <a:normAutofit/>
+          </a:bodyPr>
+          <a:lstStyle/>
+          <a:p>
+            <a:r>
+              <a:rPr lang="en-GB" dirty="0" smtClean="0"/>
+              <a:t>Now lets change the width of main-</a:t>
+            </a:r>
+            <a:r>
+              <a:rPr lang="en-GB" dirty="0" err="1" smtClean="0"/>
+              <a:t>nav</a:t>
+            </a:r>
+            <a:r>
+              <a:rPr lang="en-GB" dirty="0" smtClean="0"/>
+              <a:t> </a:t>
+            </a:r>
+            <a:r>
+              <a:rPr lang="en-GB" dirty="0" err="1" smtClean="0"/>
+              <a:t>calss</a:t>
+            </a:r>
+            <a:r>
+              <a:rPr lang="en-GB" dirty="0" smtClean="0"/>
+              <a:t>(&lt;</a:t>
+            </a:r>
+            <a:r>
+              <a:rPr lang="en-GB" dirty="0" err="1" smtClean="0"/>
+              <a:t>nav</a:t>
+            </a:r>
+            <a:r>
+              <a:rPr lang="en-GB" dirty="0" smtClean="0"/>
+              <a:t>&gt;) we will set the width to 100% initially and we will notice the content is right aligned but also now its on a separate </a:t>
+            </a:r>
+            <a:r>
+              <a:rPr lang="en-GB" dirty="0" err="1" smtClean="0"/>
+              <a:t>line.This</a:t>
+            </a:r>
+            <a:r>
+              <a:rPr lang="en-GB" dirty="0" smtClean="0"/>
+              <a:t> is because the </a:t>
+            </a:r>
+            <a:r>
+              <a:rPr lang="en-GB" dirty="0" err="1" smtClean="0"/>
+              <a:t>nav</a:t>
+            </a:r>
+            <a:r>
+              <a:rPr lang="en-GB" dirty="0" smtClean="0"/>
+              <a:t> now takes full 100% width and thus doesn’t fit on the same line anymore</a:t>
+            </a:r>
+          </a:p>
+          <a:p>
+            <a:r>
+              <a:rPr lang="en-GB" dirty="0" smtClean="0"/>
+              <a:t>So we need to actually take 100% - width of the div we can check the width of div from the </a:t>
+            </a:r>
+            <a:r>
+              <a:rPr lang="en-GB" dirty="0" err="1" smtClean="0"/>
+              <a:t>devtools</a:t>
+            </a:r>
+            <a:r>
+              <a:rPr lang="en-GB" dirty="0" smtClean="0"/>
+              <a:t> for time being which is 48.135 in my case lets take it as 49px</a:t>
+            </a:r>
+          </a:p>
+          <a:p>
+            <a:r>
+              <a:rPr lang="en-GB" dirty="0" smtClean="0"/>
+              <a:t>We will use a special </a:t>
+            </a:r>
+            <a:r>
+              <a:rPr lang="en-GB" dirty="0" err="1" smtClean="0"/>
+              <a:t>calc</a:t>
+            </a:r>
+            <a:r>
+              <a:rPr lang="en-GB" dirty="0" smtClean="0"/>
+              <a:t> function given by </a:t>
+            </a:r>
+            <a:r>
+              <a:rPr lang="en-GB" dirty="0" err="1" smtClean="0"/>
+              <a:t>css</a:t>
+            </a:r>
+            <a:r>
+              <a:rPr lang="en-GB" dirty="0" smtClean="0"/>
+              <a:t> to set the width as </a:t>
+            </a:r>
+            <a:r>
+              <a:rPr lang="en-GB" dirty="0" err="1" smtClean="0"/>
+              <a:t>calc</a:t>
+            </a:r>
+            <a:r>
+              <a:rPr lang="en-GB" dirty="0" smtClean="0"/>
+              <a:t>(100% - 49px).We will notice it does become narrower but still in next </a:t>
+            </a:r>
+            <a:r>
+              <a:rPr lang="en-GB" dirty="0" err="1" smtClean="0"/>
+              <a:t>line.This</a:t>
+            </a:r>
+            <a:r>
+              <a:rPr lang="en-GB" dirty="0" smtClean="0"/>
+              <a:t> is because of a behaviour of inline block that we need to understand</a:t>
+            </a:r>
+          </a:p>
+          <a:p>
+            <a:r>
+              <a:rPr lang="en-GB" dirty="0" smtClean="0"/>
+              <a:t>If we check out html there is a whitespace between the &lt;/div&gt; and &lt;</a:t>
+            </a:r>
+            <a:r>
+              <a:rPr lang="en-GB" dirty="0" err="1" smtClean="0"/>
+              <a:t>nav</a:t>
+            </a:r>
+            <a:r>
+              <a:rPr lang="en-GB" dirty="0" smtClean="0"/>
+              <a:t>&gt; tags and we usually structure our code in such a way and it doesn’t cause a problem but using </a:t>
+            </a:r>
+            <a:r>
+              <a:rPr lang="en-GB" dirty="0" err="1" smtClean="0"/>
+              <a:t>display:inline-block</a:t>
+            </a:r>
+            <a:r>
+              <a:rPr lang="en-GB" dirty="0" smtClean="0"/>
+              <a:t> this whitespace is treated as a character and has a width which it occupies on the screen if we remove this whitespace the links will be on the same line</a:t>
+            </a:r>
+          </a:p>
+          <a:p>
+            <a:r>
+              <a:rPr lang="en-GB" dirty="0" smtClean="0"/>
+              <a:t>But keeping the elements on same line is not good as we want to structure and format our code so actually we need to subtract not only the width of div but also the width of the whitespace that is hard to measure because its not even visible from dev </a:t>
+            </a:r>
+            <a:r>
+              <a:rPr lang="en-GB" dirty="0" err="1" smtClean="0"/>
+              <a:t>tools.So</a:t>
+            </a:r>
+            <a:r>
+              <a:rPr lang="en-GB" dirty="0" smtClean="0"/>
+              <a:t> we just subtract a bit more from the width like subtract 54 instead of 49.</a:t>
+            </a:r>
+          </a:p>
+          <a:p>
+            <a:r>
+              <a:rPr lang="en-GB" dirty="0" smtClean="0"/>
+              <a:t>It is more of a hack and we will look into a cleaner solution in upcoming slides</a:t>
+            </a:r>
+          </a:p>
+          <a:p>
+            <a:endParaRPr lang="en-GB" dirty="0" smtClean="0"/>
+          </a:p>
+          <a:p>
+            <a:endParaRPr lang="en-GB" dirty="0"/>
+          </a:p>
+        </p:txBody>
+      </p:sp>
+    </p:spTree>
+    <p:extLst>
+      <p:ext uri="{BB962C8B-B14F-4D97-AF65-F5344CB8AC3E}">
+        <p14:creationId xmlns:p14="http://schemas.microsoft.com/office/powerpoint/2010/main" val="2638889010"/>
+      </p:ext>
+    </p:extLst>
+  </p:cSld>
+  <p:clrMapOvr>
+    <a:masterClrMapping/>
+  </p:clrMapOvr>
+</p:sld>
+</file>
+
+<file path=ppt/slides/slide47.xml><?xml version="1.0" encoding="utf-8"?>
 <p:sld xmlns:a="http://schemas.openxmlformats.org/drawingml/2006/main" xmlns:r="http://schemas.openxmlformats.org/officeDocument/2006/relationships" xmlns:p="http://schemas.openxmlformats.org/presentationml/2006/main" showMasterSp="0">
   <p:cSld>
     <p:spTree>

</xml_diff>

<commit_message>
Working with text decoration and vertical align
</commit_message>
<xml_diff>
--- a/PPT/Css-v3.pptx
+++ b/PPT/Css-v3.pptx
@@ -5,7 +5,7 @@
     <p:sldMasterId id="2147483660" r:id="rId1"/>
   </p:sldMasterIdLst>
   <p:notesMasterIdLst>
-    <p:notesMasterId r:id="rId49"/>
+    <p:notesMasterId r:id="rId51"/>
   </p:notesMasterIdLst>
   <p:sldIdLst>
     <p:sldId id="256" r:id="rId2"/>
@@ -54,7 +54,9 @@
     <p:sldId id="407" r:id="rId45"/>
     <p:sldId id="408" r:id="rId46"/>
     <p:sldId id="409" r:id="rId47"/>
-    <p:sldId id="268" r:id="rId48"/>
+    <p:sldId id="410" r:id="rId48"/>
+    <p:sldId id="411" r:id="rId49"/>
+    <p:sldId id="268" r:id="rId50"/>
   </p:sldIdLst>
   <p:sldSz cx="12192000" cy="6858000"/>
   <p:notesSz cx="6858000" cy="9144000"/>
@@ -243,7 +245,7 @@
           <a:p>
             <a:fld id="{39CD3BCA-8732-46CA-ADDD-C24F968DBEAF}" type="datetimeFigureOut">
               <a:rPr lang="en-GB" smtClean="0"/>
-              <a:t>08/11/2020</a:t>
+              <a:t>09/11/2020</a:t>
             </a:fld>
             <a:endParaRPr lang="en-GB"/>
           </a:p>
@@ -2746,7 +2748,7 @@
           <a:p>
             <a:fld id="{D4BA8270-C9CF-44CA-BE5A-02C2BDCCEDE4}" type="datetimeFigureOut">
               <a:rPr lang="en-GB" smtClean="0"/>
-              <a:t>08/11/2020</a:t>
+              <a:t>09/11/2020</a:t>
             </a:fld>
             <a:endParaRPr lang="en-GB"/>
           </a:p>
@@ -2997,7 +2999,7 @@
           <a:p>
             <a:fld id="{D4BA8270-C9CF-44CA-BE5A-02C2BDCCEDE4}" type="datetimeFigureOut">
               <a:rPr lang="en-GB" smtClean="0"/>
-              <a:t>08/11/2020</a:t>
+              <a:t>09/11/2020</a:t>
             </a:fld>
             <a:endParaRPr lang="en-GB"/>
           </a:p>
@@ -3311,7 +3313,7 @@
           <a:p>
             <a:fld id="{D4BA8270-C9CF-44CA-BE5A-02C2BDCCEDE4}" type="datetimeFigureOut">
               <a:rPr lang="en-GB" smtClean="0"/>
-              <a:t>08/11/2020</a:t>
+              <a:t>09/11/2020</a:t>
             </a:fld>
             <a:endParaRPr lang="en-GB"/>
           </a:p>
@@ -3652,7 +3654,7 @@
           <a:p>
             <a:fld id="{D4BA8270-C9CF-44CA-BE5A-02C2BDCCEDE4}" type="datetimeFigureOut">
               <a:rPr lang="en-GB" smtClean="0"/>
-              <a:t>08/11/2020</a:t>
+              <a:t>09/11/2020</a:t>
             </a:fld>
             <a:endParaRPr lang="en-GB"/>
           </a:p>
@@ -3966,7 +3968,7 @@
           <a:p>
             <a:fld id="{D4BA8270-C9CF-44CA-BE5A-02C2BDCCEDE4}" type="datetimeFigureOut">
               <a:rPr lang="en-GB" smtClean="0"/>
-              <a:t>08/11/2020</a:t>
+              <a:t>09/11/2020</a:t>
             </a:fld>
             <a:endParaRPr lang="en-GB"/>
           </a:p>
@@ -4359,7 +4361,7 @@
           <a:p>
             <a:fld id="{D4BA8270-C9CF-44CA-BE5A-02C2BDCCEDE4}" type="datetimeFigureOut">
               <a:rPr lang="en-GB" smtClean="0"/>
-              <a:t>08/11/2020</a:t>
+              <a:t>09/11/2020</a:t>
             </a:fld>
             <a:endParaRPr lang="en-GB"/>
           </a:p>
@@ -4529,7 +4531,7 @@
           <a:p>
             <a:fld id="{D4BA8270-C9CF-44CA-BE5A-02C2BDCCEDE4}" type="datetimeFigureOut">
               <a:rPr lang="en-GB" smtClean="0"/>
-              <a:t>08/11/2020</a:t>
+              <a:t>09/11/2020</a:t>
             </a:fld>
             <a:endParaRPr lang="en-GB"/>
           </a:p>
@@ -4709,7 +4711,7 @@
           <a:p>
             <a:fld id="{D4BA8270-C9CF-44CA-BE5A-02C2BDCCEDE4}" type="datetimeFigureOut">
               <a:rPr lang="en-GB" smtClean="0"/>
-              <a:t>08/11/2020</a:t>
+              <a:t>09/11/2020</a:t>
             </a:fld>
             <a:endParaRPr lang="en-GB"/>
           </a:p>
@@ -4885,7 +4887,7 @@
           <a:p>
             <a:fld id="{D4BA8270-C9CF-44CA-BE5A-02C2BDCCEDE4}" type="datetimeFigureOut">
               <a:rPr lang="en-GB" smtClean="0"/>
-              <a:t>08/11/2020</a:t>
+              <a:t>09/11/2020</a:t>
             </a:fld>
             <a:endParaRPr lang="en-GB"/>
           </a:p>
@@ -5132,7 +5134,7 @@
           <a:p>
             <a:fld id="{D4BA8270-C9CF-44CA-BE5A-02C2BDCCEDE4}" type="datetimeFigureOut">
               <a:rPr lang="en-GB" smtClean="0"/>
-              <a:t>08/11/2020</a:t>
+              <a:t>09/11/2020</a:t>
             </a:fld>
             <a:endParaRPr lang="en-GB"/>
           </a:p>
@@ -5364,7 +5366,7 @@
           <a:p>
             <a:fld id="{D4BA8270-C9CF-44CA-BE5A-02C2BDCCEDE4}" type="datetimeFigureOut">
               <a:rPr lang="en-GB" smtClean="0"/>
-              <a:t>08/11/2020</a:t>
+              <a:t>09/11/2020</a:t>
             </a:fld>
             <a:endParaRPr lang="en-GB"/>
           </a:p>
@@ -5738,7 +5740,7 @@
           <a:p>
             <a:fld id="{D4BA8270-C9CF-44CA-BE5A-02C2BDCCEDE4}" type="datetimeFigureOut">
               <a:rPr lang="en-GB" smtClean="0"/>
-              <a:t>08/11/2020</a:t>
+              <a:t>09/11/2020</a:t>
             </a:fld>
             <a:endParaRPr lang="en-GB"/>
           </a:p>
@@ -5861,7 +5863,7 @@
           <a:p>
             <a:fld id="{D4BA8270-C9CF-44CA-BE5A-02C2BDCCEDE4}" type="datetimeFigureOut">
               <a:rPr lang="en-GB" smtClean="0"/>
-              <a:t>08/11/2020</a:t>
+              <a:t>09/11/2020</a:t>
             </a:fld>
             <a:endParaRPr lang="en-GB"/>
           </a:p>
@@ -5956,7 +5958,7 @@
           <a:p>
             <a:fld id="{D4BA8270-C9CF-44CA-BE5A-02C2BDCCEDE4}" type="datetimeFigureOut">
               <a:rPr lang="en-GB" smtClean="0"/>
-              <a:t>08/11/2020</a:t>
+              <a:t>09/11/2020</a:t>
             </a:fld>
             <a:endParaRPr lang="en-GB"/>
           </a:p>
@@ -6211,7 +6213,7 @@
           <a:p>
             <a:fld id="{D4BA8270-C9CF-44CA-BE5A-02C2BDCCEDE4}" type="datetimeFigureOut">
               <a:rPr lang="en-GB" smtClean="0"/>
-              <a:t>08/11/2020</a:t>
+              <a:t>09/11/2020</a:t>
             </a:fld>
             <a:endParaRPr lang="en-GB"/>
           </a:p>
@@ -6474,7 +6476,7 @@
           <a:p>
             <a:fld id="{D4BA8270-C9CF-44CA-BE5A-02C2BDCCEDE4}" type="datetimeFigureOut">
               <a:rPr lang="en-GB" smtClean="0"/>
-              <a:t>08/11/2020</a:t>
+              <a:t>09/11/2020</a:t>
             </a:fld>
             <a:endParaRPr lang="en-GB"/>
           </a:p>
@@ -7217,7 +7219,7 @@
           <a:p>
             <a:fld id="{D4BA8270-C9CF-44CA-BE5A-02C2BDCCEDE4}" type="datetimeFigureOut">
               <a:rPr lang="en-GB" smtClean="0"/>
-              <a:t>08/11/2020</a:t>
+              <a:t>09/11/2020</a:t>
             </a:fld>
             <a:endParaRPr lang="en-GB"/>
           </a:p>
@@ -24744,6 +24746,359 @@
 </file>
 
 <file path=ppt/slides/slide47.xml><?xml version="1.0" encoding="utf-8"?>
+<p:sld xmlns:a="http://schemas.openxmlformats.org/drawingml/2006/main" xmlns:r="http://schemas.openxmlformats.org/officeDocument/2006/relationships" xmlns:p="http://schemas.openxmlformats.org/presentationml/2006/main">
+  <p:cSld>
+    <p:spTree>
+      <p:nvGrpSpPr>
+        <p:cNvPr id="1" name=""/>
+        <p:cNvGrpSpPr/>
+        <p:nvPr/>
+      </p:nvGrpSpPr>
+      <p:grpSpPr>
+        <a:xfrm>
+          <a:off x="0" y="0"/>
+          <a:ext cx="0" cy="0"/>
+          <a:chOff x="0" y="0"/>
+          <a:chExt cx="0" cy="0"/>
+        </a:xfrm>
+      </p:grpSpPr>
+      <p:sp>
+        <p:nvSpPr>
+          <p:cNvPr id="2" name="Title 1"/>
+          <p:cNvSpPr>
+            <a:spLocks noGrp="1"/>
+          </p:cNvSpPr>
+          <p:nvPr>
+            <p:ph type="title"/>
+          </p:nvPr>
+        </p:nvSpPr>
+        <p:spPr>
+          <a:xfrm>
+            <a:off x="750070" y="110836"/>
+            <a:ext cx="11292993" cy="626918"/>
+          </a:xfrm>
+        </p:spPr>
+        <p:txBody>
+          <a:bodyPr>
+            <a:normAutofit fontScale="90000"/>
+          </a:bodyPr>
+          <a:lstStyle/>
+          <a:p>
+            <a:r>
+              <a:rPr lang="en-GB" dirty="0"/>
+              <a:t>Working with "text-decoration" &amp; "vertical-align"</a:t>
+            </a:r>
+            <a:endParaRPr lang="en-GB" dirty="0"/>
+          </a:p>
+        </p:txBody>
+      </p:sp>
+      <p:sp>
+        <p:nvSpPr>
+          <p:cNvPr id="3" name="Content Placeholder 2"/>
+          <p:cNvSpPr>
+            <a:spLocks noGrp="1"/>
+          </p:cNvSpPr>
+          <p:nvPr>
+            <p:ph idx="1"/>
+          </p:nvPr>
+        </p:nvSpPr>
+        <p:spPr>
+          <a:xfrm>
+            <a:off x="677333" y="737754"/>
+            <a:ext cx="11085175" cy="5839691"/>
+          </a:xfrm>
+        </p:spPr>
+        <p:txBody>
+          <a:bodyPr>
+            <a:normAutofit lnSpcReduction="10000"/>
+          </a:bodyPr>
+          <a:lstStyle/>
+          <a:p>
+            <a:r>
+              <a:rPr lang="en-IN" dirty="0" smtClean="0"/>
+              <a:t>So now lets style our brand (&lt;a&gt; inside the header).So to do this first we need to select it lets add a class to it lets follow </a:t>
+            </a:r>
+            <a:r>
+              <a:rPr lang="en-IN" dirty="0" err="1" smtClean="0"/>
+              <a:t>bem</a:t>
+            </a:r>
+            <a:r>
+              <a:rPr lang="en-IN" dirty="0" smtClean="0"/>
+              <a:t> and name it main-</a:t>
+            </a:r>
+            <a:r>
+              <a:rPr lang="en-IN" dirty="0" err="1" smtClean="0"/>
+              <a:t>header__brand</a:t>
+            </a:r>
+            <a:r>
+              <a:rPr lang="en-IN" dirty="0" smtClean="0"/>
+              <a:t>.</a:t>
+            </a:r>
+          </a:p>
+          <a:p>
+            <a:r>
+              <a:rPr lang="en-IN" dirty="0" smtClean="0"/>
+              <a:t>Select it in our </a:t>
+            </a:r>
+            <a:r>
+              <a:rPr lang="en-IN" dirty="0" err="1" smtClean="0"/>
+              <a:t>css</a:t>
+            </a:r>
+            <a:r>
+              <a:rPr lang="en-IN" dirty="0" smtClean="0"/>
+              <a:t> file using the class selector</a:t>
+            </a:r>
+          </a:p>
+          <a:p>
+            <a:r>
+              <a:rPr lang="en-IN" dirty="0" smtClean="0"/>
+              <a:t>So we will apply following styling</a:t>
+            </a:r>
+          </a:p>
+          <a:p>
+            <a:pPr lvl="1"/>
+            <a:r>
+              <a:rPr lang="en-IN" dirty="0" smtClean="0"/>
+              <a:t>Remove the default underlining</a:t>
+            </a:r>
+          </a:p>
+          <a:p>
+            <a:pPr lvl="1"/>
+            <a:r>
+              <a:rPr lang="en-IN" dirty="0" smtClean="0"/>
+              <a:t>Lets change the </a:t>
+            </a:r>
+            <a:r>
+              <a:rPr lang="en-IN" dirty="0" err="1" smtClean="0"/>
+              <a:t>color</a:t>
+            </a:r>
+            <a:endParaRPr lang="en-IN" dirty="0" smtClean="0"/>
+          </a:p>
+          <a:p>
+            <a:pPr lvl="1"/>
+            <a:r>
+              <a:rPr lang="en-IN" dirty="0" smtClean="0"/>
+              <a:t>Make the text bold</a:t>
+            </a:r>
+          </a:p>
+          <a:p>
+            <a:pPr lvl="1"/>
+            <a:r>
+              <a:rPr lang="en-IN" dirty="0" smtClean="0"/>
+              <a:t>Increase the font size</a:t>
+            </a:r>
+          </a:p>
+          <a:p>
+            <a:r>
+              <a:rPr lang="en-IN" dirty="0" smtClean="0"/>
+              <a:t>So lets remove the underline by setting </a:t>
+            </a:r>
+            <a:r>
+              <a:rPr lang="en-IN" dirty="0" err="1" smtClean="0"/>
+              <a:t>text-decoration:none</a:t>
+            </a:r>
+            <a:r>
+              <a:rPr lang="en-IN" dirty="0" smtClean="0"/>
+              <a:t> which is by default set by browser to </a:t>
+            </a:r>
+            <a:r>
+              <a:rPr lang="en-IN" dirty="0" err="1" smtClean="0"/>
+              <a:t>underline.Change</a:t>
+            </a:r>
+            <a:r>
+              <a:rPr lang="en-IN" dirty="0" smtClean="0"/>
+              <a:t> the </a:t>
+            </a:r>
+            <a:r>
+              <a:rPr lang="en-IN" dirty="0" err="1" smtClean="0"/>
+              <a:t>color</a:t>
+            </a:r>
+            <a:r>
+              <a:rPr lang="en-IN" dirty="0" smtClean="0"/>
+              <a:t> to darker green by adding </a:t>
+            </a:r>
+            <a:r>
+              <a:rPr lang="en-IN" dirty="0" err="1" smtClean="0"/>
+              <a:t>color</a:t>
+            </a:r>
+            <a:r>
+              <a:rPr lang="en-IN" dirty="0" smtClean="0"/>
+              <a:t>:#0e4f1f and lets make it bold by adding </a:t>
+            </a:r>
+            <a:r>
+              <a:rPr lang="en-IN" dirty="0" err="1" smtClean="0"/>
+              <a:t>font-weight:bold</a:t>
+            </a:r>
+            <a:r>
+              <a:rPr lang="en-IN" dirty="0" smtClean="0"/>
+              <a:t> and set the font size by setting font-size:22px</a:t>
+            </a:r>
+          </a:p>
+          <a:p>
+            <a:r>
+              <a:rPr lang="en-IN" dirty="0" smtClean="0"/>
+              <a:t>This would now cause the size to increase and thus split into two line so we need to fix our hack again by subtracting a bit more from the width maybe </a:t>
+            </a:r>
+            <a:r>
+              <a:rPr lang="en-IN" dirty="0" err="1" smtClean="0"/>
+              <a:t>decduct</a:t>
+            </a:r>
+            <a:r>
+              <a:rPr lang="en-IN" dirty="0" smtClean="0"/>
+              <a:t> 74px</a:t>
+            </a:r>
+          </a:p>
+          <a:p>
+            <a:r>
+              <a:rPr lang="en-IN" dirty="0" smtClean="0"/>
+              <a:t>Now we will notice that the brand is styled well but the links are now aligned to the </a:t>
+            </a:r>
+            <a:r>
+              <a:rPr lang="en-IN" dirty="0" err="1" smtClean="0"/>
+              <a:t>botton</a:t>
+            </a:r>
+            <a:r>
+              <a:rPr lang="en-IN" dirty="0" smtClean="0"/>
+              <a:t> of the brand as the brand has a higher font size so links don’t appear aligned </a:t>
+            </a:r>
+            <a:r>
+              <a:rPr lang="en-IN" dirty="0" err="1" smtClean="0"/>
+              <a:t>center</a:t>
+            </a:r>
+            <a:r>
+              <a:rPr lang="en-IN" dirty="0" smtClean="0"/>
+              <a:t> and are aligned more towards the bottom of the brand.</a:t>
+            </a:r>
+          </a:p>
+          <a:p>
+            <a:r>
+              <a:rPr lang="en-IN" dirty="0"/>
+              <a:t>To fix this we need to set the </a:t>
+            </a:r>
+            <a:r>
+              <a:rPr lang="en-IN" dirty="0" err="1"/>
+              <a:t>vertical-align:middle</a:t>
+            </a:r>
+            <a:r>
+              <a:rPr lang="en-IN" dirty="0"/>
+              <a:t> to both the brand and the </a:t>
+            </a:r>
+            <a:r>
+              <a:rPr lang="en-IN" dirty="0" err="1"/>
+              <a:t>nav</a:t>
+            </a:r>
+            <a:r>
+              <a:rPr lang="en-IN" dirty="0"/>
+              <a:t> holding the links</a:t>
+            </a:r>
+            <a:endParaRPr lang="en-GB" dirty="0"/>
+          </a:p>
+          <a:p>
+            <a:endParaRPr lang="en-IN" dirty="0" smtClean="0"/>
+          </a:p>
+          <a:p>
+            <a:endParaRPr lang="en-GB" dirty="0"/>
+          </a:p>
+        </p:txBody>
+      </p:sp>
+    </p:spTree>
+    <p:extLst>
+      <p:ext uri="{BB962C8B-B14F-4D97-AF65-F5344CB8AC3E}">
+        <p14:creationId xmlns:p14="http://schemas.microsoft.com/office/powerpoint/2010/main" val="3058093593"/>
+      </p:ext>
+    </p:extLst>
+  </p:cSld>
+  <p:clrMapOvr>
+    <a:masterClrMapping/>
+  </p:clrMapOvr>
+</p:sld>
+</file>
+
+<file path=ppt/slides/slide48.xml><?xml version="1.0" encoding="utf-8"?>
+<p:sld xmlns:a="http://schemas.openxmlformats.org/drawingml/2006/main" xmlns:r="http://schemas.openxmlformats.org/officeDocument/2006/relationships" xmlns:p="http://schemas.openxmlformats.org/presentationml/2006/main">
+  <p:cSld>
+    <p:spTree>
+      <p:nvGrpSpPr>
+        <p:cNvPr id="1" name=""/>
+        <p:cNvGrpSpPr/>
+        <p:nvPr/>
+      </p:nvGrpSpPr>
+      <p:grpSpPr>
+        <a:xfrm>
+          <a:off x="0" y="0"/>
+          <a:ext cx="0" cy="0"/>
+          <a:chOff x="0" y="0"/>
+          <a:chExt cx="0" cy="0"/>
+        </a:xfrm>
+      </p:grpSpPr>
+      <p:sp>
+        <p:nvSpPr>
+          <p:cNvPr id="2" name="Title 1"/>
+          <p:cNvSpPr>
+            <a:spLocks noGrp="1"/>
+          </p:cNvSpPr>
+          <p:nvPr>
+            <p:ph type="title"/>
+          </p:nvPr>
+        </p:nvSpPr>
+        <p:spPr>
+          <a:xfrm>
+            <a:off x="750070" y="110836"/>
+            <a:ext cx="11292993" cy="626918"/>
+          </a:xfrm>
+        </p:spPr>
+        <p:txBody>
+          <a:bodyPr>
+            <a:normAutofit fontScale="90000"/>
+          </a:bodyPr>
+          <a:lstStyle/>
+          <a:p>
+            <a:r>
+              <a:rPr lang="en-GB" dirty="0"/>
+              <a:t>Working with "text-decoration" &amp; "vertical-align"</a:t>
+            </a:r>
+            <a:endParaRPr lang="en-GB" dirty="0"/>
+          </a:p>
+        </p:txBody>
+      </p:sp>
+      <p:sp>
+        <p:nvSpPr>
+          <p:cNvPr id="3" name="Content Placeholder 2"/>
+          <p:cNvSpPr>
+            <a:spLocks noGrp="1"/>
+          </p:cNvSpPr>
+          <p:nvPr>
+            <p:ph idx="1"/>
+          </p:nvPr>
+        </p:nvSpPr>
+        <p:spPr>
+          <a:xfrm>
+            <a:off x="677333" y="997527"/>
+            <a:ext cx="11085175" cy="5579918"/>
+          </a:xfrm>
+        </p:spPr>
+        <p:txBody>
+          <a:bodyPr/>
+          <a:lstStyle/>
+          <a:p>
+            <a:endParaRPr lang="en-GB" dirty="0"/>
+          </a:p>
+        </p:txBody>
+      </p:sp>
+    </p:spTree>
+    <p:extLst>
+      <p:ext uri="{BB962C8B-B14F-4D97-AF65-F5344CB8AC3E}">
+        <p14:creationId xmlns:p14="http://schemas.microsoft.com/office/powerpoint/2010/main" val="3668551575"/>
+      </p:ext>
+    </p:extLst>
+  </p:cSld>
+  <p:clrMapOvr>
+    <a:masterClrMapping/>
+  </p:clrMapOvr>
+</p:sld>
+</file>
+
+<file path=ppt/slides/slide49.xml><?xml version="1.0" encoding="utf-8"?>
 <p:sld xmlns:a="http://schemas.openxmlformats.org/drawingml/2006/main" xmlns:r="http://schemas.openxmlformats.org/officeDocument/2006/relationships" xmlns:p="http://schemas.openxmlformats.org/presentationml/2006/main" showMasterSp="0">
   <p:cSld>
     <p:spTree>

</xml_diff>

<commit_message>
Pseudo Classes & Pseudo Elements
</commit_message>
<xml_diff>
--- a/PPT/Css-v3.pptx
+++ b/PPT/Css-v3.pptx
@@ -5,7 +5,7 @@
     <p:sldMasterId id="2147483660" r:id="rId1"/>
   </p:sldMasterIdLst>
   <p:notesMasterIdLst>
-    <p:notesMasterId r:id="rId51"/>
+    <p:notesMasterId r:id="rId54"/>
   </p:notesMasterIdLst>
   <p:sldIdLst>
     <p:sldId id="256" r:id="rId2"/>
@@ -56,7 +56,10 @@
     <p:sldId id="409" r:id="rId47"/>
     <p:sldId id="410" r:id="rId48"/>
     <p:sldId id="411" r:id="rId49"/>
-    <p:sldId id="268" r:id="rId50"/>
+    <p:sldId id="412" r:id="rId50"/>
+    <p:sldId id="413" r:id="rId51"/>
+    <p:sldId id="414" r:id="rId52"/>
+    <p:sldId id="268" r:id="rId53"/>
   </p:sldIdLst>
   <p:sldSz cx="12192000" cy="6858000"/>
   <p:notesSz cx="6858000" cy="9144000"/>
@@ -7979,6 +7982,13 @@
   <p:clrMapOvr>
     <a:masterClrMapping/>
   </p:clrMapOvr>
+  <p:timing>
+    <p:tnLst>
+      <p:par>
+        <p:cTn id="1" dur="indefinite" restart="never" nodeType="tmRoot"/>
+      </p:par>
+    </p:tnLst>
+  </p:timing>
 </p:sld>
 </file>
 
@@ -8091,6 +8101,13 @@
   <p:clrMapOvr>
     <a:masterClrMapping/>
   </p:clrMapOvr>
+  <p:timing>
+    <p:tnLst>
+      <p:par>
+        <p:cTn id="1" dur="indefinite" restart="never" nodeType="tmRoot"/>
+      </p:par>
+    </p:tnLst>
+  </p:timing>
 </p:sld>
 </file>
 
@@ -8320,6 +8337,13 @@
   <p:clrMapOvr>
     <a:masterClrMapping/>
   </p:clrMapOvr>
+  <p:timing>
+    <p:tnLst>
+      <p:par>
+        <p:cTn id="1" dur="indefinite" restart="never" nodeType="tmRoot"/>
+      </p:par>
+    </p:tnLst>
+  </p:timing>
 </p:sld>
 </file>
 
@@ -8548,6 +8572,13 @@
   <p:clrMapOvr>
     <a:masterClrMapping/>
   </p:clrMapOvr>
+  <p:timing>
+    <p:tnLst>
+      <p:par>
+        <p:cTn id="1" dur="indefinite" restart="never" nodeType="tmRoot"/>
+      </p:par>
+    </p:tnLst>
+  </p:timing>
 </p:sld>
 </file>
 
@@ -8709,6 +8740,13 @@
   <p:clrMapOvr>
     <a:masterClrMapping/>
   </p:clrMapOvr>
+  <p:timing>
+    <p:tnLst>
+      <p:par>
+        <p:cTn id="1" dur="indefinite" restart="never" nodeType="tmRoot"/>
+      </p:par>
+    </p:tnLst>
+  </p:timing>
 </p:sld>
 </file>
 
@@ -14844,6 +14882,13 @@
   <p:clrMapOvr>
     <a:masterClrMapping/>
   </p:clrMapOvr>
+  <p:timing>
+    <p:tnLst>
+      <p:par>
+        <p:cTn id="1" dur="indefinite" restart="never" nodeType="tmRoot"/>
+      </p:par>
+    </p:tnLst>
+  </p:timing>
 </p:sld>
 </file>
 
@@ -15063,6 +15108,13 @@
   <p:clrMapOvr>
     <a:masterClrMapping/>
   </p:clrMapOvr>
+  <p:timing>
+    <p:tnLst>
+      <p:par>
+        <p:cTn id="1" dur="indefinite" restart="never" nodeType="tmRoot"/>
+      </p:par>
+    </p:tnLst>
+  </p:timing>
 </p:sld>
 </file>
 
@@ -19666,6 +19718,13 @@
   <p:clrMapOvr>
     <a:masterClrMapping/>
   </p:clrMapOvr>
+  <p:timing>
+    <p:tnLst>
+      <p:par>
+        <p:cTn id="1" dur="indefinite" restart="never" nodeType="tmRoot"/>
+      </p:par>
+    </p:tnLst>
+  </p:timing>
 </p:sld>
 </file>
 
@@ -19954,6 +20013,13 @@
   <p:clrMapOvr>
     <a:masterClrMapping/>
   </p:clrMapOvr>
+  <p:timing>
+    <p:tnLst>
+      <p:par>
+        <p:cTn id="1" dur="indefinite" restart="never" nodeType="tmRoot"/>
+      </p:par>
+    </p:tnLst>
+  </p:timing>
 </p:sld>
 </file>
 
@@ -20164,6 +20230,13 @@
   <p:clrMapOvr>
     <a:masterClrMapping/>
   </p:clrMapOvr>
+  <p:timing>
+    <p:tnLst>
+      <p:par>
+        <p:cTn id="1" dur="indefinite" restart="never" nodeType="tmRoot"/>
+      </p:par>
+    </p:tnLst>
+  </p:timing>
 </p:sld>
 </file>
 
@@ -20311,6 +20384,13 @@
   <p:clrMapOvr>
     <a:masterClrMapping/>
   </p:clrMapOvr>
+  <p:timing>
+    <p:tnLst>
+      <p:par>
+        <p:cTn id="1" dur="indefinite" restart="never" nodeType="tmRoot"/>
+      </p:par>
+    </p:tnLst>
+  </p:timing>
 </p:sld>
 </file>
 
@@ -20537,6 +20617,13 @@
   <p:clrMapOvr>
     <a:masterClrMapping/>
   </p:clrMapOvr>
+  <p:timing>
+    <p:tnLst>
+      <p:par>
+        <p:cTn id="1" dur="indefinite" restart="never" nodeType="tmRoot"/>
+      </p:par>
+    </p:tnLst>
+  </p:timing>
 </p:sld>
 </file>
 
@@ -20673,6 +20760,13 @@
   <p:clrMapOvr>
     <a:masterClrMapping/>
   </p:clrMapOvr>
+  <p:timing>
+    <p:tnLst>
+      <p:par>
+        <p:cTn id="1" dur="indefinite" restart="never" nodeType="tmRoot"/>
+      </p:par>
+    </p:tnLst>
+  </p:timing>
 </p:sld>
 </file>
 
@@ -21258,6 +21352,13 @@
   <p:clrMapOvr>
     <a:masterClrMapping/>
   </p:clrMapOvr>
+  <p:timing>
+    <p:tnLst>
+      <p:par>
+        <p:cTn id="1" dur="indefinite" restart="never" nodeType="tmRoot"/>
+      </p:par>
+    </p:tnLst>
+  </p:timing>
 </p:sld>
 </file>
 
@@ -23280,6 +23381,13 @@
   <p:clrMapOvr>
     <a:masterClrMapping/>
   </p:clrMapOvr>
+  <p:timing>
+    <p:tnLst>
+      <p:par>
+        <p:cTn id="1" dur="indefinite" restart="never" nodeType="tmRoot"/>
+      </p:par>
+    </p:tnLst>
+  </p:timing>
 </p:sld>
 </file>
 
@@ -23538,6 +23646,13 @@
   <p:clrMapOvr>
     <a:masterClrMapping/>
   </p:clrMapOvr>
+  <p:timing>
+    <p:tnLst>
+      <p:par>
+        <p:cTn id="1" dur="indefinite" restart="never" nodeType="tmRoot"/>
+      </p:par>
+    </p:tnLst>
+  </p:timing>
 </p:sld>
 </file>
 
@@ -23697,6 +23812,13 @@
   <p:clrMapOvr>
     <a:masterClrMapping/>
   </p:clrMapOvr>
+  <p:timing>
+    <p:tnLst>
+      <p:par>
+        <p:cTn id="1" dur="indefinite" restart="never" nodeType="tmRoot"/>
+      </p:par>
+    </p:tnLst>
+  </p:timing>
 </p:sld>
 </file>
 
@@ -23956,6 +24078,13 @@
   <p:clrMapOvr>
     <a:masterClrMapping/>
   </p:clrMapOvr>
+  <p:timing>
+    <p:tnLst>
+      <p:par>
+        <p:cTn id="1" dur="indefinite" restart="never" nodeType="tmRoot"/>
+      </p:par>
+    </p:tnLst>
+  </p:timing>
 </p:sld>
 </file>
 
@@ -24063,12 +24192,12 @@
               <a:t>Using display property we can although change the default behaviour of elements we can set the display property to block to make an element behave like a block element, to inline to make it behave like inline, change it to none to hide it from </a:t>
             </a:r>
             <a:r>
-              <a:rPr lang="en-IN" dirty="0" err="1" smtClean="0"/>
-              <a:t>visisble</a:t>
-            </a:r>
-            <a:r>
-              <a:rPr lang="en-IN" dirty="0" smtClean="0"/>
-              <a:t> flow although it will still be part of the </a:t>
+              <a:rPr lang="en-IN" dirty="0" smtClean="0"/>
+              <a:t>visible </a:t>
+            </a:r>
+            <a:r>
+              <a:rPr lang="en-IN" dirty="0" smtClean="0"/>
+              <a:t>flow although it will still be part of the </a:t>
             </a:r>
             <a:r>
               <a:rPr lang="en-IN" dirty="0" err="1" smtClean="0"/>
@@ -24126,6 +24255,13 @@
   <p:clrMapOvr>
     <a:masterClrMapping/>
   </p:clrMapOvr>
+  <p:timing>
+    <p:tnLst>
+      <p:par>
+        <p:cTn id="1" dur="indefinite" restart="never" nodeType="tmRoot"/>
+      </p:par>
+    </p:tnLst>
+  </p:timing>
 </p:sld>
 </file>
 
@@ -24243,6 +24379,13 @@
   <p:clrMapOvr>
     <a:masterClrMapping/>
   </p:clrMapOvr>
+  <p:timing>
+    <p:tnLst>
+      <p:par>
+        <p:cTn id="1" dur="indefinite" restart="never" nodeType="tmRoot"/>
+      </p:par>
+    </p:tnLst>
+  </p:timing>
 </p:sld>
 </file>
 
@@ -24513,6 +24656,13 @@
   <p:clrMapOvr>
     <a:masterClrMapping/>
   </p:clrMapOvr>
+  <p:timing>
+    <p:tnLst>
+      <p:par>
+        <p:cTn id="1" dur="indefinite" restart="never" nodeType="tmRoot"/>
+      </p:par>
+    </p:tnLst>
+  </p:timing>
 </p:sld>
 </file>
 
@@ -24742,6 +24892,13 @@
   <p:clrMapOvr>
     <a:masterClrMapping/>
   </p:clrMapOvr>
+  <p:timing>
+    <p:tnLst>
+      <p:par>
+        <p:cTn id="1" dur="indefinite" restart="never" nodeType="tmRoot"/>
+      </p:par>
+    </p:tnLst>
+  </p:timing>
 </p:sld>
 </file>
 
@@ -25010,6 +25167,13 @@
   <p:clrMapOvr>
     <a:masterClrMapping/>
   </p:clrMapOvr>
+  <p:timing>
+    <p:tnLst>
+      <p:par>
+        <p:cTn id="1" dur="indefinite" restart="never" nodeType="tmRoot"/>
+      </p:par>
+    </p:tnLst>
+  </p:timing>
 </p:sld>
 </file>
 
@@ -25056,7 +25220,6 @@
               <a:rPr lang="en-GB" dirty="0"/>
               <a:t>Styling Anchor Tags</a:t>
             </a:r>
-            <a:endParaRPr lang="en-GB" dirty="0"/>
           </a:p>
         </p:txBody>
       </p:sp>
@@ -25285,11 +25448,18 @@
   <p:clrMapOvr>
     <a:masterClrMapping/>
   </p:clrMapOvr>
+  <p:timing>
+    <p:tnLst>
+      <p:par>
+        <p:cTn id="1" dur="indefinite" restart="never" nodeType="tmRoot"/>
+      </p:par>
+    </p:tnLst>
+  </p:timing>
 </p:sld>
 </file>
 
 <file path=ppt/slides/slide49.xml><?xml version="1.0" encoding="utf-8"?>
-<p:sld xmlns:a="http://schemas.openxmlformats.org/drawingml/2006/main" xmlns:r="http://schemas.openxmlformats.org/officeDocument/2006/relationships" xmlns:p="http://schemas.openxmlformats.org/presentationml/2006/main" showMasterSp="0">
+<p:sld xmlns:a="http://schemas.openxmlformats.org/drawingml/2006/main" xmlns:r="http://schemas.openxmlformats.org/officeDocument/2006/relationships" xmlns:p="http://schemas.openxmlformats.org/presentationml/2006/main">
   <p:cSld>
     <p:spTree>
       <p:nvGrpSpPr>
@@ -25307,6 +25477,36 @@
       </p:grpSpPr>
       <p:sp>
         <p:nvSpPr>
+          <p:cNvPr id="2" name="Title 1"/>
+          <p:cNvSpPr>
+            <a:spLocks noGrp="1"/>
+          </p:cNvSpPr>
+          <p:nvPr>
+            <p:ph type="title"/>
+          </p:nvPr>
+        </p:nvSpPr>
+        <p:spPr>
+          <a:xfrm>
+            <a:off x="864903" y="62523"/>
+            <a:ext cx="8596668" cy="547077"/>
+          </a:xfrm>
+        </p:spPr>
+        <p:txBody>
+          <a:bodyPr>
+            <a:normAutofit fontScale="90000"/>
+          </a:bodyPr>
+          <a:lstStyle/>
+          <a:p>
+            <a:r>
+              <a:rPr lang="en-GB" dirty="0"/>
+              <a:t>Adding Pseudo Classes</a:t>
+            </a:r>
+            <a:endParaRPr lang="en-GB" dirty="0"/>
+          </a:p>
+        </p:txBody>
+      </p:sp>
+      <p:sp>
+        <p:nvSpPr>
           <p:cNvPr id="3" name="Content Placeholder 2"/>
           <p:cNvSpPr>
             <a:spLocks noGrp="1"/>
@@ -25317,44 +25517,152 @@
         </p:nvSpPr>
         <p:spPr>
           <a:xfrm>
-            <a:off x="3163860" y="2754147"/>
-            <a:ext cx="8596668" cy="3880773"/>
+            <a:off x="677333" y="734647"/>
+            <a:ext cx="11170789" cy="5306716"/>
           </a:xfrm>
         </p:spPr>
         <p:txBody>
-          <a:bodyPr>
-            <a:normAutofit/>
-          </a:bodyPr>
+          <a:bodyPr/>
           <a:lstStyle/>
           <a:p>
-            <a:pPr marL="0" indent="0">
-              <a:buNone/>
-            </a:pPr>
-            <a:r>
-              <a:rPr lang="en-IN" sz="5400" b="1" smtClean="0"/>
-              <a:t>Thanks!!!!!</a:t>
-            </a:r>
-            <a:endParaRPr lang="en-GB" sz="5400" b="1" dirty="0"/>
+            <a:r>
+              <a:rPr lang="en-GB" dirty="0" smtClean="0"/>
+              <a:t>Lets style the links further:</a:t>
+            </a:r>
+          </a:p>
+          <a:p>
+            <a:pPr lvl="1"/>
+            <a:r>
+              <a:rPr lang="en-GB" dirty="0" smtClean="0"/>
+              <a:t>The links should change </a:t>
+            </a:r>
+            <a:r>
+              <a:rPr lang="en-GB" dirty="0" err="1" smtClean="0"/>
+              <a:t>color</a:t>
+            </a:r>
+            <a:r>
+              <a:rPr lang="en-GB" dirty="0" smtClean="0"/>
+              <a:t> if we hover over them lets say white </a:t>
+            </a:r>
+            <a:r>
+              <a:rPr lang="en-GB" dirty="0" err="1" smtClean="0"/>
+              <a:t>color</a:t>
+            </a:r>
+            <a:endParaRPr lang="en-GB" dirty="0" smtClean="0"/>
+          </a:p>
+          <a:p>
+            <a:pPr lvl="1"/>
+            <a:r>
+              <a:rPr lang="en-GB" dirty="0" smtClean="0"/>
+              <a:t>Also the links should change colour if we keep them clicked like a touch event on a mobile device lets say white </a:t>
+            </a:r>
+            <a:r>
+              <a:rPr lang="en-GB" dirty="0" err="1" smtClean="0"/>
+              <a:t>color</a:t>
+            </a:r>
+            <a:endParaRPr lang="en-GB" dirty="0" smtClean="0"/>
+          </a:p>
+          <a:p>
+            <a:r>
+              <a:rPr lang="en-GB" dirty="0" smtClean="0"/>
+              <a:t>We can achieve this by using pseudo </a:t>
+            </a:r>
+            <a:r>
+              <a:rPr lang="en-GB" dirty="0" err="1" smtClean="0"/>
+              <a:t>classes.Lets</a:t>
+            </a:r>
+            <a:r>
+              <a:rPr lang="en-GB" dirty="0" smtClean="0"/>
+              <a:t> add such a </a:t>
+            </a:r>
+            <a:r>
+              <a:rPr lang="en-GB" dirty="0" err="1" smtClean="0"/>
+              <a:t>css</a:t>
+            </a:r>
+            <a:r>
+              <a:rPr lang="en-GB" dirty="0" smtClean="0"/>
+              <a:t> and then understand it further in theory</a:t>
+            </a:r>
+          </a:p>
+          <a:p>
+            <a:r>
+              <a:rPr lang="en-GB" dirty="0" smtClean="0"/>
+              <a:t>We add a </a:t>
+            </a:r>
+            <a:r>
+              <a:rPr lang="en-GB" dirty="0" err="1" smtClean="0"/>
+              <a:t>combinator</a:t>
+            </a:r>
+            <a:r>
+              <a:rPr lang="en-GB" dirty="0" smtClean="0"/>
+              <a:t> like .main-</a:t>
+            </a:r>
+            <a:r>
+              <a:rPr lang="en-GB" dirty="0" err="1" smtClean="0"/>
+              <a:t>nav</a:t>
+            </a:r>
+            <a:r>
+              <a:rPr lang="en-GB" dirty="0" smtClean="0"/>
+              <a:t>__item a but now we add a pseudo class to anchor tag as Main-</a:t>
+            </a:r>
+            <a:r>
+              <a:rPr lang="en-GB" dirty="0" err="1" smtClean="0"/>
+              <a:t>nav</a:t>
+            </a:r>
+            <a:r>
+              <a:rPr lang="en-GB" dirty="0" smtClean="0"/>
+              <a:t>__item a:hover for hover and main-</a:t>
+            </a:r>
+            <a:r>
+              <a:rPr lang="en-GB" dirty="0" err="1" smtClean="0"/>
+              <a:t>nav</a:t>
+            </a:r>
+            <a:r>
+              <a:rPr lang="en-GB" dirty="0" smtClean="0"/>
+              <a:t>__item a:active.Active and hover are just a few examples of pseudo classes that we can add</a:t>
+            </a:r>
+          </a:p>
+          <a:p>
+            <a:r>
+              <a:rPr lang="en-GB" dirty="0" smtClean="0"/>
+              <a:t>Inside these selectors just add the </a:t>
+            </a:r>
+            <a:r>
+              <a:rPr lang="en-GB" dirty="0" err="1" smtClean="0"/>
+              <a:t>color:white</a:t>
+            </a:r>
+            <a:r>
+              <a:rPr lang="en-GB" dirty="0" smtClean="0"/>
+              <a:t> rule</a:t>
+            </a:r>
+          </a:p>
+          <a:p>
+            <a:r>
+              <a:rPr lang="en-GB" dirty="0" smtClean="0"/>
+              <a:t>Now if we hover over our links or keep them pressed the colour changes to white</a:t>
+            </a:r>
+          </a:p>
+          <a:p>
+            <a:r>
+              <a:rPr lang="en-GB" dirty="0" smtClean="0"/>
+              <a:t>Lets study about pseudo classes in depth on next slide</a:t>
+            </a:r>
+          </a:p>
+          <a:p>
+            <a:endParaRPr lang="en-GB" dirty="0"/>
           </a:p>
         </p:txBody>
       </p:sp>
     </p:spTree>
     <p:extLst>
       <p:ext uri="{BB962C8B-B14F-4D97-AF65-F5344CB8AC3E}">
-        <p14:creationId xmlns:p14="http://schemas.microsoft.com/office/powerpoint/2010/main" val="3977684842"/>
+        <p14:creationId xmlns:p14="http://schemas.microsoft.com/office/powerpoint/2010/main" val="3184617382"/>
       </p:ext>
     </p:extLst>
   </p:cSld>
   <p:clrMapOvr>
     <a:masterClrMapping/>
   </p:clrMapOvr>
-  <p:timing>
-    <p:tnLst>
-      <p:par>
-        <p:cTn id="1" dur="indefinite" restart="never" nodeType="tmRoot"/>
-      </p:par>
-    </p:tnLst>
-  </p:timing>
 </p:sld>
 </file>
 
@@ -25444,6 +25752,513 @@
     <p:extLst>
       <p:ext uri="{BB962C8B-B14F-4D97-AF65-F5344CB8AC3E}">
         <p14:creationId xmlns:p14="http://schemas.microsoft.com/office/powerpoint/2010/main" val="2681910176"/>
+      </p:ext>
+    </p:extLst>
+  </p:cSld>
+  <p:clrMapOvr>
+    <a:masterClrMapping/>
+  </p:clrMapOvr>
+  <p:timing>
+    <p:tnLst>
+      <p:par>
+        <p:cTn id="1" dur="indefinite" restart="never" nodeType="tmRoot"/>
+      </p:par>
+    </p:tnLst>
+  </p:timing>
+</p:sld>
+</file>
+
+<file path=ppt/slides/slide50.xml><?xml version="1.0" encoding="utf-8"?>
+<p:sld xmlns:a="http://schemas.openxmlformats.org/drawingml/2006/main" xmlns:r="http://schemas.openxmlformats.org/officeDocument/2006/relationships" xmlns:p="http://schemas.openxmlformats.org/presentationml/2006/main">
+  <p:cSld>
+    <p:spTree>
+      <p:nvGrpSpPr>
+        <p:cNvPr id="1" name=""/>
+        <p:cNvGrpSpPr/>
+        <p:nvPr/>
+      </p:nvGrpSpPr>
+      <p:grpSpPr>
+        <a:xfrm>
+          <a:off x="0" y="0"/>
+          <a:ext cx="0" cy="0"/>
+          <a:chOff x="0" y="0"/>
+          <a:chExt cx="0" cy="0"/>
+        </a:xfrm>
+      </p:grpSpPr>
+      <p:sp>
+        <p:nvSpPr>
+          <p:cNvPr id="2" name="Title 1"/>
+          <p:cNvSpPr>
+            <a:spLocks noGrp="1"/>
+          </p:cNvSpPr>
+          <p:nvPr>
+            <p:ph type="title"/>
+          </p:nvPr>
+        </p:nvSpPr>
+        <p:spPr>
+          <a:xfrm>
+            <a:off x="677334" y="100446"/>
+            <a:ext cx="8596668" cy="626918"/>
+          </a:xfrm>
+        </p:spPr>
+        <p:txBody>
+          <a:bodyPr>
+            <a:normAutofit fontScale="90000"/>
+          </a:bodyPr>
+          <a:lstStyle/>
+          <a:p>
+            <a:r>
+              <a:rPr lang="en-GB" dirty="0"/>
+              <a:t>Pseudo Classes &amp; Pseudo Elements</a:t>
+            </a:r>
+            <a:endParaRPr lang="en-GB" dirty="0"/>
+          </a:p>
+        </p:txBody>
+      </p:sp>
+      <p:sp>
+        <p:nvSpPr>
+          <p:cNvPr id="3" name="Content Placeholder 2"/>
+          <p:cNvSpPr>
+            <a:spLocks noGrp="1"/>
+          </p:cNvSpPr>
+          <p:nvPr>
+            <p:ph idx="1"/>
+          </p:nvPr>
+        </p:nvSpPr>
+        <p:spPr>
+          <a:xfrm>
+            <a:off x="677333" y="893618"/>
+            <a:ext cx="11241039" cy="5621481"/>
+          </a:xfrm>
+        </p:spPr>
+        <p:txBody>
+          <a:bodyPr>
+            <a:normAutofit fontScale="92500" lnSpcReduction="20000"/>
+          </a:bodyPr>
+          <a:lstStyle/>
+          <a:p>
+            <a:r>
+              <a:rPr lang="en-GB" dirty="0" smtClean="0"/>
+              <a:t>Pseudo classes define a style or allow us to define a style for a special state of an element like the hover or active state</a:t>
+            </a:r>
+          </a:p>
+          <a:p>
+            <a:r>
+              <a:rPr lang="en-GB" dirty="0" smtClean="0"/>
+              <a:t>Pseudo classes are defined by a :class name</a:t>
+            </a:r>
+          </a:p>
+          <a:p>
+            <a:r>
+              <a:rPr lang="en-GB" dirty="0" smtClean="0"/>
+              <a:t>A list of pseudo classes can be found on </a:t>
+            </a:r>
+            <a:r>
+              <a:rPr lang="en-GB" dirty="0" err="1" smtClean="0"/>
+              <a:t>mdn</a:t>
+            </a:r>
+            <a:r>
+              <a:rPr lang="en-GB" dirty="0" smtClean="0"/>
+              <a:t>(Mozilla developers network) a link to which is added to the last slide of this section</a:t>
+            </a:r>
+          </a:p>
+          <a:p>
+            <a:r>
+              <a:rPr lang="en-GB" dirty="0" smtClean="0"/>
+              <a:t>Examples of Pseudo classes are </a:t>
+            </a:r>
+            <a:r>
+              <a:rPr lang="en-GB" dirty="0" err="1" smtClean="0"/>
+              <a:t>hover,active,first</a:t>
+            </a:r>
+            <a:r>
+              <a:rPr lang="en-GB" dirty="0" smtClean="0"/>
+              <a:t>-</a:t>
+            </a:r>
+            <a:r>
+              <a:rPr lang="en-GB" dirty="0" err="1" smtClean="0"/>
+              <a:t>child,first</a:t>
+            </a:r>
+            <a:r>
+              <a:rPr lang="en-GB" dirty="0" smtClean="0"/>
+              <a:t>-of-type </a:t>
+            </a:r>
+            <a:r>
+              <a:rPr lang="en-GB" dirty="0" err="1" smtClean="0"/>
+              <a:t>etc</a:t>
+            </a:r>
+            <a:endParaRPr lang="en-GB" dirty="0" smtClean="0"/>
+          </a:p>
+          <a:p>
+            <a:r>
+              <a:rPr lang="en-GB" dirty="0" smtClean="0"/>
+              <a:t>Pseudo element allows us to define a style for a specific part of an element</a:t>
+            </a:r>
+          </a:p>
+          <a:p>
+            <a:r>
+              <a:rPr lang="en-GB" dirty="0" smtClean="0"/>
+              <a:t>Pseudo elements  are defined by :: element name</a:t>
+            </a:r>
+          </a:p>
+          <a:p>
+            <a:r>
+              <a:rPr lang="en-GB" dirty="0"/>
+              <a:t>A list of pseudo </a:t>
+            </a:r>
+            <a:r>
+              <a:rPr lang="en-GB" dirty="0" smtClean="0"/>
+              <a:t>elements </a:t>
+            </a:r>
+            <a:r>
+              <a:rPr lang="en-GB" dirty="0"/>
+              <a:t>can be found on </a:t>
+            </a:r>
+            <a:r>
+              <a:rPr lang="en-GB" dirty="0" err="1"/>
+              <a:t>mdn</a:t>
+            </a:r>
+            <a:r>
+              <a:rPr lang="en-GB" dirty="0"/>
+              <a:t>(Mozilla developers network) a link to which is added to the last slide of this </a:t>
+            </a:r>
+            <a:r>
+              <a:rPr lang="en-GB" dirty="0" smtClean="0"/>
+              <a:t>section</a:t>
+            </a:r>
+          </a:p>
+          <a:p>
+            <a:r>
+              <a:rPr lang="en-GB" dirty="0" smtClean="0"/>
+              <a:t>Examples of pseudo elements are first-</a:t>
+            </a:r>
+            <a:r>
+              <a:rPr lang="en-GB" dirty="0" err="1" smtClean="0"/>
+              <a:t>letter,first</a:t>
+            </a:r>
+            <a:r>
+              <a:rPr lang="en-GB" dirty="0" smtClean="0"/>
+              <a:t>-</a:t>
+            </a:r>
+            <a:r>
+              <a:rPr lang="en-GB" dirty="0" err="1" smtClean="0"/>
+              <a:t>line,after</a:t>
+            </a:r>
+            <a:r>
+              <a:rPr lang="en-GB" dirty="0" smtClean="0"/>
+              <a:t> </a:t>
+            </a:r>
+            <a:r>
+              <a:rPr lang="en-GB" dirty="0" err="1" smtClean="0"/>
+              <a:t>etc</a:t>
+            </a:r>
+            <a:endParaRPr lang="en-GB" dirty="0"/>
+          </a:p>
+          <a:p>
+            <a:r>
+              <a:rPr lang="en-GB" dirty="0" smtClean="0"/>
+              <a:t>Lets quickly dive into some of them </a:t>
+            </a:r>
+          </a:p>
+          <a:p>
+            <a:r>
+              <a:rPr lang="en-GB" dirty="0" smtClean="0"/>
+              <a:t>For example if we want to set </a:t>
+            </a:r>
+            <a:r>
+              <a:rPr lang="en-GB" dirty="0" err="1" smtClean="0"/>
+              <a:t>color</a:t>
+            </a:r>
+            <a:r>
+              <a:rPr lang="en-GB" dirty="0" smtClean="0"/>
+              <a:t> :red and font size 20px to first letter of the &lt;p&gt; tag in the section 2 we can do that by selecting it using pseudo element as p::first-letter and add our styles to it as:</a:t>
+            </a:r>
+          </a:p>
+          <a:p>
+            <a:pPr lvl="1"/>
+            <a:r>
+              <a:rPr lang="en-IN" dirty="0"/>
+              <a:t>p::first-letter {</a:t>
+            </a:r>
+          </a:p>
+          <a:p>
+            <a:pPr marL="400050" lvl="1" indent="0">
+              <a:buNone/>
+            </a:pPr>
+            <a:r>
+              <a:rPr lang="en-IN" dirty="0"/>
+              <a:t>    </a:t>
+            </a:r>
+            <a:r>
+              <a:rPr lang="en-IN" dirty="0" err="1"/>
+              <a:t>color</a:t>
+            </a:r>
+            <a:r>
+              <a:rPr lang="en-IN" dirty="0"/>
+              <a:t>: #ff1b68;</a:t>
+            </a:r>
+          </a:p>
+          <a:p>
+            <a:pPr marL="400050" lvl="1" indent="0">
+              <a:buNone/>
+            </a:pPr>
+            <a:r>
+              <a:rPr lang="en-IN" dirty="0"/>
+              <a:t>    font-size: 20px;</a:t>
+            </a:r>
+          </a:p>
+          <a:p>
+            <a:pPr marL="400050" lvl="1" indent="0">
+              <a:buNone/>
+            </a:pPr>
+            <a:r>
+              <a:rPr lang="en-IN" dirty="0" smtClean="0"/>
+              <a:t>}</a:t>
+            </a:r>
+            <a:endParaRPr lang="en-IN" dirty="0"/>
+          </a:p>
+        </p:txBody>
+      </p:sp>
+    </p:spTree>
+    <p:extLst>
+      <p:ext uri="{BB962C8B-B14F-4D97-AF65-F5344CB8AC3E}">
+        <p14:creationId xmlns:p14="http://schemas.microsoft.com/office/powerpoint/2010/main" val="1157697811"/>
+      </p:ext>
+    </p:extLst>
+  </p:cSld>
+  <p:clrMapOvr>
+    <a:masterClrMapping/>
+  </p:clrMapOvr>
+</p:sld>
+</file>
+
+<file path=ppt/slides/slide51.xml><?xml version="1.0" encoding="utf-8"?>
+<p:sld xmlns:a="http://schemas.openxmlformats.org/drawingml/2006/main" xmlns:r="http://schemas.openxmlformats.org/officeDocument/2006/relationships" xmlns:p="http://schemas.openxmlformats.org/presentationml/2006/main">
+  <p:cSld>
+    <p:spTree>
+      <p:nvGrpSpPr>
+        <p:cNvPr id="1" name=""/>
+        <p:cNvGrpSpPr/>
+        <p:nvPr/>
+      </p:nvGrpSpPr>
+      <p:grpSpPr>
+        <a:xfrm>
+          <a:off x="0" y="0"/>
+          <a:ext cx="0" cy="0"/>
+          <a:chOff x="0" y="0"/>
+          <a:chExt cx="0" cy="0"/>
+        </a:xfrm>
+      </p:grpSpPr>
+      <p:sp>
+        <p:nvSpPr>
+          <p:cNvPr id="2" name="Title 1"/>
+          <p:cNvSpPr>
+            <a:spLocks noGrp="1"/>
+          </p:cNvSpPr>
+          <p:nvPr>
+            <p:ph type="title"/>
+          </p:nvPr>
+        </p:nvSpPr>
+        <p:spPr>
+          <a:xfrm>
+            <a:off x="677334" y="100446"/>
+            <a:ext cx="8596668" cy="626918"/>
+          </a:xfrm>
+        </p:spPr>
+        <p:txBody>
+          <a:bodyPr>
+            <a:normAutofit fontScale="90000"/>
+          </a:bodyPr>
+          <a:lstStyle/>
+          <a:p>
+            <a:r>
+              <a:rPr lang="en-GB" dirty="0"/>
+              <a:t>Pseudo Classes &amp; Pseudo Elements</a:t>
+            </a:r>
+            <a:endParaRPr lang="en-GB" dirty="0"/>
+          </a:p>
+        </p:txBody>
+      </p:sp>
+      <p:sp>
+        <p:nvSpPr>
+          <p:cNvPr id="3" name="Content Placeholder 2"/>
+          <p:cNvSpPr>
+            <a:spLocks noGrp="1"/>
+          </p:cNvSpPr>
+          <p:nvPr>
+            <p:ph idx="1"/>
+          </p:nvPr>
+        </p:nvSpPr>
+        <p:spPr>
+          <a:xfrm>
+            <a:off x="677333" y="893618"/>
+            <a:ext cx="11241039" cy="5621481"/>
+          </a:xfrm>
+        </p:spPr>
+        <p:txBody>
+          <a:bodyPr>
+            <a:normAutofit/>
+          </a:bodyPr>
+          <a:lstStyle/>
+          <a:p>
+            <a:r>
+              <a:rPr lang="en-GB" dirty="0" smtClean="0"/>
+              <a:t>Now lets see an example of after and before pseudo elements that allow us to render content with </a:t>
+            </a:r>
+            <a:r>
+              <a:rPr lang="en-GB" dirty="0" err="1" smtClean="0"/>
+              <a:t>css</a:t>
+            </a:r>
+            <a:r>
+              <a:rPr lang="en-GB" dirty="0" smtClean="0"/>
+              <a:t> but such content should only add to the design and should not be crucial or page content that should always go to html mainly for accessibility reasons</a:t>
+            </a:r>
+          </a:p>
+          <a:p>
+            <a:r>
+              <a:rPr lang="en-GB" dirty="0" smtClean="0"/>
+              <a:t>We can use after to maybe style the links better</a:t>
+            </a:r>
+          </a:p>
+          <a:p>
+            <a:r>
+              <a:rPr lang="en-GB" dirty="0" smtClean="0"/>
+              <a:t>Lets first select it using .main-</a:t>
+            </a:r>
+            <a:r>
+              <a:rPr lang="en-GB" dirty="0" err="1" smtClean="0"/>
+              <a:t>nav</a:t>
+            </a:r>
+            <a:r>
+              <a:rPr lang="en-GB" dirty="0" smtClean="0"/>
+              <a:t>__item a::after</a:t>
+            </a:r>
+          </a:p>
+          <a:p>
+            <a:r>
+              <a:rPr lang="en-GB" dirty="0" smtClean="0"/>
+              <a:t>In this selector we can set a special property that is available only with after and before i.e. content</a:t>
+            </a:r>
+          </a:p>
+          <a:p>
+            <a:r>
+              <a:rPr lang="en-GB" dirty="0" smtClean="0"/>
+              <a:t>Lets set the content to something like content:</a:t>
+            </a:r>
+            <a:r>
+              <a:rPr lang="en-IN" dirty="0" smtClean="0"/>
+              <a:t>” (Link)”; also lets add a </a:t>
+            </a:r>
+            <a:r>
+              <a:rPr lang="en-IN" dirty="0" err="1" smtClean="0"/>
+              <a:t>color:red</a:t>
+            </a:r>
+            <a:r>
+              <a:rPr lang="en-IN" dirty="0" smtClean="0"/>
+              <a:t> to it.</a:t>
+            </a:r>
+          </a:p>
+          <a:p>
+            <a:r>
+              <a:rPr lang="en-IN" dirty="0" smtClean="0"/>
+              <a:t>This kind of styling is used to add a link to open in new tab or an icon </a:t>
+            </a:r>
+            <a:r>
+              <a:rPr lang="en-IN" dirty="0" err="1" smtClean="0"/>
+              <a:t>etc</a:t>
+            </a:r>
+            <a:endParaRPr lang="en-IN" dirty="0" smtClean="0"/>
+          </a:p>
+          <a:p>
+            <a:r>
+              <a:rPr lang="en-IN" dirty="0" smtClean="0"/>
+              <a:t>We will now notice a red coloured word (Link) after each </a:t>
+            </a:r>
+            <a:r>
+              <a:rPr lang="en-IN" dirty="0" err="1" smtClean="0"/>
+              <a:t>nav</a:t>
+            </a:r>
+            <a:r>
+              <a:rPr lang="en-IN" dirty="0" smtClean="0"/>
+              <a:t> item and this word is a part of the content and thus is </a:t>
+            </a:r>
+            <a:r>
+              <a:rPr lang="en-IN" smtClean="0"/>
+              <a:t>clickable.</a:t>
+            </a:r>
+          </a:p>
+          <a:p>
+            <a:endParaRPr lang="en-GB" dirty="0" smtClean="0"/>
+          </a:p>
+        </p:txBody>
+      </p:sp>
+    </p:spTree>
+    <p:extLst>
+      <p:ext uri="{BB962C8B-B14F-4D97-AF65-F5344CB8AC3E}">
+        <p14:creationId xmlns:p14="http://schemas.microsoft.com/office/powerpoint/2010/main" val="1791308788"/>
+      </p:ext>
+    </p:extLst>
+  </p:cSld>
+  <p:clrMapOvr>
+    <a:masterClrMapping/>
+  </p:clrMapOvr>
+</p:sld>
+</file>
+
+<file path=ppt/slides/slide52.xml><?xml version="1.0" encoding="utf-8"?>
+<p:sld xmlns:a="http://schemas.openxmlformats.org/drawingml/2006/main" xmlns:r="http://schemas.openxmlformats.org/officeDocument/2006/relationships" xmlns:p="http://schemas.openxmlformats.org/presentationml/2006/main" showMasterSp="0">
+  <p:cSld>
+    <p:spTree>
+      <p:nvGrpSpPr>
+        <p:cNvPr id="1" name=""/>
+        <p:cNvGrpSpPr/>
+        <p:nvPr/>
+      </p:nvGrpSpPr>
+      <p:grpSpPr>
+        <a:xfrm>
+          <a:off x="0" y="0"/>
+          <a:ext cx="0" cy="0"/>
+          <a:chOff x="0" y="0"/>
+          <a:chExt cx="0" cy="0"/>
+        </a:xfrm>
+      </p:grpSpPr>
+      <p:sp>
+        <p:nvSpPr>
+          <p:cNvPr id="3" name="Content Placeholder 2"/>
+          <p:cNvSpPr>
+            <a:spLocks noGrp="1"/>
+          </p:cNvSpPr>
+          <p:nvPr>
+            <p:ph idx="1"/>
+          </p:nvPr>
+        </p:nvSpPr>
+        <p:spPr>
+          <a:xfrm>
+            <a:off x="3163860" y="2754147"/>
+            <a:ext cx="8596668" cy="3880773"/>
+          </a:xfrm>
+        </p:spPr>
+        <p:txBody>
+          <a:bodyPr>
+            <a:normAutofit/>
+          </a:bodyPr>
+          <a:lstStyle/>
+          <a:p>
+            <a:pPr marL="0" indent="0">
+              <a:buNone/>
+            </a:pPr>
+            <a:r>
+              <a:rPr lang="en-IN" sz="5400" b="1" smtClean="0"/>
+              <a:t>Thanks!!!!!</a:t>
+            </a:r>
+            <a:endParaRPr lang="en-GB" sz="5400" b="1" dirty="0"/>
+          </a:p>
+        </p:txBody>
+      </p:sp>
+    </p:spTree>
+    <p:extLst>
+      <p:ext uri="{BB962C8B-B14F-4D97-AF65-F5344CB8AC3E}">
+        <p14:creationId xmlns:p14="http://schemas.microsoft.com/office/powerpoint/2010/main" val="3977684842"/>
       </p:ext>
     </p:extLst>
   </p:cSld>
@@ -25688,6 +26503,13 @@
   <p:clrMapOvr>
     <a:masterClrMapping/>
   </p:clrMapOvr>
+  <p:timing>
+    <p:tnLst>
+      <p:par>
+        <p:cTn id="1" dur="indefinite" restart="never" nodeType="tmRoot"/>
+      </p:par>
+    </p:tnLst>
+  </p:timing>
 </p:sld>
 </file>
 
@@ -25882,6 +26704,13 @@
   <p:clrMapOvr>
     <a:masterClrMapping/>
   </p:clrMapOvr>
+  <p:timing>
+    <p:tnLst>
+      <p:par>
+        <p:cTn id="1" dur="indefinite" restart="never" nodeType="tmRoot"/>
+      </p:par>
+    </p:tnLst>
+  </p:timing>
 </p:sld>
 </file>
 
@@ -26075,6 +26904,13 @@
   <p:clrMapOvr>
     <a:masterClrMapping/>
   </p:clrMapOvr>
+  <p:timing>
+    <p:tnLst>
+      <p:par>
+        <p:cTn id="1" dur="indefinite" restart="never" nodeType="tmRoot"/>
+      </p:par>
+    </p:tnLst>
+  </p:timing>
 </p:sld>
 </file>
 

</xml_diff>

<commit_message>
Working with font-weight & border
</commit_message>
<xml_diff>
--- a/PPT/Css-v3.pptx
+++ b/PPT/Css-v3.pptx
@@ -5,7 +5,7 @@
     <p:sldMasterId id="2147483660" r:id="rId1"/>
   </p:sldMasterIdLst>
   <p:notesMasterIdLst>
-    <p:notesMasterId r:id="rId55"/>
+    <p:notesMasterId r:id="rId56"/>
   </p:notesMasterIdLst>
   <p:sldIdLst>
     <p:sldId id="256" r:id="rId2"/>
@@ -60,7 +60,8 @@
     <p:sldId id="413" r:id="rId51"/>
     <p:sldId id="414" r:id="rId52"/>
     <p:sldId id="415" r:id="rId53"/>
-    <p:sldId id="268" r:id="rId54"/>
+    <p:sldId id="416" r:id="rId54"/>
+    <p:sldId id="268" r:id="rId55"/>
   </p:sldIdLst>
   <p:sldSz cx="12192000" cy="6858000"/>
   <p:notesSz cx="6858000" cy="9144000"/>
@@ -26238,7 +26239,6 @@
               <a:rPr lang="en-GB" dirty="0"/>
               <a:t>Grouping Rules</a:t>
             </a:r>
-            <a:endParaRPr lang="en-GB" dirty="0"/>
           </a:p>
         </p:txBody>
       </p:sp>
@@ -26410,6 +26410,156 @@
 </file>
 
 <file path=ppt/slides/slide53.xml><?xml version="1.0" encoding="utf-8"?>
+<p:sld xmlns:a="http://schemas.openxmlformats.org/drawingml/2006/main" xmlns:r="http://schemas.openxmlformats.org/officeDocument/2006/relationships" xmlns:p="http://schemas.openxmlformats.org/presentationml/2006/main">
+  <p:cSld>
+    <p:spTree>
+      <p:nvGrpSpPr>
+        <p:cNvPr id="1" name=""/>
+        <p:cNvGrpSpPr/>
+        <p:nvPr/>
+      </p:nvGrpSpPr>
+      <p:grpSpPr>
+        <a:xfrm>
+          <a:off x="0" y="0"/>
+          <a:ext cx="0" cy="0"/>
+          <a:chOff x="0" y="0"/>
+          <a:chExt cx="0" cy="0"/>
+        </a:xfrm>
+      </p:grpSpPr>
+      <p:sp>
+        <p:nvSpPr>
+          <p:cNvPr id="2" name="Title 1"/>
+          <p:cNvSpPr>
+            <a:spLocks noGrp="1"/>
+          </p:cNvSpPr>
+          <p:nvPr>
+            <p:ph type="title"/>
+          </p:nvPr>
+        </p:nvSpPr>
+        <p:spPr>
+          <a:xfrm>
+            <a:off x="822807" y="100445"/>
+            <a:ext cx="8596668" cy="710045"/>
+          </a:xfrm>
+        </p:spPr>
+        <p:txBody>
+          <a:bodyPr/>
+          <a:lstStyle/>
+          <a:p>
+            <a:r>
+              <a:rPr lang="en-GB" dirty="0"/>
+              <a:t>Working with "font-weight" &amp; "border"</a:t>
+            </a:r>
+            <a:endParaRPr lang="en-GB" dirty="0"/>
+          </a:p>
+        </p:txBody>
+      </p:sp>
+      <p:sp>
+        <p:nvSpPr>
+          <p:cNvPr id="3" name="Content Placeholder 2"/>
+          <p:cNvSpPr>
+            <a:spLocks noGrp="1"/>
+          </p:cNvSpPr>
+          <p:nvPr>
+            <p:ph idx="1"/>
+          </p:nvPr>
+        </p:nvSpPr>
+        <p:spPr>
+          <a:xfrm>
+            <a:off x="677334" y="924791"/>
+            <a:ext cx="11116348" cy="5116571"/>
+          </a:xfrm>
+        </p:spPr>
+        <p:txBody>
+          <a:bodyPr/>
+          <a:lstStyle/>
+          <a:p>
+            <a:r>
+              <a:rPr lang="en-IN" dirty="0" smtClean="0"/>
+              <a:t>Lets add some more styles to the links</a:t>
+            </a:r>
+          </a:p>
+          <a:p>
+            <a:pPr lvl="1"/>
+            <a:r>
+              <a:rPr lang="en-IN" dirty="0" smtClean="0"/>
+              <a:t>The links by default should be bold</a:t>
+            </a:r>
+          </a:p>
+          <a:p>
+            <a:pPr lvl="1"/>
+            <a:r>
+              <a:rPr lang="en-IN" dirty="0" smtClean="0"/>
+              <a:t>They should have a border at the bottom not an underline as underline is too close to the text like a border with a </a:t>
+            </a:r>
+            <a:r>
+              <a:rPr lang="en-IN" dirty="0" err="1" smtClean="0"/>
+              <a:t>padding.This</a:t>
+            </a:r>
+            <a:r>
+              <a:rPr lang="en-IN" dirty="0" smtClean="0"/>
+              <a:t> border should be visible only when we hover over it</a:t>
+            </a:r>
+          </a:p>
+          <a:p>
+            <a:r>
+              <a:rPr lang="en-IN" dirty="0" smtClean="0"/>
+              <a:t>To make the links bold just add </a:t>
+            </a:r>
+            <a:r>
+              <a:rPr lang="en-IN" dirty="0" err="1" smtClean="0"/>
+              <a:t>font-weight:bold</a:t>
+            </a:r>
+            <a:r>
+              <a:rPr lang="en-IN" dirty="0" smtClean="0"/>
+              <a:t> to main-</a:t>
+            </a:r>
+            <a:r>
+              <a:rPr lang="en-IN" dirty="0" err="1" smtClean="0"/>
+              <a:t>nav</a:t>
+            </a:r>
+            <a:r>
+              <a:rPr lang="en-IN" dirty="0" smtClean="0"/>
+              <a:t>__item a</a:t>
+            </a:r>
+          </a:p>
+          <a:p>
+            <a:r>
+              <a:rPr lang="en-IN" dirty="0" smtClean="0"/>
+              <a:t>So in the pseudo element selector for hover add a border-bottom: 5px solid white </a:t>
+            </a:r>
+            <a:r>
+              <a:rPr lang="en-IN" smtClean="0"/>
+              <a:t>to add a </a:t>
+            </a:r>
+            <a:r>
+              <a:rPr lang="en-IN" dirty="0" smtClean="0"/>
+              <a:t>border</a:t>
+            </a:r>
+          </a:p>
+          <a:p>
+            <a:r>
+              <a:rPr lang="en-IN" dirty="0" smtClean="0"/>
+              <a:t>To give space between text and border add a padding top and bottom of 3px to the selector for &lt;a&gt; tag</a:t>
+            </a:r>
+            <a:endParaRPr lang="en-GB" dirty="0"/>
+          </a:p>
+        </p:txBody>
+      </p:sp>
+    </p:spTree>
+    <p:extLst>
+      <p:ext uri="{BB962C8B-B14F-4D97-AF65-F5344CB8AC3E}">
+        <p14:creationId xmlns:p14="http://schemas.microsoft.com/office/powerpoint/2010/main" val="3615335588"/>
+      </p:ext>
+    </p:extLst>
+  </p:cSld>
+  <p:clrMapOvr>
+    <a:masterClrMapping/>
+  </p:clrMapOvr>
+</p:sld>
+</file>
+
+<file path=ppt/slides/slide54.xml><?xml version="1.0" encoding="utf-8"?>
 <p:sld xmlns:a="http://schemas.openxmlformats.org/drawingml/2006/main" xmlns:r="http://schemas.openxmlformats.org/officeDocument/2006/relationships" xmlns:p="http://schemas.openxmlformats.org/presentationml/2006/main" showMasterSp="0">
   <p:cSld>
     <p:spTree>

</xml_diff>

<commit_message>
Adding & Styling a CTA-Button
</commit_message>
<xml_diff>
--- a/PPT/Css-v3.pptx
+++ b/PPT/Css-v3.pptx
@@ -5,7 +5,7 @@
     <p:sldMasterId id="2147483660" r:id="rId1"/>
   </p:sldMasterIdLst>
   <p:notesMasterIdLst>
-    <p:notesMasterId r:id="rId56"/>
+    <p:notesMasterId r:id="rId57"/>
   </p:notesMasterIdLst>
   <p:sldIdLst>
     <p:sldId id="256" r:id="rId2"/>
@@ -61,7 +61,8 @@
     <p:sldId id="414" r:id="rId52"/>
     <p:sldId id="415" r:id="rId53"/>
     <p:sldId id="416" r:id="rId54"/>
-    <p:sldId id="268" r:id="rId55"/>
+    <p:sldId id="417" r:id="rId55"/>
+    <p:sldId id="268" r:id="rId56"/>
   </p:sldIdLst>
   <p:sldSz cx="12192000" cy="6858000"/>
   <p:notesSz cx="6858000" cy="9144000"/>
@@ -26450,7 +26451,6 @@
               <a:rPr lang="en-GB" dirty="0"/>
               <a:t>Working with "font-weight" &amp; "border"</a:t>
             </a:r>
-            <a:endParaRPr lang="en-GB" dirty="0"/>
           </a:p>
         </p:txBody>
       </p:sp>
@@ -26560,6 +26560,316 @@
 </file>
 
 <file path=ppt/slides/slide54.xml><?xml version="1.0" encoding="utf-8"?>
+<p:sld xmlns:a="http://schemas.openxmlformats.org/drawingml/2006/main" xmlns:r="http://schemas.openxmlformats.org/officeDocument/2006/relationships" xmlns:p="http://schemas.openxmlformats.org/presentationml/2006/main">
+  <p:cSld>
+    <p:spTree>
+      <p:nvGrpSpPr>
+        <p:cNvPr id="1" name=""/>
+        <p:cNvGrpSpPr/>
+        <p:nvPr/>
+      </p:nvGrpSpPr>
+      <p:grpSpPr>
+        <a:xfrm>
+          <a:off x="0" y="0"/>
+          <a:ext cx="0" cy="0"/>
+          <a:chOff x="0" y="0"/>
+          <a:chExt cx="0" cy="0"/>
+        </a:xfrm>
+      </p:grpSpPr>
+      <p:sp>
+        <p:nvSpPr>
+          <p:cNvPr id="2" name="Title 1"/>
+          <p:cNvSpPr>
+            <a:spLocks noGrp="1"/>
+          </p:cNvSpPr>
+          <p:nvPr>
+            <p:ph type="title"/>
+          </p:nvPr>
+        </p:nvSpPr>
+        <p:spPr>
+          <a:xfrm>
+            <a:off x="1103361" y="152400"/>
+            <a:ext cx="8596668" cy="751609"/>
+          </a:xfrm>
+        </p:spPr>
+        <p:txBody>
+          <a:bodyPr/>
+          <a:lstStyle/>
+          <a:p>
+            <a:r>
+              <a:rPr lang="en-GB" dirty="0"/>
+              <a:t>Adding &amp; Styling a CTA-Button</a:t>
+            </a:r>
+            <a:endParaRPr lang="en-GB" dirty="0"/>
+          </a:p>
+        </p:txBody>
+      </p:sp>
+      <p:sp>
+        <p:nvSpPr>
+          <p:cNvPr id="3" name="Content Placeholder 2"/>
+          <p:cNvSpPr>
+            <a:spLocks noGrp="1"/>
+          </p:cNvSpPr>
+          <p:nvPr>
+            <p:ph idx="1"/>
+          </p:nvPr>
+        </p:nvSpPr>
+        <p:spPr>
+          <a:xfrm>
+            <a:off x="677334" y="1059873"/>
+            <a:ext cx="10679930" cy="5527963"/>
+          </a:xfrm>
+        </p:spPr>
+        <p:txBody>
+          <a:bodyPr>
+            <a:normAutofit lnSpcReduction="10000"/>
+          </a:bodyPr>
+          <a:lstStyle/>
+          <a:p>
+            <a:r>
+              <a:rPr lang="en-IN" dirty="0" smtClean="0"/>
+              <a:t>The start hosting link that we have is actually the main link for our web hosting portal its kind of a CTA(call to action) button and must therefore stand out of the rest.</a:t>
+            </a:r>
+          </a:p>
+          <a:p>
+            <a:r>
+              <a:rPr lang="en-IN" dirty="0" smtClean="0"/>
+              <a:t>To style this link separately lets add another class to </a:t>
+            </a:r>
+            <a:r>
+              <a:rPr lang="en-IN" dirty="0" err="1" smtClean="0"/>
+              <a:t>it.So</a:t>
+            </a:r>
+            <a:r>
+              <a:rPr lang="en-IN" dirty="0" smtClean="0"/>
+              <a:t> here it is worth remembering that we can add multiple classes to an element we will name the class main-</a:t>
+            </a:r>
+            <a:r>
+              <a:rPr lang="en-IN" dirty="0" err="1" smtClean="0"/>
+              <a:t>nav</a:t>
+            </a:r>
+            <a:r>
+              <a:rPr lang="en-IN" dirty="0" smtClean="0"/>
+              <a:t>__item—</a:t>
+            </a:r>
+            <a:r>
+              <a:rPr lang="en-IN" dirty="0" err="1" smtClean="0"/>
+              <a:t>cta</a:t>
+            </a:r>
+            <a:r>
+              <a:rPr lang="en-IN" dirty="0" smtClean="0"/>
+              <a:t>.</a:t>
+            </a:r>
+          </a:p>
+          <a:p>
+            <a:r>
+              <a:rPr lang="en-IN" dirty="0" smtClean="0"/>
+              <a:t>This name is again following </a:t>
+            </a:r>
+            <a:r>
+              <a:rPr lang="en-IN" dirty="0" err="1" smtClean="0"/>
+              <a:t>bem</a:t>
+            </a:r>
+            <a:r>
+              <a:rPr lang="en-IN" dirty="0" smtClean="0"/>
+              <a:t> –</a:t>
+            </a:r>
+            <a:r>
+              <a:rPr lang="en-IN" dirty="0" err="1" smtClean="0"/>
+              <a:t>cta</a:t>
+            </a:r>
+            <a:r>
+              <a:rPr lang="en-IN" dirty="0" smtClean="0"/>
+              <a:t> specifies it has a special state called </a:t>
+            </a:r>
+            <a:r>
+              <a:rPr lang="en-IN" dirty="0" err="1" smtClean="0"/>
+              <a:t>cta</a:t>
+            </a:r>
+            <a:endParaRPr lang="en-IN" dirty="0" smtClean="0"/>
+          </a:p>
+          <a:p>
+            <a:r>
+              <a:rPr lang="en-IN" dirty="0" smtClean="0"/>
+              <a:t>To give multiple classes  to an element we just separate them with a   whitespace</a:t>
+            </a:r>
+          </a:p>
+          <a:p>
+            <a:r>
+              <a:rPr lang="en-IN" dirty="0"/>
+              <a:t>Add a class selector for this class to our main.css </a:t>
+            </a:r>
+            <a:r>
+              <a:rPr lang="en-IN" dirty="0" smtClean="0"/>
+              <a:t>file and using </a:t>
+            </a:r>
+            <a:r>
+              <a:rPr lang="en-IN" dirty="0" err="1" smtClean="0"/>
+              <a:t>combinator</a:t>
+            </a:r>
+            <a:r>
+              <a:rPr lang="en-IN" dirty="0" smtClean="0"/>
+              <a:t> target the &lt;a&gt; tag in this class</a:t>
+            </a:r>
+          </a:p>
+          <a:p>
+            <a:r>
+              <a:rPr lang="en-IN" dirty="0" smtClean="0"/>
+              <a:t>Now since the selector .main-</a:t>
+            </a:r>
+            <a:r>
+              <a:rPr lang="en-IN" dirty="0" err="1" smtClean="0"/>
+              <a:t>nav</a:t>
+            </a:r>
+            <a:r>
+              <a:rPr lang="en-IN" dirty="0" smtClean="0"/>
+              <a:t>__item a </a:t>
+            </a:r>
+            <a:r>
+              <a:rPr lang="en-IN" dirty="0" err="1" smtClean="0"/>
+              <a:t>ans</a:t>
+            </a:r>
+            <a:r>
+              <a:rPr lang="en-IN" dirty="0" smtClean="0"/>
+              <a:t> .main-</a:t>
+            </a:r>
+            <a:r>
+              <a:rPr lang="en-IN" dirty="0" err="1" smtClean="0"/>
+              <a:t>nav</a:t>
+            </a:r>
+            <a:r>
+              <a:rPr lang="en-IN" dirty="0" smtClean="0"/>
+              <a:t>__item—</a:t>
+            </a:r>
+            <a:r>
+              <a:rPr lang="en-IN" dirty="0" err="1" smtClean="0"/>
+              <a:t>cta</a:t>
+            </a:r>
+            <a:r>
+              <a:rPr lang="en-IN" dirty="0" smtClean="0"/>
+              <a:t> a both have same specificity as they both start with a class and then have a descendant child to override styles in our new selector we need to add it after the first selector to override rules in it.</a:t>
+            </a:r>
+          </a:p>
+          <a:p>
+            <a:r>
+              <a:rPr lang="en-IN" dirty="0" smtClean="0"/>
+              <a:t>So now lets add a </a:t>
+            </a:r>
+            <a:r>
+              <a:rPr lang="en-IN" dirty="0" err="1" smtClean="0"/>
+              <a:t>color:white,background</a:t>
+            </a:r>
+            <a:r>
+              <a:rPr lang="en-IN" dirty="0" smtClean="0"/>
+              <a:t>:#ffib68,padding 8px 16px and we will also add a new rule border-radius:8px this will give a round edge to the border</a:t>
+            </a:r>
+          </a:p>
+          <a:p>
+            <a:r>
+              <a:rPr lang="en-IN" dirty="0" smtClean="0"/>
+              <a:t>Also we need to change the hover and active effects so we will add a selector </a:t>
+            </a:r>
+            <a:r>
+              <a:rPr lang="en-IN" dirty="0" err="1" smtClean="0"/>
+              <a:t>eith</a:t>
+            </a:r>
+            <a:r>
+              <a:rPr lang="en-IN" dirty="0" smtClean="0"/>
+              <a:t> pseudo classes .main-</a:t>
+            </a:r>
+            <a:r>
+              <a:rPr lang="en-IN" dirty="0" err="1" smtClean="0"/>
+              <a:t>nav</a:t>
+            </a:r>
+            <a:r>
+              <a:rPr lang="en-IN" dirty="0" smtClean="0"/>
+              <a:t>__item—</a:t>
+            </a:r>
+            <a:r>
+              <a:rPr lang="en-IN" dirty="0" err="1" smtClean="0"/>
+              <a:t>cta</a:t>
+            </a:r>
+            <a:r>
+              <a:rPr lang="en-IN" dirty="0" smtClean="0"/>
+              <a:t> a:hover,</a:t>
+            </a:r>
+            <a:r>
+              <a:rPr lang="en-IN" dirty="0"/>
+              <a:t> .main-</a:t>
+            </a:r>
+            <a:r>
+              <a:rPr lang="en-IN" dirty="0" err="1"/>
+              <a:t>nav</a:t>
+            </a:r>
+            <a:r>
+              <a:rPr lang="en-IN" dirty="0"/>
+              <a:t>__item—</a:t>
+            </a:r>
+            <a:r>
+              <a:rPr lang="en-IN" dirty="0" err="1"/>
+              <a:t>cta</a:t>
+            </a:r>
+            <a:r>
+              <a:rPr lang="en-IN" dirty="0"/>
+              <a:t> </a:t>
+            </a:r>
+            <a:r>
+              <a:rPr lang="en-IN" dirty="0" smtClean="0"/>
+              <a:t>a:active and add </a:t>
+            </a:r>
+            <a:r>
+              <a:rPr lang="en-IN" dirty="0" err="1" smtClean="0"/>
+              <a:t>color</a:t>
+            </a:r>
+            <a:r>
+              <a:rPr lang="en-IN" dirty="0" smtClean="0"/>
+              <a:t> :#ff1b68, background :white </a:t>
+            </a:r>
+            <a:r>
+              <a:rPr lang="en-IN" dirty="0" err="1" smtClean="0"/>
+              <a:t>ie</a:t>
+            </a:r>
+            <a:r>
+              <a:rPr lang="en-IN" dirty="0" smtClean="0"/>
+              <a:t> we swap the background and text </a:t>
+            </a:r>
+            <a:r>
+              <a:rPr lang="en-IN" dirty="0" err="1" smtClean="0"/>
+              <a:t>color</a:t>
+            </a:r>
+            <a:r>
+              <a:rPr lang="en-IN" dirty="0" smtClean="0"/>
+              <a:t> on hover we will also remove the border by setting </a:t>
+            </a:r>
+            <a:r>
+              <a:rPr lang="en-IN" dirty="0" err="1" smtClean="0"/>
+              <a:t>border:none</a:t>
+            </a:r>
+            <a:r>
+              <a:rPr lang="en-IN" dirty="0" smtClean="0"/>
+              <a:t> so that we don’t get that white border effect in this.</a:t>
+            </a:r>
+            <a:endParaRPr lang="en-IN" dirty="0"/>
+          </a:p>
+          <a:p>
+            <a:endParaRPr lang="en-GB" dirty="0"/>
+          </a:p>
+        </p:txBody>
+      </p:sp>
+    </p:spTree>
+    <p:extLst>
+      <p:ext uri="{BB962C8B-B14F-4D97-AF65-F5344CB8AC3E}">
+        <p14:creationId xmlns:p14="http://schemas.microsoft.com/office/powerpoint/2010/main" val="3268997600"/>
+      </p:ext>
+    </p:extLst>
+  </p:cSld>
+  <p:clrMapOvr>
+    <a:masterClrMapping/>
+  </p:clrMapOvr>
+</p:sld>
+</file>
+
+<file path=ppt/slides/slide55.xml><?xml version="1.0" encoding="utf-8"?>
 <p:sld xmlns:a="http://schemas.openxmlformats.org/drawingml/2006/main" xmlns:r="http://schemas.openxmlformats.org/officeDocument/2006/relationships" xmlns:p="http://schemas.openxmlformats.org/presentationml/2006/main" showMasterSp="0">
   <p:cSld>
     <p:spTree>

</xml_diff>

<commit_message>
Adding a Background Image to our Project
</commit_message>
<xml_diff>
--- a/PPT/Css-v3.pptx
+++ b/PPT/Css-v3.pptx
@@ -5,7 +5,7 @@
     <p:sldMasterId id="2147483660" r:id="rId1"/>
   </p:sldMasterIdLst>
   <p:notesMasterIdLst>
-    <p:notesMasterId r:id="rId57"/>
+    <p:notesMasterId r:id="rId58"/>
   </p:notesMasterIdLst>
   <p:sldIdLst>
     <p:sldId id="256" r:id="rId2"/>
@@ -62,7 +62,8 @@
     <p:sldId id="415" r:id="rId53"/>
     <p:sldId id="416" r:id="rId54"/>
     <p:sldId id="417" r:id="rId55"/>
-    <p:sldId id="268" r:id="rId56"/>
+    <p:sldId id="418" r:id="rId56"/>
+    <p:sldId id="268" r:id="rId57"/>
   </p:sldIdLst>
   <p:sldSz cx="12192000" cy="6858000"/>
   <p:notesSz cx="6858000" cy="9144000"/>
@@ -26600,7 +26601,6 @@
               <a:rPr lang="en-GB" dirty="0"/>
               <a:t>Adding &amp; Styling a CTA-Button</a:t>
             </a:r>
-            <a:endParaRPr lang="en-GB" dirty="0"/>
           </a:p>
         </p:txBody>
       </p:sp>
@@ -26870,6 +26870,174 @@
 </file>
 
 <file path=ppt/slides/slide55.xml><?xml version="1.0" encoding="utf-8"?>
+<p:sld xmlns:a="http://schemas.openxmlformats.org/drawingml/2006/main" xmlns:r="http://schemas.openxmlformats.org/officeDocument/2006/relationships" xmlns:p="http://schemas.openxmlformats.org/presentationml/2006/main">
+  <p:cSld>
+    <p:spTree>
+      <p:nvGrpSpPr>
+        <p:cNvPr id="1" name=""/>
+        <p:cNvGrpSpPr/>
+        <p:nvPr/>
+      </p:nvGrpSpPr>
+      <p:grpSpPr>
+        <a:xfrm>
+          <a:off x="0" y="0"/>
+          <a:ext cx="0" cy="0"/>
+          <a:chOff x="0" y="0"/>
+          <a:chExt cx="0" cy="0"/>
+        </a:xfrm>
+      </p:grpSpPr>
+      <p:sp>
+        <p:nvSpPr>
+          <p:cNvPr id="2" name="Title 1"/>
+          <p:cNvSpPr>
+            <a:spLocks noGrp="1"/>
+          </p:cNvSpPr>
+          <p:nvPr>
+            <p:ph type="title"/>
+          </p:nvPr>
+        </p:nvSpPr>
+        <p:spPr>
+          <a:xfrm>
+            <a:off x="833198" y="100445"/>
+            <a:ext cx="10752666" cy="658091"/>
+          </a:xfrm>
+        </p:spPr>
+        <p:txBody>
+          <a:bodyPr/>
+          <a:lstStyle/>
+          <a:p>
+            <a:r>
+              <a:rPr lang="en-IN" dirty="0"/>
+              <a:t>Adding a Background Image to our Project</a:t>
+            </a:r>
+            <a:endParaRPr lang="en-GB" dirty="0"/>
+          </a:p>
+        </p:txBody>
+      </p:sp>
+      <p:sp>
+        <p:nvSpPr>
+          <p:cNvPr id="3" name="Content Placeholder 2"/>
+          <p:cNvSpPr>
+            <a:spLocks noGrp="1"/>
+          </p:cNvSpPr>
+          <p:nvPr>
+            <p:ph idx="1"/>
+          </p:nvPr>
+        </p:nvSpPr>
+        <p:spPr>
+          <a:xfrm>
+            <a:off x="677333" y="1039091"/>
+            <a:ext cx="11199475" cy="5002271"/>
+          </a:xfrm>
+        </p:spPr>
+        <p:txBody>
+          <a:bodyPr/>
+          <a:lstStyle/>
+          <a:p>
+            <a:r>
+              <a:rPr lang="en-IN" dirty="0" smtClean="0"/>
+              <a:t>So lets add an image as a background for the large pink area</a:t>
+            </a:r>
+          </a:p>
+          <a:p>
+            <a:r>
+              <a:rPr lang="en-IN" dirty="0" smtClean="0"/>
+              <a:t>I have already added the image to section3 folder with the name freedom.jpg</a:t>
+            </a:r>
+          </a:p>
+          <a:p>
+            <a:r>
+              <a:rPr lang="en-IN" dirty="0" smtClean="0"/>
+              <a:t>Lets add this image as </a:t>
+            </a:r>
+            <a:r>
+              <a:rPr lang="en-IN" dirty="0" err="1" smtClean="0"/>
+              <a:t>abackground</a:t>
+            </a:r>
+            <a:r>
+              <a:rPr lang="en-IN" dirty="0" smtClean="0"/>
+              <a:t> in our #product-overview selector</a:t>
+            </a:r>
+          </a:p>
+          <a:p>
+            <a:r>
+              <a:rPr lang="en-IN" dirty="0" smtClean="0"/>
+              <a:t>To do this remove the </a:t>
+            </a:r>
+            <a:r>
+              <a:rPr lang="en-IN" dirty="0" err="1" smtClean="0"/>
+              <a:t>color</a:t>
+            </a:r>
+            <a:r>
+              <a:rPr lang="en-IN" dirty="0" smtClean="0"/>
+              <a:t> and use a </a:t>
+            </a:r>
+            <a:r>
+              <a:rPr lang="en-IN" dirty="0" err="1" smtClean="0"/>
+              <a:t>url</a:t>
+            </a:r>
+            <a:r>
+              <a:rPr lang="en-IN" dirty="0" smtClean="0"/>
+              <a:t>() helper method</a:t>
+            </a:r>
+          </a:p>
+          <a:p>
+            <a:r>
+              <a:rPr lang="en-IN" dirty="0" smtClean="0"/>
+              <a:t>This allows us to reference an image and use it as a background thereafter</a:t>
+            </a:r>
+          </a:p>
+          <a:p>
+            <a:r>
+              <a:rPr lang="en-IN" dirty="0" err="1" smtClean="0"/>
+              <a:t>url</a:t>
+            </a:r>
+            <a:r>
+              <a:rPr lang="en-IN" dirty="0" smtClean="0"/>
+              <a:t> takes in a string as a parameter </a:t>
+            </a:r>
+            <a:r>
+              <a:rPr lang="en-IN" dirty="0" err="1" smtClean="0"/>
+              <a:t>i.e</a:t>
+            </a:r>
+            <a:r>
+              <a:rPr lang="en-IN" dirty="0" smtClean="0"/>
+              <a:t> the path of the image we can give a local path or an http path</a:t>
+            </a:r>
+          </a:p>
+          <a:p>
+            <a:r>
+              <a:rPr lang="en-IN" dirty="0" smtClean="0"/>
+              <a:t>For local path if it is in same folder just give the name if it is in sub folder we need to pass the folder name as well</a:t>
+            </a:r>
+          </a:p>
+          <a:p>
+            <a:r>
+              <a:rPr lang="en-IN" dirty="0" smtClean="0"/>
+              <a:t>So in our case just </a:t>
+            </a:r>
+            <a:r>
+              <a:rPr lang="en-IN" smtClean="0"/>
+              <a:t>give freedom.jpg</a:t>
+            </a:r>
+            <a:endParaRPr lang="en-GB" dirty="0"/>
+          </a:p>
+        </p:txBody>
+      </p:sp>
+    </p:spTree>
+    <p:extLst>
+      <p:ext uri="{BB962C8B-B14F-4D97-AF65-F5344CB8AC3E}">
+        <p14:creationId xmlns:p14="http://schemas.microsoft.com/office/powerpoint/2010/main" val="1927254015"/>
+      </p:ext>
+    </p:extLst>
+  </p:cSld>
+  <p:clrMapOvr>
+    <a:masterClrMapping/>
+  </p:clrMapOvr>
+</p:sld>
+</file>
+
+<file path=ppt/slides/slide56.xml><?xml version="1.0" encoding="utf-8"?>
 <p:sld xmlns:a="http://schemas.openxmlformats.org/drawingml/2006/main" xmlns:r="http://schemas.openxmlformats.org/officeDocument/2006/relationships" xmlns:p="http://schemas.openxmlformats.org/presentationml/2006/main" showMasterSp="0">
   <p:cSld>
     <p:spTree>

</xml_diff>

<commit_message>
Assignment solution and useful Links
</commit_message>
<xml_diff>
--- a/PPT/Css-v3.pptx
+++ b/PPT/Css-v3.pptx
@@ -5,7 +5,7 @@
     <p:sldMasterId id="2147483660" r:id="rId1"/>
   </p:sldMasterIdLst>
   <p:notesMasterIdLst>
-    <p:notesMasterId r:id="rId58"/>
+    <p:notesMasterId r:id="rId60"/>
   </p:notesMasterIdLst>
   <p:sldIdLst>
     <p:sldId id="256" r:id="rId2"/>
@@ -63,7 +63,9 @@
     <p:sldId id="416" r:id="rId54"/>
     <p:sldId id="417" r:id="rId55"/>
     <p:sldId id="418" r:id="rId56"/>
-    <p:sldId id="268" r:id="rId57"/>
+    <p:sldId id="419" r:id="rId57"/>
+    <p:sldId id="420" r:id="rId58"/>
+    <p:sldId id="268" r:id="rId59"/>
   </p:sldIdLst>
   <p:sldSz cx="12192000" cy="6858000"/>
   <p:notesSz cx="6858000" cy="9144000"/>
@@ -252,7 +254,7 @@
           <a:p>
             <a:fld id="{39CD3BCA-8732-46CA-ADDD-C24F968DBEAF}" type="datetimeFigureOut">
               <a:rPr lang="en-GB" smtClean="0"/>
-              <a:t>10/11/2020</a:t>
+              <a:t>11/11/2020</a:t>
             </a:fld>
             <a:endParaRPr lang="en-GB"/>
           </a:p>
@@ -2755,7 +2757,7 @@
           <a:p>
             <a:fld id="{D4BA8270-C9CF-44CA-BE5A-02C2BDCCEDE4}" type="datetimeFigureOut">
               <a:rPr lang="en-GB" smtClean="0"/>
-              <a:t>10/11/2020</a:t>
+              <a:t>11/11/2020</a:t>
             </a:fld>
             <a:endParaRPr lang="en-GB"/>
           </a:p>
@@ -3006,7 +3008,7 @@
           <a:p>
             <a:fld id="{D4BA8270-C9CF-44CA-BE5A-02C2BDCCEDE4}" type="datetimeFigureOut">
               <a:rPr lang="en-GB" smtClean="0"/>
-              <a:t>10/11/2020</a:t>
+              <a:t>11/11/2020</a:t>
             </a:fld>
             <a:endParaRPr lang="en-GB"/>
           </a:p>
@@ -3320,7 +3322,7 @@
           <a:p>
             <a:fld id="{D4BA8270-C9CF-44CA-BE5A-02C2BDCCEDE4}" type="datetimeFigureOut">
               <a:rPr lang="en-GB" smtClean="0"/>
-              <a:t>10/11/2020</a:t>
+              <a:t>11/11/2020</a:t>
             </a:fld>
             <a:endParaRPr lang="en-GB"/>
           </a:p>
@@ -3661,7 +3663,7 @@
           <a:p>
             <a:fld id="{D4BA8270-C9CF-44CA-BE5A-02C2BDCCEDE4}" type="datetimeFigureOut">
               <a:rPr lang="en-GB" smtClean="0"/>
-              <a:t>10/11/2020</a:t>
+              <a:t>11/11/2020</a:t>
             </a:fld>
             <a:endParaRPr lang="en-GB"/>
           </a:p>
@@ -3975,7 +3977,7 @@
           <a:p>
             <a:fld id="{D4BA8270-C9CF-44CA-BE5A-02C2BDCCEDE4}" type="datetimeFigureOut">
               <a:rPr lang="en-GB" smtClean="0"/>
-              <a:t>10/11/2020</a:t>
+              <a:t>11/11/2020</a:t>
             </a:fld>
             <a:endParaRPr lang="en-GB"/>
           </a:p>
@@ -4368,7 +4370,7 @@
           <a:p>
             <a:fld id="{D4BA8270-C9CF-44CA-BE5A-02C2BDCCEDE4}" type="datetimeFigureOut">
               <a:rPr lang="en-GB" smtClean="0"/>
-              <a:t>10/11/2020</a:t>
+              <a:t>11/11/2020</a:t>
             </a:fld>
             <a:endParaRPr lang="en-GB"/>
           </a:p>
@@ -4538,7 +4540,7 @@
           <a:p>
             <a:fld id="{D4BA8270-C9CF-44CA-BE5A-02C2BDCCEDE4}" type="datetimeFigureOut">
               <a:rPr lang="en-GB" smtClean="0"/>
-              <a:t>10/11/2020</a:t>
+              <a:t>11/11/2020</a:t>
             </a:fld>
             <a:endParaRPr lang="en-GB"/>
           </a:p>
@@ -4718,7 +4720,7 @@
           <a:p>
             <a:fld id="{D4BA8270-C9CF-44CA-BE5A-02C2BDCCEDE4}" type="datetimeFigureOut">
               <a:rPr lang="en-GB" smtClean="0"/>
-              <a:t>10/11/2020</a:t>
+              <a:t>11/11/2020</a:t>
             </a:fld>
             <a:endParaRPr lang="en-GB"/>
           </a:p>
@@ -4894,7 +4896,7 @@
           <a:p>
             <a:fld id="{D4BA8270-C9CF-44CA-BE5A-02C2BDCCEDE4}" type="datetimeFigureOut">
               <a:rPr lang="en-GB" smtClean="0"/>
-              <a:t>10/11/2020</a:t>
+              <a:t>11/11/2020</a:t>
             </a:fld>
             <a:endParaRPr lang="en-GB"/>
           </a:p>
@@ -5141,7 +5143,7 @@
           <a:p>
             <a:fld id="{D4BA8270-C9CF-44CA-BE5A-02C2BDCCEDE4}" type="datetimeFigureOut">
               <a:rPr lang="en-GB" smtClean="0"/>
-              <a:t>10/11/2020</a:t>
+              <a:t>11/11/2020</a:t>
             </a:fld>
             <a:endParaRPr lang="en-GB"/>
           </a:p>
@@ -5373,7 +5375,7 @@
           <a:p>
             <a:fld id="{D4BA8270-C9CF-44CA-BE5A-02C2BDCCEDE4}" type="datetimeFigureOut">
               <a:rPr lang="en-GB" smtClean="0"/>
-              <a:t>10/11/2020</a:t>
+              <a:t>11/11/2020</a:t>
             </a:fld>
             <a:endParaRPr lang="en-GB"/>
           </a:p>
@@ -5747,7 +5749,7 @@
           <a:p>
             <a:fld id="{D4BA8270-C9CF-44CA-BE5A-02C2BDCCEDE4}" type="datetimeFigureOut">
               <a:rPr lang="en-GB" smtClean="0"/>
-              <a:t>10/11/2020</a:t>
+              <a:t>11/11/2020</a:t>
             </a:fld>
             <a:endParaRPr lang="en-GB"/>
           </a:p>
@@ -5870,7 +5872,7 @@
           <a:p>
             <a:fld id="{D4BA8270-C9CF-44CA-BE5A-02C2BDCCEDE4}" type="datetimeFigureOut">
               <a:rPr lang="en-GB" smtClean="0"/>
-              <a:t>10/11/2020</a:t>
+              <a:t>11/11/2020</a:t>
             </a:fld>
             <a:endParaRPr lang="en-GB"/>
           </a:p>
@@ -5965,7 +5967,7 @@
           <a:p>
             <a:fld id="{D4BA8270-C9CF-44CA-BE5A-02C2BDCCEDE4}" type="datetimeFigureOut">
               <a:rPr lang="en-GB" smtClean="0"/>
-              <a:t>10/11/2020</a:t>
+              <a:t>11/11/2020</a:t>
             </a:fld>
             <a:endParaRPr lang="en-GB"/>
           </a:p>
@@ -6220,7 +6222,7 @@
           <a:p>
             <a:fld id="{D4BA8270-C9CF-44CA-BE5A-02C2BDCCEDE4}" type="datetimeFigureOut">
               <a:rPr lang="en-GB" smtClean="0"/>
-              <a:t>10/11/2020</a:t>
+              <a:t>11/11/2020</a:t>
             </a:fld>
             <a:endParaRPr lang="en-GB"/>
           </a:p>
@@ -6483,7 +6485,7 @@
           <a:p>
             <a:fld id="{D4BA8270-C9CF-44CA-BE5A-02C2BDCCEDE4}" type="datetimeFigureOut">
               <a:rPr lang="en-GB" smtClean="0"/>
-              <a:t>10/11/2020</a:t>
+              <a:t>11/11/2020</a:t>
             </a:fld>
             <a:endParaRPr lang="en-GB"/>
           </a:p>
@@ -7226,7 +7228,7 @@
           <a:p>
             <a:fld id="{D4BA8270-C9CF-44CA-BE5A-02C2BDCCEDE4}" type="datetimeFigureOut">
               <a:rPr lang="en-GB" smtClean="0"/>
-              <a:t>10/11/2020</a:t>
+              <a:t>11/11/2020</a:t>
             </a:fld>
             <a:endParaRPr lang="en-GB"/>
           </a:p>
@@ -27038,6 +27040,281 @@
 </file>
 
 <file path=ppt/slides/slide56.xml><?xml version="1.0" encoding="utf-8"?>
+<p:sld xmlns:a="http://schemas.openxmlformats.org/drawingml/2006/main" xmlns:r="http://schemas.openxmlformats.org/officeDocument/2006/relationships" xmlns:p="http://schemas.openxmlformats.org/presentationml/2006/main">
+  <p:cSld>
+    <p:spTree>
+      <p:nvGrpSpPr>
+        <p:cNvPr id="1" name=""/>
+        <p:cNvGrpSpPr/>
+        <p:nvPr/>
+      </p:nvGrpSpPr>
+      <p:grpSpPr>
+        <a:xfrm>
+          <a:off x="0" y="0"/>
+          <a:ext cx="0" cy="0"/>
+          <a:chOff x="0" y="0"/>
+          <a:chExt cx="0" cy="0"/>
+        </a:xfrm>
+      </p:grpSpPr>
+      <p:sp>
+        <p:nvSpPr>
+          <p:cNvPr id="2" name="Title 1"/>
+          <p:cNvSpPr>
+            <a:spLocks noGrp="1"/>
+          </p:cNvSpPr>
+          <p:nvPr>
+            <p:ph type="title"/>
+          </p:nvPr>
+        </p:nvSpPr>
+        <p:spPr>
+          <a:xfrm>
+            <a:off x="677334" y="100445"/>
+            <a:ext cx="8596668" cy="512618"/>
+          </a:xfrm>
+        </p:spPr>
+        <p:txBody>
+          <a:bodyPr>
+            <a:normAutofit fontScale="90000"/>
+          </a:bodyPr>
+          <a:lstStyle/>
+          <a:p>
+            <a:r>
+              <a:rPr lang="en-GB" dirty="0" smtClean="0"/>
+              <a:t>Assignment</a:t>
+            </a:r>
+            <a:endParaRPr lang="en-GB" dirty="0"/>
+          </a:p>
+        </p:txBody>
+      </p:sp>
+      <p:sp>
+        <p:nvSpPr>
+          <p:cNvPr id="3" name="Content Placeholder 2"/>
+          <p:cNvSpPr>
+            <a:spLocks noGrp="1"/>
+          </p:cNvSpPr>
+          <p:nvPr>
+            <p:ph idx="1"/>
+          </p:nvPr>
+        </p:nvSpPr>
+        <p:spPr>
+          <a:xfrm>
+            <a:off x="677334" y="914401"/>
+            <a:ext cx="10679930" cy="5126962"/>
+          </a:xfrm>
+        </p:spPr>
+        <p:txBody>
+          <a:bodyPr/>
+          <a:lstStyle/>
+          <a:p>
+            <a:r>
+              <a:rPr lang="en-IN" dirty="0"/>
+              <a:t>Build a nice box (div) with some content (e.g. "I'm a box!"), padding, a border (style it as you want) and some margin.</a:t>
+            </a:r>
+          </a:p>
+          <a:p>
+            <a:r>
+              <a:rPr lang="en-IN" dirty="0"/>
+              <a:t>If you didn't do it already: Set different padding and margin for the four different sides of the box.</a:t>
+            </a:r>
+          </a:p>
+          <a:p>
+            <a:r>
+              <a:rPr lang="en-IN" dirty="0"/>
+              <a:t>Add the same box below the first box and note if you can identify any strange </a:t>
+            </a:r>
+            <a:r>
+              <a:rPr lang="en-IN" dirty="0" err="1"/>
+              <a:t>behavior</a:t>
+            </a:r>
+            <a:r>
+              <a:rPr lang="en-IN" dirty="0"/>
+              <a:t>.</a:t>
+            </a:r>
+          </a:p>
+          <a:p>
+            <a:r>
+              <a:rPr lang="en-IN" dirty="0"/>
+              <a:t>Give the first box a height of 100% of the window height.</a:t>
+            </a:r>
+          </a:p>
+          <a:p>
+            <a:r>
+              <a:rPr lang="en-IN" dirty="0"/>
+              <a:t>Set the first box back to a more reasonable height of 300px and set its width to 50%.</a:t>
+            </a:r>
+          </a:p>
+          <a:p>
+            <a:r>
+              <a:rPr lang="en-IN" dirty="0"/>
+              <a:t>Set same height and width for second box also and Position the two boxes next to each other.</a:t>
+            </a:r>
+          </a:p>
+          <a:p>
+            <a:r>
+              <a:rPr lang="en-IN" dirty="0"/>
+              <a:t>"Hide" box number 1 and see how that changes the page.</a:t>
+            </a:r>
+          </a:p>
+          <a:p>
+            <a:r>
+              <a:rPr lang="en-IN" dirty="0"/>
+              <a:t>Add a hover effect to the </a:t>
+            </a:r>
+            <a:r>
+              <a:rPr lang="en-IN" dirty="0" err="1"/>
+              <a:t>the</a:t>
+            </a:r>
+            <a:r>
+              <a:rPr lang="en-IN" dirty="0"/>
+              <a:t> LAST div element. Use pseudo-classes for that.</a:t>
+            </a:r>
+            <a:endParaRPr lang="en-GB" dirty="0"/>
+          </a:p>
+        </p:txBody>
+      </p:sp>
+    </p:spTree>
+    <p:extLst>
+      <p:ext uri="{BB962C8B-B14F-4D97-AF65-F5344CB8AC3E}">
+        <p14:creationId xmlns:p14="http://schemas.microsoft.com/office/powerpoint/2010/main" val="2662368269"/>
+      </p:ext>
+    </p:extLst>
+  </p:cSld>
+  <p:clrMapOvr>
+    <a:masterClrMapping/>
+  </p:clrMapOvr>
+</p:sld>
+</file>
+
+<file path=ppt/slides/slide57.xml><?xml version="1.0" encoding="utf-8"?>
+<p:sld xmlns:a="http://schemas.openxmlformats.org/drawingml/2006/main" xmlns:r="http://schemas.openxmlformats.org/officeDocument/2006/relationships" xmlns:p="http://schemas.openxmlformats.org/presentationml/2006/main">
+  <p:cSld>
+    <p:spTree>
+      <p:nvGrpSpPr>
+        <p:cNvPr id="1" name=""/>
+        <p:cNvGrpSpPr/>
+        <p:nvPr/>
+      </p:nvGrpSpPr>
+      <p:grpSpPr>
+        <a:xfrm>
+          <a:off x="0" y="0"/>
+          <a:ext cx="0" cy="0"/>
+          <a:chOff x="0" y="0"/>
+          <a:chExt cx="0" cy="0"/>
+        </a:xfrm>
+      </p:grpSpPr>
+      <p:sp>
+        <p:nvSpPr>
+          <p:cNvPr id="2" name="Title 1"/>
+          <p:cNvSpPr>
+            <a:spLocks noGrp="1"/>
+          </p:cNvSpPr>
+          <p:nvPr>
+            <p:ph type="title"/>
+          </p:nvPr>
+        </p:nvSpPr>
+        <p:spPr/>
+        <p:txBody>
+          <a:bodyPr/>
+          <a:lstStyle/>
+          <a:p>
+            <a:r>
+              <a:rPr lang="en-IN" dirty="0" smtClean="0"/>
+              <a:t>Useful Links</a:t>
+            </a:r>
+            <a:endParaRPr lang="en-GB" dirty="0"/>
+          </a:p>
+        </p:txBody>
+      </p:sp>
+      <p:sp>
+        <p:nvSpPr>
+          <p:cNvPr id="3" name="Content Placeholder 2"/>
+          <p:cNvSpPr>
+            <a:spLocks noGrp="1"/>
+          </p:cNvSpPr>
+          <p:nvPr>
+            <p:ph idx="1"/>
+          </p:nvPr>
+        </p:nvSpPr>
+        <p:spPr>
+          <a:xfrm>
+            <a:off x="677333" y="1194955"/>
+            <a:ext cx="11178693" cy="4846407"/>
+          </a:xfrm>
+        </p:spPr>
+        <p:txBody>
+          <a:bodyPr/>
+          <a:lstStyle/>
+          <a:p>
+            <a:endParaRPr lang="en-IN" dirty="0"/>
+          </a:p>
+          <a:p>
+            <a:r>
+              <a:rPr lang="en-IN" dirty="0"/>
+              <a:t>CSS Box Model: https://</a:t>
+            </a:r>
+            <a:r>
+              <a:rPr lang="en-IN" dirty="0" smtClean="0"/>
+              <a:t>developer.mozilla.org/en-US/docs/Learn/CSS/Introduction_to_CSS/Box_model</a:t>
+            </a:r>
+            <a:endParaRPr lang="en-IN" dirty="0"/>
+          </a:p>
+          <a:p>
+            <a:r>
+              <a:rPr lang="en-IN" dirty="0"/>
+              <a:t>box-sizing : https://</a:t>
+            </a:r>
+            <a:r>
+              <a:rPr lang="en-IN" dirty="0" smtClean="0"/>
+              <a:t>developer.mozilla.org/en-US/docs/Web/CSS/box-sizing</a:t>
+            </a:r>
+            <a:endParaRPr lang="en-IN" dirty="0"/>
+          </a:p>
+          <a:p>
+            <a:r>
+              <a:rPr lang="en-IN" dirty="0"/>
+              <a:t>More on height &amp; width: https://www.w3schools.com/css/css_dimension.asp</a:t>
+            </a:r>
+          </a:p>
+          <a:p>
+            <a:r>
+              <a:rPr lang="en-IN" dirty="0"/>
+              <a:t>The display  Property: https://developer.mozilla.org/en-US/docs/Web/CSS/display</a:t>
+            </a:r>
+          </a:p>
+          <a:p>
+            <a:r>
+              <a:rPr lang="en-IN" dirty="0"/>
+              <a:t>Pseudo Classes on the MDN: https://developer.mozilla.org/en-US/docs/Web/CSS/Pseudo-classes</a:t>
+            </a:r>
+          </a:p>
+          <a:p>
+            <a:r>
+              <a:rPr lang="en-IN" dirty="0"/>
+              <a:t>Dive deeper into Pseudo Elements: https://developer.mozilla.org/en-US/docs/Web/CSS/Pseudo-elements</a:t>
+            </a:r>
+          </a:p>
+          <a:p>
+            <a:endParaRPr lang="en-IN" dirty="0"/>
+          </a:p>
+          <a:p>
+            <a:endParaRPr lang="en-GB" dirty="0"/>
+          </a:p>
+        </p:txBody>
+      </p:sp>
+    </p:spTree>
+    <p:extLst>
+      <p:ext uri="{BB962C8B-B14F-4D97-AF65-F5344CB8AC3E}">
+        <p14:creationId xmlns:p14="http://schemas.microsoft.com/office/powerpoint/2010/main" val="1958238624"/>
+      </p:ext>
+    </p:extLst>
+  </p:cSld>
+  <p:clrMapOvr>
+    <a:masterClrMapping/>
+  </p:clrMapOvr>
+</p:sld>
+</file>
+
+<file path=ppt/slides/slide58.xml><?xml version="1.0" encoding="utf-8"?>
 <p:sld xmlns:a="http://schemas.openxmlformats.org/drawingml/2006/main" xmlns:r="http://schemas.openxmlformats.org/officeDocument/2006/relationships" xmlns:p="http://schemas.openxmlformats.org/presentationml/2006/main" showMasterSp="0">
   <p:cSld>
     <p:spTree>

</xml_diff>